<commit_message>
Updated slideshow for demo 2, nearly done
</commit_message>
<xml_diff>
--- a/Documentation/Demo/Demo_02.pptx
+++ b/Documentation/Demo/Demo_02.pptx
@@ -13,6 +13,7 @@
     <p:sldId id="260" r:id="rId8"/>
     <p:sldId id="261" r:id="rId9"/>
     <p:sldId id="262" r:id="rId10"/>
+    <p:sldId id="263" r:id="rId11"/>
   </p:sldIdLst>
   <p:sldSz cx="12192000" cy="6858000"/>
   <p:notesSz cx="7559675" cy="10691812"/>
@@ -3003,7 +3004,7 @@
         <p:spPr>
           <a:xfrm>
             <a:off x="457200" y="0"/>
-            <a:ext cx="1121760" cy="5328360"/>
+            <a:ext cx="1121400" cy="5328000"/>
           </a:xfrm>
           <a:custGeom>
             <a:avLst/>
@@ -3054,7 +3055,7 @@
         <p:spPr>
           <a:xfrm>
             <a:off x="150840" y="0"/>
-            <a:ext cx="1116720" cy="5276160"/>
+            <a:ext cx="1116360" cy="5275800"/>
           </a:xfrm>
           <a:custGeom>
             <a:avLst/>
@@ -3108,7 +3109,7 @@
         <p:spPr>
           <a:xfrm>
             <a:off x="150840" y="5238720"/>
-            <a:ext cx="1227960" cy="1618560"/>
+            <a:ext cx="1227600" cy="1618200"/>
           </a:xfrm>
           <a:custGeom>
             <a:avLst/>
@@ -3159,7 +3160,7 @@
         <p:spPr>
           <a:xfrm>
             <a:off x="457200" y="5291280"/>
-            <a:ext cx="1494720" cy="1566000"/>
+            <a:ext cx="1494360" cy="1565640"/>
           </a:xfrm>
           <a:custGeom>
             <a:avLst/>
@@ -3209,7 +3210,7 @@
         <p:spPr>
           <a:xfrm>
             <a:off x="457200" y="5286240"/>
-            <a:ext cx="2129760" cy="1571040"/>
+            <a:ext cx="2129400" cy="1570680"/>
           </a:xfrm>
           <a:custGeom>
             <a:avLst/>
@@ -3265,7 +3266,7 @@
         <p:spPr>
           <a:xfrm>
             <a:off x="150840" y="5238720"/>
-            <a:ext cx="1694880" cy="1618560"/>
+            <a:ext cx="1694520" cy="1618200"/>
           </a:xfrm>
           <a:custGeom>
             <a:avLst/>
@@ -3334,7 +3335,7 @@
         <p:spPr>
           <a:xfrm>
             <a:off x="984240" y="-4680"/>
-            <a:ext cx="1063080" cy="2782080"/>
+            <a:ext cx="1062720" cy="2781720"/>
           </a:xfrm>
           <a:custGeom>
             <a:avLst/>
@@ -3385,7 +3386,7 @@
         <p:spPr>
           <a:xfrm>
             <a:off x="546120" y="-4680"/>
-            <a:ext cx="1034280" cy="2672640"/>
+            <a:ext cx="1033920" cy="2672280"/>
           </a:xfrm>
           <a:custGeom>
             <a:avLst/>
@@ -3442,7 +3443,7 @@
         <p:spPr>
           <a:xfrm>
             <a:off x="546120" y="2583000"/>
-            <a:ext cx="2693160" cy="4274280"/>
+            <a:ext cx="2692800" cy="4273920"/>
           </a:xfrm>
           <a:custGeom>
             <a:avLst/>
@@ -3493,7 +3494,7 @@
         <p:spPr>
           <a:xfrm>
             <a:off x="988920" y="2692440"/>
-            <a:ext cx="3331440" cy="4164840"/>
+            <a:ext cx="3331080" cy="4164480"/>
           </a:xfrm>
           <a:custGeom>
             <a:avLst/>
@@ -3543,7 +3544,7 @@
         <p:spPr>
           <a:xfrm>
             <a:off x="984240" y="2687760"/>
-            <a:ext cx="4575960" cy="4169520"/>
+            <a:ext cx="4575600" cy="4169160"/>
           </a:xfrm>
           <a:custGeom>
             <a:avLst/>
@@ -3599,7 +3600,7 @@
         <p:spPr>
           <a:xfrm>
             <a:off x="546120" y="2577960"/>
-            <a:ext cx="3583800" cy="4279320"/>
+            <a:ext cx="3583440" cy="4278960"/>
           </a:xfrm>
           <a:custGeom>
             <a:avLst/>
@@ -3665,8 +3666,8 @@
         </p:nvSpPr>
         <p:spPr>
           <a:xfrm>
-            <a:off x="1484280" y="685800"/>
-            <a:ext cx="10018080" cy="1751760"/>
+            <a:off x="609480" y="273600"/>
+            <a:ext cx="10972080" cy="1144440"/>
           </a:xfrm>
           <a:prstGeom prst="rect">
             <a:avLst/>
@@ -3703,7 +3704,7 @@
         <p:spPr>
           <a:xfrm>
             <a:off x="609480" y="1604520"/>
-            <a:ext cx="10972440" cy="3977280"/>
+            <a:ext cx="10972080" cy="3976920"/>
           </a:xfrm>
           <a:prstGeom prst="rect">
             <a:avLst/>
@@ -3721,7 +3722,7 @@
               <a:buChar char=""/>
             </a:pPr>
             <a:r>
-              <a:rPr b="0" lang="en-ZA" sz="3200" spc="-1" strike="noStrike">
+              <a:rPr b="0" lang="en-ZA" sz="1800" spc="-1" strike="noStrike">
                 <a:solidFill>
                   <a:srgbClr val="000000"/>
                 </a:solidFill>
@@ -3734,7 +3735,7 @@
               </a:rPr>
               <a:t>Click to edit the outline text format</a:t>
             </a:r>
-            <a:endParaRPr b="0" lang="en-ZA" sz="3200" spc="-1" strike="noStrike">
+            <a:endParaRPr b="0" lang="en-ZA" sz="1800" spc="-1" strike="noStrike">
               <a:solidFill>
                 <a:srgbClr val="000000"/>
               </a:solidFill>
@@ -3756,7 +3757,7 @@
               <a:buChar char=""/>
             </a:pPr>
             <a:r>
-              <a:rPr b="0" lang="en-ZA" sz="2800" spc="-1" strike="noStrike">
+              <a:rPr b="0" lang="en-ZA" sz="1800" spc="-1" strike="noStrike">
                 <a:solidFill>
                   <a:srgbClr val="000000"/>
                 </a:solidFill>
@@ -3769,7 +3770,7 @@
               </a:rPr>
               <a:t>Second Outline Level</a:t>
             </a:r>
-            <a:endParaRPr b="0" lang="en-ZA" sz="2800" spc="-1" strike="noStrike">
+            <a:endParaRPr b="0" lang="en-ZA" sz="1800" spc="-1" strike="noStrike">
               <a:solidFill>
                 <a:srgbClr val="000000"/>
               </a:solidFill>
@@ -3791,7 +3792,7 @@
               <a:buChar char=""/>
             </a:pPr>
             <a:r>
-              <a:rPr b="0" lang="en-ZA" sz="2400" spc="-1" strike="noStrike">
+              <a:rPr b="0" lang="en-ZA" sz="1800" spc="-1" strike="noStrike">
                 <a:solidFill>
                   <a:srgbClr val="000000"/>
                 </a:solidFill>
@@ -3804,7 +3805,7 @@
               </a:rPr>
               <a:t>Third Outline Level</a:t>
             </a:r>
-            <a:endParaRPr b="0" lang="en-ZA" sz="2400" spc="-1" strike="noStrike">
+            <a:endParaRPr b="0" lang="en-ZA" sz="1800" spc="-1" strike="noStrike">
               <a:solidFill>
                 <a:srgbClr val="000000"/>
               </a:solidFill>
@@ -3826,7 +3827,7 @@
               <a:buChar char=""/>
             </a:pPr>
             <a:r>
-              <a:rPr b="0" lang="en-ZA" sz="2000" spc="-1" strike="noStrike">
+              <a:rPr b="0" lang="en-ZA" sz="1800" spc="-1" strike="noStrike">
                 <a:solidFill>
                   <a:srgbClr val="000000"/>
                 </a:solidFill>
@@ -3839,7 +3840,7 @@
               </a:rPr>
               <a:t>Fourth Outline Level</a:t>
             </a:r>
-            <a:endParaRPr b="0" lang="en-ZA" sz="2000" spc="-1" strike="noStrike">
+            <a:endParaRPr b="0" lang="en-ZA" sz="1800" spc="-1" strike="noStrike">
               <a:solidFill>
                 <a:srgbClr val="000000"/>
               </a:solidFill>
@@ -3861,7 +3862,7 @@
               <a:buChar char=""/>
             </a:pPr>
             <a:r>
-              <a:rPr b="0" lang="en-ZA" sz="2000" spc="-1" strike="noStrike">
+              <a:rPr b="0" lang="en-ZA" sz="1800" spc="-1" strike="noStrike">
                 <a:solidFill>
                   <a:srgbClr val="000000"/>
                 </a:solidFill>
@@ -3874,7 +3875,7 @@
               </a:rPr>
               <a:t>Fifth Outline Level</a:t>
             </a:r>
-            <a:endParaRPr b="0" lang="en-ZA" sz="2000" spc="-1" strike="noStrike">
+            <a:endParaRPr b="0" lang="en-ZA" sz="1800" spc="-1" strike="noStrike">
               <a:solidFill>
                 <a:srgbClr val="000000"/>
               </a:solidFill>
@@ -3896,7 +3897,7 @@
               <a:buChar char=""/>
             </a:pPr>
             <a:r>
-              <a:rPr b="0" lang="en-ZA" sz="2000" spc="-1" strike="noStrike">
+              <a:rPr b="0" lang="en-ZA" sz="1800" spc="-1" strike="noStrike">
                 <a:solidFill>
                   <a:srgbClr val="000000"/>
                 </a:solidFill>
@@ -3909,7 +3910,7 @@
               </a:rPr>
               <a:t>Sixth Outline Level</a:t>
             </a:r>
-            <a:endParaRPr b="0" lang="en-ZA" sz="2000" spc="-1" strike="noStrike">
+            <a:endParaRPr b="0" lang="en-ZA" sz="1800" spc="-1" strike="noStrike">
               <a:solidFill>
                 <a:srgbClr val="000000"/>
               </a:solidFill>
@@ -3931,7 +3932,7 @@
               <a:buChar char=""/>
             </a:pPr>
             <a:r>
-              <a:rPr b="0" lang="en-ZA" sz="2000" spc="-1" strike="noStrike">
+              <a:rPr b="0" lang="en-ZA" sz="1800" spc="-1" strike="noStrike">
                 <a:solidFill>
                   <a:srgbClr val="000000"/>
                 </a:solidFill>
@@ -3944,7 +3945,7 @@
               </a:rPr>
               <a:t>Seventh Outline Level</a:t>
             </a:r>
-            <a:endParaRPr b="0" lang="en-ZA" sz="2000" spc="-1" strike="noStrike">
+            <a:endParaRPr b="0" lang="en-ZA" sz="1800" spc="-1" strike="noStrike">
               <a:solidFill>
                 <a:srgbClr val="000000"/>
               </a:solidFill>
@@ -4014,7 +4015,7 @@
         <p:spPr>
           <a:xfrm>
             <a:off x="457200" y="0"/>
-            <a:ext cx="1121760" cy="5328360"/>
+            <a:ext cx="1121400" cy="5328000"/>
           </a:xfrm>
           <a:custGeom>
             <a:avLst/>
@@ -4065,7 +4066,7 @@
         <p:spPr>
           <a:xfrm>
             <a:off x="150840" y="0"/>
-            <a:ext cx="1116720" cy="5276160"/>
+            <a:ext cx="1116360" cy="5275800"/>
           </a:xfrm>
           <a:custGeom>
             <a:avLst/>
@@ -4119,7 +4120,7 @@
         <p:spPr>
           <a:xfrm>
             <a:off x="150840" y="5238720"/>
-            <a:ext cx="1227960" cy="1618560"/>
+            <a:ext cx="1227600" cy="1618200"/>
           </a:xfrm>
           <a:custGeom>
             <a:avLst/>
@@ -4170,7 +4171,7 @@
         <p:spPr>
           <a:xfrm>
             <a:off x="457200" y="5291280"/>
-            <a:ext cx="1494720" cy="1566000"/>
+            <a:ext cx="1494360" cy="1565640"/>
           </a:xfrm>
           <a:custGeom>
             <a:avLst/>
@@ -4220,7 +4221,7 @@
         <p:spPr>
           <a:xfrm>
             <a:off x="457200" y="5286240"/>
-            <a:ext cx="2129760" cy="1571040"/>
+            <a:ext cx="2129400" cy="1570680"/>
           </a:xfrm>
           <a:custGeom>
             <a:avLst/>
@@ -4276,7 +4277,7 @@
         <p:spPr>
           <a:xfrm>
             <a:off x="150840" y="5238720"/>
-            <a:ext cx="1694880" cy="1618560"/>
+            <a:ext cx="1694520" cy="1618200"/>
           </a:xfrm>
           <a:custGeom>
             <a:avLst/>
@@ -4701,7 +4702,7 @@
         <p:spPr>
           <a:xfrm>
             <a:off x="2928240" y="1380240"/>
-            <a:ext cx="8573760" cy="2615400"/>
+            <a:ext cx="8573400" cy="2615040"/>
           </a:xfrm>
           <a:prstGeom prst="rect">
             <a:avLst/>
@@ -4736,6 +4737,7 @@
                   </a:solidFill>
                 </a:uFill>
                 <a:latin typeface="Corbel"/>
+                <a:ea typeface="DejaVu Sans"/>
               </a:rPr>
               <a:t>Insurance profiling</a:t>
             </a:r>
@@ -4762,7 +4764,7 @@
         <p:spPr>
           <a:xfrm>
             <a:off x="4515480" y="3996360"/>
-            <a:ext cx="6986880" cy="1387800"/>
+            <a:ext cx="6986520" cy="1387440"/>
           </a:xfrm>
           <a:prstGeom prst="rect">
             <a:avLst/>
@@ -4797,6 +4799,7 @@
                   </a:solidFill>
                 </a:uFill>
                 <a:latin typeface="Corbel"/>
+                <a:ea typeface="DejaVu Sans"/>
               </a:rPr>
               <a:t>Valknut solutions</a:t>
             </a:r>
@@ -4872,7 +4875,7 @@
         <p:spPr>
           <a:xfrm>
             <a:off x="1926360" y="463320"/>
-            <a:ext cx="9133560" cy="961200"/>
+            <a:ext cx="9133200" cy="960840"/>
           </a:xfrm>
           <a:prstGeom prst="rect">
             <a:avLst/>
@@ -4902,6 +4905,7 @@
                   </a:solidFill>
                 </a:uFill>
                 <a:latin typeface="Corbel"/>
+                <a:ea typeface="DejaVu Sans"/>
               </a:rPr>
               <a:t>Recess sprint details:</a:t>
             </a:r>
@@ -4945,8 +4949,8 @@
         </p:nvSpPr>
         <p:spPr>
           <a:xfrm>
-            <a:off x="1484280" y="1900800"/>
-            <a:ext cx="10018080" cy="3123360"/>
+            <a:off x="1512000" y="2088000"/>
+            <a:ext cx="10017720" cy="3123000"/>
           </a:xfrm>
           <a:prstGeom prst="rect">
             <a:avLst/>
@@ -4965,7 +4969,7 @@
         <p:txBody>
           <a:bodyPr lIns="90000" rIns="90000" tIns="45000" bIns="45000" anchor="ctr"/>
           <a:p>
-            <a:pPr marL="285840" indent="-285120">
+            <a:pPr marL="285840" indent="-284760">
               <a:lnSpc>
                 <a:spcPct val="100000"/>
               </a:lnSpc>
@@ -4987,8 +4991,9 @@
                   </a:solidFill>
                 </a:uFill>
                 <a:latin typeface="Corbel"/>
+                <a:ea typeface="DejaVu Sans"/>
               </a:rPr>
-              <a:t>Meeting with Telesure (our client’s client)</a:t>
+              <a:t>Compilation of Social media parameters research documentation as per client’s request</a:t>
             </a:r>
             <a:endParaRPr b="0" lang="en-ZA" sz="1800" spc="-1" strike="noStrike">
               <a:solidFill>
@@ -5003,7 +5008,7 @@
             </a:endParaRPr>
           </a:p>
           <a:p>
-            <a:pPr marL="285840" indent="-285120">
+            <a:pPr marL="285840" indent="-284760">
               <a:lnSpc>
                 <a:spcPct val="100000"/>
               </a:lnSpc>
@@ -5025,8 +5030,9 @@
                   </a:solidFill>
                 </a:uFill>
                 <a:latin typeface="Corbel"/>
+                <a:ea typeface="DejaVu Sans"/>
               </a:rPr>
-              <a:t>Social media parameters research documentation as per client’s request</a:t>
+              <a:t>Meeting with Telesure (our client’s client) – Telesure made major changes to the scope of our project which led to a slightly different approach</a:t>
             </a:r>
             <a:endParaRPr b="0" lang="en-ZA" sz="1800" spc="-1" strike="noStrike">
               <a:solidFill>
@@ -5041,7 +5047,7 @@
             </a:endParaRPr>
           </a:p>
           <a:p>
-            <a:pPr marL="285840" indent="-285120">
+            <a:pPr marL="285840" indent="-284760">
               <a:lnSpc>
                 <a:spcPct val="100000"/>
               </a:lnSpc>
@@ -5063,6 +5069,7 @@
                   </a:solidFill>
                 </a:uFill>
                 <a:latin typeface="Corbel"/>
+                <a:ea typeface="DejaVu Sans"/>
               </a:rPr>
               <a:t>Sprint planning meeting to discuss project changes</a:t>
             </a:r>
@@ -5079,7 +5086,7 @@
             </a:endParaRPr>
           </a:p>
           <a:p>
-            <a:pPr marL="285840" indent="-285120">
+            <a:pPr marL="285840" indent="-284760">
               <a:lnSpc>
                 <a:spcPct val="100000"/>
               </a:lnSpc>
@@ -5101,8 +5108,9 @@
                   </a:solidFill>
                 </a:uFill>
                 <a:latin typeface="Corbel"/>
+                <a:ea typeface="DejaVu Sans"/>
               </a:rPr>
-              <a:t>Follow up meeting after completion of previous sprint and to receive next sprint backlog</a:t>
+              <a:t>Collaborative pair programming for 5 days as a team in one location</a:t>
             </a:r>
             <a:endParaRPr b="0" lang="en-ZA" sz="1800" spc="-1" strike="noStrike">
               <a:solidFill>
@@ -5117,7 +5125,7 @@
             </a:endParaRPr>
           </a:p>
           <a:p>
-            <a:pPr marL="285840" indent="-285120">
+            <a:pPr marL="285840" indent="-284760">
               <a:lnSpc>
                 <a:spcPct val="100000"/>
               </a:lnSpc>
@@ -5139,8 +5147,9 @@
                   </a:solidFill>
                 </a:uFill>
                 <a:latin typeface="Corbel"/>
+                <a:ea typeface="DejaVu Sans"/>
               </a:rPr>
-              <a:t>Collaborative pair programming for 5 days as a team in one location</a:t>
+              <a:t>Weight estimation of sprint backlog </a:t>
             </a:r>
             <a:endParaRPr b="0" lang="en-ZA" sz="1800" spc="-1" strike="noStrike">
               <a:solidFill>
@@ -5155,7 +5164,7 @@
             </a:endParaRPr>
           </a:p>
           <a:p>
-            <a:pPr marL="285840" indent="-285120">
+            <a:pPr marL="285840" indent="-284760">
               <a:lnSpc>
                 <a:spcPct val="100000"/>
               </a:lnSpc>
@@ -5177,8 +5186,9 @@
                   </a:solidFill>
                 </a:uFill>
                 <a:latin typeface="Corbel"/>
+                <a:ea typeface="DejaVu Sans"/>
               </a:rPr>
-              <a:t>Weight estimation of sprint backlog </a:t>
+              <a:t>Follow up meeting after completion of previous sprint and to receive next sprint backlog</a:t>
             </a:r>
             <a:endParaRPr b="0" lang="en-ZA" sz="1800" spc="-1" strike="noStrike">
               <a:solidFill>
@@ -5193,7 +5203,7 @@
             </a:endParaRPr>
           </a:p>
           <a:p>
-            <a:pPr marL="285840" indent="-285120">
+            <a:pPr marL="285840" indent="-284760">
               <a:lnSpc>
                 <a:spcPct val="100000"/>
               </a:lnSpc>
@@ -5215,6 +5225,7 @@
                   </a:solidFill>
                 </a:uFill>
                 <a:latin typeface="Corbel"/>
+                <a:ea typeface="DejaVu Sans"/>
               </a:rPr>
               <a:t>Multiple stand up meetings per day </a:t>
             </a:r>
@@ -5290,7 +5301,7 @@
         <p:spPr>
           <a:xfrm>
             <a:off x="1484280" y="158400"/>
-            <a:ext cx="10018080" cy="1751760"/>
+            <a:ext cx="10017720" cy="1751400"/>
           </a:xfrm>
           <a:prstGeom prst="rect">
             <a:avLst/>
@@ -5320,6 +5331,7 @@
                   </a:solidFill>
                 </a:uFill>
                 <a:latin typeface="Corbel"/>
+                <a:ea typeface="DejaVu Sans"/>
               </a:rPr>
               <a:t>Agile board:</a:t>
             </a:r>
@@ -5364,7 +5376,7 @@
         <p:spPr>
           <a:xfrm>
             <a:off x="1484280" y="2666880"/>
-            <a:ext cx="10018080" cy="3123360"/>
+            <a:ext cx="10017720" cy="3123000"/>
           </a:xfrm>
           <a:prstGeom prst="rect">
             <a:avLst/>
@@ -5383,7 +5395,7 @@
         <p:txBody>
           <a:bodyPr lIns="90000" rIns="90000" tIns="45000" bIns="45000" anchor="ctr"/>
           <a:p>
-            <a:pPr marL="285840" indent="-285120">
+            <a:pPr marL="285840" indent="-284760">
               <a:lnSpc>
                 <a:spcPct val="100000"/>
               </a:lnSpc>
@@ -5405,6 +5417,7 @@
                   </a:solidFill>
                 </a:uFill>
                 <a:latin typeface="Corbel"/>
+                <a:ea typeface="DejaVu Sans"/>
               </a:rPr>
               <a:t>*insert waffle board*</a:t>
             </a:r>
@@ -5453,7 +5466,7 @@
         <p:spPr>
           <a:xfrm>
             <a:off x="216000" y="360000"/>
-            <a:ext cx="11833200" cy="5846400"/>
+            <a:ext cx="11832840" cy="5846040"/>
           </a:xfrm>
           <a:prstGeom prst="rect">
             <a:avLst/>
@@ -5521,7 +5534,7 @@
         <p:spPr>
           <a:xfrm>
             <a:off x="3911400" y="199800"/>
-            <a:ext cx="4698360" cy="442080"/>
+            <a:ext cx="4698000" cy="441720"/>
           </a:xfrm>
           <a:prstGeom prst="rect">
             <a:avLst/>
@@ -5556,6 +5569,7 @@
                   </a:solidFill>
                 </a:uFill>
                 <a:latin typeface="Corbel"/>
+                <a:ea typeface="DejaVu Sans"/>
               </a:rPr>
               <a:t>Sprint #1</a:t>
             </a:r>
@@ -5587,7 +5601,7 @@
         <p:spPr>
           <a:xfrm>
             <a:off x="1259640" y="807480"/>
-            <a:ext cx="10001160" cy="5939280"/>
+            <a:ext cx="10000800" cy="5938920"/>
           </a:xfrm>
           <a:prstGeom prst="rect">
             <a:avLst/>
@@ -5655,7 +5669,7 @@
         <p:spPr>
           <a:xfrm>
             <a:off x="1484280" y="2666880"/>
-            <a:ext cx="10018080" cy="3123360"/>
+            <a:ext cx="10017720" cy="3123000"/>
           </a:xfrm>
           <a:prstGeom prst="rect">
             <a:avLst/>
@@ -5674,7 +5688,7 @@
         <p:txBody>
           <a:bodyPr lIns="90000" rIns="90000" tIns="45000" bIns="45000" anchor="ctr"/>
           <a:p>
-            <a:pPr marL="285840" indent="-285120">
+            <a:pPr marL="285840" indent="-284760">
               <a:lnSpc>
                 <a:spcPct val="100000"/>
               </a:lnSpc>
@@ -5696,6 +5710,7 @@
                   </a:solidFill>
                 </a:uFill>
                 <a:latin typeface="Corbel"/>
+                <a:ea typeface="DejaVu Sans"/>
               </a:rPr>
               <a:t>*insert burndown of 2*</a:t>
             </a:r>
@@ -5722,7 +5737,7 @@
         <p:spPr>
           <a:xfrm>
             <a:off x="3530520" y="216360"/>
-            <a:ext cx="5459400" cy="590400"/>
+            <a:ext cx="5459040" cy="590040"/>
           </a:xfrm>
           <a:prstGeom prst="rect">
             <a:avLst/>
@@ -5837,7 +5852,7 @@
         <p:spPr>
           <a:xfrm>
             <a:off x="288000" y="288000"/>
-            <a:ext cx="11496600" cy="6479640"/>
+            <a:ext cx="11496240" cy="6479280"/>
           </a:xfrm>
           <a:prstGeom prst="rect">
             <a:avLst/>
@@ -5904,8 +5919,8 @@
         </p:nvSpPr>
         <p:spPr>
           <a:xfrm>
-            <a:off x="1484280" y="685800"/>
-            <a:ext cx="10018080" cy="1751760"/>
+            <a:off x="1368000" y="288000"/>
+            <a:ext cx="10017720" cy="1751400"/>
           </a:xfrm>
           <a:prstGeom prst="rect">
             <a:avLst/>
@@ -5935,6 +5950,7 @@
                   </a:solidFill>
                 </a:uFill>
                 <a:latin typeface="Corbel"/>
+                <a:ea typeface="DejaVu Sans"/>
               </a:rPr>
               <a:t>List of features added in past sprints</a:t>
             </a:r>
@@ -5978,8 +5994,8 @@
         </p:nvSpPr>
         <p:spPr>
           <a:xfrm>
-            <a:off x="1484280" y="2438280"/>
-            <a:ext cx="10018080" cy="3351960"/>
+            <a:off x="1224000" y="2016000"/>
+            <a:ext cx="10017720" cy="3351600"/>
           </a:xfrm>
           <a:prstGeom prst="rect">
             <a:avLst/>
@@ -5998,7 +6014,7 @@
         <p:txBody>
           <a:bodyPr lIns="90000" rIns="90000" tIns="45000" bIns="45000" anchor="ctr"/>
           <a:p>
-            <a:pPr marL="285840" indent="-285120">
+            <a:pPr marL="285840" indent="-284760">
               <a:lnSpc>
                 <a:spcPct val="100000"/>
               </a:lnSpc>
@@ -6020,8 +6036,9 @@
                   </a:solidFill>
                 </a:uFill>
                 <a:latin typeface="Corbel"/>
+                <a:ea typeface="DejaVu Sans"/>
               </a:rPr>
-              <a:t>Database integration via Sequelize using postgresql</a:t>
+              <a:t>Database integration via Sequelize using Postgresql including deployment and development configurations</a:t>
             </a:r>
             <a:endParaRPr b="0" lang="en-ZA" sz="1800" spc="-1" strike="noStrike">
               <a:solidFill>
@@ -6036,7 +6053,7 @@
             </a:endParaRPr>
           </a:p>
           <a:p>
-            <a:pPr marL="285840" indent="-285120">
+            <a:pPr marL="285840" indent="-284760">
               <a:lnSpc>
                 <a:spcPct val="100000"/>
               </a:lnSpc>
@@ -6058,8 +6075,9 @@
                   </a:solidFill>
                 </a:uFill>
                 <a:latin typeface="Corbel"/>
+                <a:ea typeface="DejaVu Sans"/>
               </a:rPr>
-              <a:t>Lead ad ( Kevin explanation… pages,ads etc)</a:t>
+              <a:t>Sign in with Facebook to get permissions to manage the analyst’s Facebook pages linked with the specific advertisment</a:t>
             </a:r>
             <a:endParaRPr b="0" lang="en-ZA" sz="1800" spc="-1" strike="noStrike">
               <a:solidFill>
@@ -6074,7 +6092,7 @@
             </a:endParaRPr>
           </a:p>
           <a:p>
-            <a:pPr marL="285840" indent="-285120">
+            <a:pPr marL="285840" indent="-284760">
               <a:lnSpc>
                 <a:spcPct val="100000"/>
               </a:lnSpc>
@@ -6096,8 +6114,9 @@
                   </a:solidFill>
                 </a:uFill>
                 <a:latin typeface="Corbel"/>
+                <a:ea typeface="DejaVu Sans"/>
               </a:rPr>
-              <a:t>Implementation of RESTful API for front-end Angular and backend API calls</a:t>
+              <a:t>This data is saved in our Pages model, thereafter Facebook sends through the Lead ad id to initialize the Advertisement. </a:t>
             </a:r>
             <a:endParaRPr b="0" lang="en-ZA" sz="1800" spc="-1" strike="noStrike">
               <a:solidFill>
@@ -6112,7 +6131,7 @@
             </a:endParaRPr>
           </a:p>
           <a:p>
-            <a:pPr marL="285840" indent="-285120">
+            <a:pPr marL="285840" indent="-284760">
               <a:lnSpc>
                 <a:spcPct val="100000"/>
               </a:lnSpc>
@@ -6134,8 +6153,9 @@
                   </a:solidFill>
                 </a:uFill>
                 <a:latin typeface="Corbel"/>
+                <a:ea typeface="DejaVu Sans"/>
               </a:rPr>
-              <a:t>Integration of the testing framework Mocha with some route unit tests? -- edit...</a:t>
+              <a:t>A user will fill in the Lead ad and a lead id will be sent through to our api. A call to Facebook’s graph api will be called to get the filled in form data and saved in our User model</a:t>
             </a:r>
             <a:endParaRPr b="0" lang="en-ZA" sz="1800" spc="-1" strike="noStrike">
               <a:solidFill>
@@ -6150,7 +6170,178 @@
             </a:endParaRPr>
           </a:p>
           <a:p>
-            <a:pPr marL="285840" indent="-285120">
+            <a:pPr>
+              <a:lnSpc>
+                <a:spcPct val="100000"/>
+              </a:lnSpc>
+            </a:pPr>
+            <a:endParaRPr b="0" lang="en-ZA" sz="1800" spc="-1" strike="noStrike">
+              <a:solidFill>
+                <a:srgbClr val="000000"/>
+              </a:solidFill>
+              <a:uFill>
+                <a:solidFill>
+                  <a:srgbClr val="ffffff"/>
+                </a:solidFill>
+              </a:uFill>
+              <a:latin typeface="Arial"/>
+            </a:endParaRPr>
+          </a:p>
+        </p:txBody>
+      </p:sp>
+    </p:spTree>
+  </p:cSld>
+  <p:timing>
+    <p:tnLst>
+      <p:par>
+        <p:cTn id="13" dur="indefinite" restart="never" nodeType="tmRoot">
+          <p:childTnLst>
+            <p:seq>
+              <p:cTn id="14" nodeType="mainSeq"/>
+              <p:prevCondLst>
+                <p:cond delay="0" evt="onPrev">
+                  <p:tgtEl>
+                    <p:sldTgt/>
+                  </p:tgtEl>
+                </p:cond>
+              </p:prevCondLst>
+              <p:nextCondLst>
+                <p:cond delay="0" evt="onNext">
+                  <p:tgtEl>
+                    <p:sldTgt/>
+                  </p:tgtEl>
+                </p:cond>
+              </p:nextCondLst>
+            </p:seq>
+          </p:childTnLst>
+        </p:cTn>
+      </p:par>
+    </p:tnLst>
+  </p:timing>
+</p:sld>
+</file>
+
+<file path=ppt/slides/slide8.xml><?xml version="1.0" encoding="utf-8"?>
+<p:sld xmlns:a="http://schemas.openxmlformats.org/drawingml/2006/main" xmlns:p="http://schemas.openxmlformats.org/presentationml/2006/main" xmlns:r="http://schemas.openxmlformats.org/officeDocument/2006/relationships" xmlns:p14="http://schemas.microsoft.com/office/powerpoint/2010/main" xmlns:p15="http://schemas.microsoft.com/office/powerpoint/2012/main" xmlns:mc="http://schemas.openxmlformats.org/markup-compatibility/2006">
+  <p:cSld>
+    <p:spTree>
+      <p:nvGrpSpPr>
+        <p:cNvPr id="1" name=""/>
+        <p:cNvGrpSpPr/>
+        <p:nvPr/>
+      </p:nvGrpSpPr>
+      <p:grpSpPr>
+        <a:xfrm>
+          <a:off x="0" y="0"/>
+          <a:ext cx="0" cy="0"/>
+          <a:chOff x="0" y="0"/>
+          <a:chExt cx="0" cy="0"/>
+        </a:xfrm>
+      </p:grpSpPr>
+      <p:sp>
+        <p:nvSpPr>
+          <p:cNvPr id="104" name="CustomShape 1"/>
+          <p:cNvSpPr/>
+          <p:nvPr/>
+        </p:nvSpPr>
+        <p:spPr>
+          <a:xfrm>
+            <a:off x="1368000" y="288000"/>
+            <a:ext cx="10017720" cy="1751400"/>
+          </a:xfrm>
+          <a:prstGeom prst="rect">
+            <a:avLst/>
+          </a:prstGeom>
+          <a:noFill/>
+          <a:ln>
+            <a:noFill/>
+          </a:ln>
+        </p:spPr>
+        <p:style>
+          <a:lnRef idx="0"/>
+          <a:fillRef idx="0"/>
+          <a:effectRef idx="0"/>
+          <a:fontRef idx="minor"/>
+        </p:style>
+        <p:txBody>
+          <a:bodyPr lIns="90000" rIns="90000" tIns="45000" bIns="45000" anchor="ctr"/>
+          <a:p>
+            <a:r>
+              <a:rPr b="0" lang="en-ZA" sz="4000" spc="-1" strike="noStrike">
+                <a:solidFill>
+                  <a:srgbClr val="000000"/>
+                </a:solidFill>
+                <a:uFill>
+                  <a:solidFill>
+                    <a:srgbClr val="ffffff"/>
+                  </a:solidFill>
+                </a:uFill>
+                <a:latin typeface="Corbel"/>
+                <a:ea typeface="DejaVu Sans"/>
+              </a:rPr>
+              <a:t>List of features added in past sprints</a:t>
+            </a:r>
+            <a:endParaRPr b="0" lang="en-ZA" sz="1800" spc="-1" strike="noStrike">
+              <a:solidFill>
+                <a:srgbClr val="000000"/>
+              </a:solidFill>
+              <a:uFill>
+                <a:solidFill>
+                  <a:srgbClr val="ffffff"/>
+                </a:solidFill>
+              </a:uFill>
+              <a:latin typeface="Arial"/>
+            </a:endParaRPr>
+          </a:p>
+          <a:p>
+            <a:pPr algn="ctr">
+              <a:lnSpc>
+                <a:spcPct val="100000"/>
+              </a:lnSpc>
+            </a:pPr>
+            <a:endParaRPr b="0" lang="en-ZA" sz="1800" spc="-1" strike="noStrike">
+              <a:solidFill>
+                <a:srgbClr val="000000"/>
+              </a:solidFill>
+              <a:uFill>
+                <a:solidFill>
+                  <a:srgbClr val="ffffff"/>
+                </a:solidFill>
+              </a:uFill>
+              <a:latin typeface="Arial"/>
+            </a:endParaRPr>
+          </a:p>
+        </p:txBody>
+      </p:sp>
+      <p:sp>
+        <p:nvSpPr>
+          <p:cNvPr id="105" name="CustomShape 2"/>
+          <p:cNvSpPr/>
+          <p:nvPr/>
+        </p:nvSpPr>
+        <p:spPr>
+          <a:xfrm>
+            <a:off x="1296000" y="1760400"/>
+            <a:ext cx="10017720" cy="3351600"/>
+          </a:xfrm>
+          <a:prstGeom prst="rect">
+            <a:avLst/>
+          </a:prstGeom>
+          <a:noFill/>
+          <a:ln>
+            <a:noFill/>
+          </a:ln>
+        </p:spPr>
+        <p:style>
+          <a:lnRef idx="0"/>
+          <a:fillRef idx="0"/>
+          <a:effectRef idx="0"/>
+          <a:fontRef idx="minor"/>
+        </p:style>
+        <p:txBody>
+          <a:bodyPr lIns="90000" rIns="90000" tIns="45000" bIns="45000" anchor="ctr"/>
+          <a:p>
+            <a:pPr marL="285840" indent="-284760">
               <a:lnSpc>
                 <a:spcPct val="100000"/>
               </a:lnSpc>
@@ -6172,8 +6363,9 @@
                   </a:solidFill>
                 </a:uFill>
                 <a:latin typeface="Corbel"/>
+                <a:ea typeface="DejaVu Sans"/>
               </a:rPr>
-              <a:t>Implementation of email functionality</a:t>
+              <a:t> </a:t>
             </a:r>
             <a:endParaRPr b="0" lang="en-ZA" sz="1800" spc="-1" strike="noStrike">
               <a:solidFill>
@@ -6188,7 +6380,7 @@
             </a:endParaRPr>
           </a:p>
           <a:p>
-            <a:pPr marL="285840" indent="-285120">
+            <a:pPr marL="285840" indent="-284760">
               <a:lnSpc>
                 <a:spcPct val="100000"/>
               </a:lnSpc>
@@ -6210,8 +6402,9 @@
                   </a:solidFill>
                 </a:uFill>
                 <a:latin typeface="Corbel"/>
+                <a:ea typeface="DejaVu Sans"/>
               </a:rPr>
-              <a:t>Deployment to live server hosted on the Heroku platform</a:t>
+              <a:t>Implementation of RESTful API for front-end Angular and backend API calls</a:t>
             </a:r>
             <a:endParaRPr b="0" lang="en-ZA" sz="1800" spc="-1" strike="noStrike">
               <a:solidFill>
@@ -6226,7 +6419,7 @@
             </a:endParaRPr>
           </a:p>
           <a:p>
-            <a:pPr marL="285840" indent="-285120">
+            <a:pPr marL="285840" indent="-284760">
               <a:lnSpc>
                 <a:spcPct val="100000"/>
               </a:lnSpc>
@@ -6248,8 +6441,9 @@
                   </a:solidFill>
                 </a:uFill>
                 <a:latin typeface="Corbel"/>
+                <a:ea typeface="DejaVu Sans"/>
               </a:rPr>
-              <a:t>Version control branching </a:t>
+              <a:t>Integration of the testing framework Mocha with some route functionality tests</a:t>
             </a:r>
             <a:endParaRPr b="0" lang="en-ZA" sz="1800" spc="-1" strike="noStrike">
               <a:solidFill>
@@ -6264,7 +6458,7 @@
             </a:endParaRPr>
           </a:p>
           <a:p>
-            <a:pPr marL="285840" indent="-285120">
+            <a:pPr marL="285840" indent="-284760">
               <a:lnSpc>
                 <a:spcPct val="100000"/>
               </a:lnSpc>
@@ -6286,8 +6480,126 @@
                   </a:solidFill>
                 </a:uFill>
                 <a:latin typeface="Corbel"/>
+                <a:ea typeface="DejaVu Sans"/>
               </a:rPr>
-              <a:t>Update of Functional requirements document (added use cases etc.. (Quinton))</a:t>
+              <a:t>Implementation of email functionality</a:t>
+            </a:r>
+            <a:endParaRPr b="0" lang="en-ZA" sz="1800" spc="-1" strike="noStrike">
+              <a:solidFill>
+                <a:srgbClr val="000000"/>
+              </a:solidFill>
+              <a:uFill>
+                <a:solidFill>
+                  <a:srgbClr val="ffffff"/>
+                </a:solidFill>
+              </a:uFill>
+              <a:latin typeface="Arial"/>
+            </a:endParaRPr>
+          </a:p>
+          <a:p>
+            <a:pPr marL="285840" indent="-284760">
+              <a:lnSpc>
+                <a:spcPct val="100000"/>
+              </a:lnSpc>
+              <a:buClr>
+                <a:srgbClr val="1287c3"/>
+              </a:buClr>
+              <a:buSzPct val="145000"/>
+              <a:buFont typeface="Arial"/>
+              <a:buChar char="•"/>
+            </a:pPr>
+            <a:r>
+              <a:rPr b="0" lang="en-ZA" sz="2400" spc="-1" strike="noStrike">
+                <a:solidFill>
+                  <a:srgbClr val="000000"/>
+                </a:solidFill>
+                <a:uFill>
+                  <a:solidFill>
+                    <a:srgbClr val="ffffff"/>
+                  </a:solidFill>
+                </a:uFill>
+                <a:latin typeface="Corbel"/>
+                <a:ea typeface="DejaVu Sans"/>
+              </a:rPr>
+              <a:t>Deployment to live server hosted on the Heroku platform</a:t>
+            </a:r>
+            <a:endParaRPr b="0" lang="en-ZA" sz="1800" spc="-1" strike="noStrike">
+              <a:solidFill>
+                <a:srgbClr val="000000"/>
+              </a:solidFill>
+              <a:uFill>
+                <a:solidFill>
+                  <a:srgbClr val="ffffff"/>
+                </a:solidFill>
+              </a:uFill>
+              <a:latin typeface="Arial"/>
+            </a:endParaRPr>
+          </a:p>
+          <a:p>
+            <a:pPr marL="285840" indent="-284760">
+              <a:lnSpc>
+                <a:spcPct val="100000"/>
+              </a:lnSpc>
+              <a:buClr>
+                <a:srgbClr val="1287c3"/>
+              </a:buClr>
+              <a:buSzPct val="145000"/>
+              <a:buFont typeface="Arial"/>
+              <a:buChar char="•"/>
+            </a:pPr>
+            <a:r>
+              <a:rPr b="0" lang="en-ZA" sz="2400" spc="-1" strike="noStrike">
+                <a:solidFill>
+                  <a:srgbClr val="000000"/>
+                </a:solidFill>
+                <a:uFill>
+                  <a:solidFill>
+                    <a:srgbClr val="ffffff"/>
+                  </a:solidFill>
+                </a:uFill>
+                <a:latin typeface="Corbel"/>
+                <a:ea typeface="DejaVu Sans"/>
+              </a:rPr>
+              <a:t>Version control branching </a:t>
+            </a:r>
+            <a:endParaRPr b="0" lang="en-ZA" sz="1800" spc="-1" strike="noStrike">
+              <a:solidFill>
+                <a:srgbClr val="000000"/>
+              </a:solidFill>
+              <a:uFill>
+                <a:solidFill>
+                  <a:srgbClr val="ffffff"/>
+                </a:solidFill>
+              </a:uFill>
+              <a:latin typeface="Arial"/>
+            </a:endParaRPr>
+          </a:p>
+          <a:p>
+            <a:pPr marL="285840" indent="-284760">
+              <a:lnSpc>
+                <a:spcPct val="100000"/>
+              </a:lnSpc>
+              <a:buClr>
+                <a:srgbClr val="1287c3"/>
+              </a:buClr>
+              <a:buSzPct val="145000"/>
+              <a:buFont typeface="Arial"/>
+              <a:buChar char="•"/>
+            </a:pPr>
+            <a:r>
+              <a:rPr b="0" lang="en-ZA" sz="2400" spc="-1" strike="noStrike">
+                <a:solidFill>
+                  <a:srgbClr val="000000"/>
+                </a:solidFill>
+                <a:uFill>
+                  <a:solidFill>
+                    <a:srgbClr val="ffffff"/>
+                  </a:solidFill>
+                </a:uFill>
+                <a:latin typeface="Corbel"/>
+                <a:ea typeface="DejaVu Sans"/>
+              </a:rPr>
+              <a:t>Update of Functional requirements document with uses case, domain model and version changes of document</a:t>
             </a:r>
             <a:endParaRPr b="0" lang="en-ZA" sz="1800" spc="-1" strike="noStrike">
               <a:solidFill>
@@ -6326,10 +6638,10 @@
   <p:timing>
     <p:tnLst>
       <p:par>
-        <p:cTn id="13" dur="indefinite" restart="never" nodeType="tmRoot">
+        <p:cTn id="15" dur="indefinite" restart="never" nodeType="tmRoot">
           <p:childTnLst>
             <p:seq>
-              <p:cTn id="14" nodeType="mainSeq"/>
+              <p:cTn id="16" nodeType="mainSeq"/>
               <p:prevCondLst>
                 <p:cond delay="0" evt="onPrev">
                   <p:tgtEl>

</xml_diff>

<commit_message>
Added burndown or sprint 2
</commit_message>
<xml_diff>
--- a/Documentation/Demo/Demo_02.pptx
+++ b/Documentation/Demo/Demo_02.pptx
@@ -3004,7 +3004,7 @@
         <p:spPr>
           <a:xfrm>
             <a:off x="457200" y="0"/>
-            <a:ext cx="1121400" cy="5328000"/>
+            <a:ext cx="1121040" cy="5327640"/>
           </a:xfrm>
           <a:custGeom>
             <a:avLst/>
@@ -3055,7 +3055,7 @@
         <p:spPr>
           <a:xfrm>
             <a:off x="150840" y="0"/>
-            <a:ext cx="1116360" cy="5275800"/>
+            <a:ext cx="1116000" cy="5275440"/>
           </a:xfrm>
           <a:custGeom>
             <a:avLst/>
@@ -3109,7 +3109,7 @@
         <p:spPr>
           <a:xfrm>
             <a:off x="150840" y="5238720"/>
-            <a:ext cx="1227600" cy="1618200"/>
+            <a:ext cx="1227240" cy="1617840"/>
           </a:xfrm>
           <a:custGeom>
             <a:avLst/>
@@ -3160,7 +3160,7 @@
         <p:spPr>
           <a:xfrm>
             <a:off x="457200" y="5291280"/>
-            <a:ext cx="1494360" cy="1565640"/>
+            <a:ext cx="1494000" cy="1565280"/>
           </a:xfrm>
           <a:custGeom>
             <a:avLst/>
@@ -3210,7 +3210,7 @@
         <p:spPr>
           <a:xfrm>
             <a:off x="457200" y="5286240"/>
-            <a:ext cx="2129400" cy="1570680"/>
+            <a:ext cx="2129040" cy="1570320"/>
           </a:xfrm>
           <a:custGeom>
             <a:avLst/>
@@ -3266,7 +3266,7 @@
         <p:spPr>
           <a:xfrm>
             <a:off x="150840" y="5238720"/>
-            <a:ext cx="1694520" cy="1618200"/>
+            <a:ext cx="1694160" cy="1617840"/>
           </a:xfrm>
           <a:custGeom>
             <a:avLst/>
@@ -3335,7 +3335,7 @@
         <p:spPr>
           <a:xfrm>
             <a:off x="984240" y="-4680"/>
-            <a:ext cx="1062720" cy="2781720"/>
+            <a:ext cx="1062360" cy="2781360"/>
           </a:xfrm>
           <a:custGeom>
             <a:avLst/>
@@ -3386,7 +3386,7 @@
         <p:spPr>
           <a:xfrm>
             <a:off x="546120" y="-4680"/>
-            <a:ext cx="1033920" cy="2672280"/>
+            <a:ext cx="1033560" cy="2671920"/>
           </a:xfrm>
           <a:custGeom>
             <a:avLst/>
@@ -3443,7 +3443,7 @@
         <p:spPr>
           <a:xfrm>
             <a:off x="546120" y="2583000"/>
-            <a:ext cx="2692800" cy="4273920"/>
+            <a:ext cx="2692440" cy="4273560"/>
           </a:xfrm>
           <a:custGeom>
             <a:avLst/>
@@ -3494,7 +3494,7 @@
         <p:spPr>
           <a:xfrm>
             <a:off x="988920" y="2692440"/>
-            <a:ext cx="3331080" cy="4164480"/>
+            <a:ext cx="3330720" cy="4164120"/>
           </a:xfrm>
           <a:custGeom>
             <a:avLst/>
@@ -3544,7 +3544,7 @@
         <p:spPr>
           <a:xfrm>
             <a:off x="984240" y="2687760"/>
-            <a:ext cx="4575600" cy="4169160"/>
+            <a:ext cx="4575240" cy="4168800"/>
           </a:xfrm>
           <a:custGeom>
             <a:avLst/>
@@ -3600,7 +3600,7 @@
         <p:spPr>
           <a:xfrm>
             <a:off x="546120" y="2577960"/>
-            <a:ext cx="3583440" cy="4278960"/>
+            <a:ext cx="3583080" cy="4278600"/>
           </a:xfrm>
           <a:custGeom>
             <a:avLst/>
@@ -3667,7 +3667,7 @@
         <p:spPr>
           <a:xfrm>
             <a:off x="609480" y="273600"/>
-            <a:ext cx="10972080" cy="1144440"/>
+            <a:ext cx="10972440" cy="1144800"/>
           </a:xfrm>
           <a:prstGeom prst="rect">
             <a:avLst/>
@@ -3677,6 +3677,20 @@
           <a:bodyPr lIns="0" rIns="0" tIns="0" bIns="0" anchor="ctr"/>
           <a:p>
             <a:pPr algn="ctr"/>
+            <a:r>
+              <a:rPr b="0" lang="en-ZA" sz="4400" spc="-1" strike="noStrike">
+                <a:solidFill>
+                  <a:srgbClr val="000000"/>
+                </a:solidFill>
+                <a:uFill>
+                  <a:solidFill>
+                    <a:srgbClr val="ffffff"/>
+                  </a:solidFill>
+                </a:uFill>
+                <a:latin typeface="Arial"/>
+              </a:rPr>
+              <a:t>Click to edit the title text format</a:t>
+            </a:r>
             <a:endParaRPr b="0" lang="en-ZA" sz="4400" spc="-1" strike="noStrike">
               <a:solidFill>
                 <a:srgbClr val="000000"/>
@@ -3704,7 +3718,7 @@
         <p:spPr>
           <a:xfrm>
             <a:off x="609480" y="1604520"/>
-            <a:ext cx="10972080" cy="3976920"/>
+            <a:ext cx="10972440" cy="3977280"/>
           </a:xfrm>
           <a:prstGeom prst="rect">
             <a:avLst/>
@@ -3722,7 +3736,7 @@
               <a:buChar char=""/>
             </a:pPr>
             <a:r>
-              <a:rPr b="0" lang="en-ZA" sz="1800" spc="-1" strike="noStrike">
+              <a:rPr b="0" lang="en-ZA" sz="3200" spc="-1" strike="noStrike">
                 <a:solidFill>
                   <a:srgbClr val="000000"/>
                 </a:solidFill>
@@ -3735,7 +3749,7 @@
               </a:rPr>
               <a:t>Click to edit the outline text format</a:t>
             </a:r>
-            <a:endParaRPr b="0" lang="en-ZA" sz="1800" spc="-1" strike="noStrike">
+            <a:endParaRPr b="0" lang="en-ZA" sz="3200" spc="-1" strike="noStrike">
               <a:solidFill>
                 <a:srgbClr val="000000"/>
               </a:solidFill>
@@ -3757,7 +3771,7 @@
               <a:buChar char=""/>
             </a:pPr>
             <a:r>
-              <a:rPr b="0" lang="en-ZA" sz="1800" spc="-1" strike="noStrike">
+              <a:rPr b="0" lang="en-ZA" sz="2800" spc="-1" strike="noStrike">
                 <a:solidFill>
                   <a:srgbClr val="000000"/>
                 </a:solidFill>
@@ -3770,7 +3784,7 @@
               </a:rPr>
               <a:t>Second Outline Level</a:t>
             </a:r>
-            <a:endParaRPr b="0" lang="en-ZA" sz="1800" spc="-1" strike="noStrike">
+            <a:endParaRPr b="0" lang="en-ZA" sz="2800" spc="-1" strike="noStrike">
               <a:solidFill>
                 <a:srgbClr val="000000"/>
               </a:solidFill>
@@ -3792,7 +3806,7 @@
               <a:buChar char=""/>
             </a:pPr>
             <a:r>
-              <a:rPr b="0" lang="en-ZA" sz="1800" spc="-1" strike="noStrike">
+              <a:rPr b="0" lang="en-ZA" sz="2400" spc="-1" strike="noStrike">
                 <a:solidFill>
                   <a:srgbClr val="000000"/>
                 </a:solidFill>
@@ -3805,7 +3819,7 @@
               </a:rPr>
               <a:t>Third Outline Level</a:t>
             </a:r>
-            <a:endParaRPr b="0" lang="en-ZA" sz="1800" spc="-1" strike="noStrike">
+            <a:endParaRPr b="0" lang="en-ZA" sz="2400" spc="-1" strike="noStrike">
               <a:solidFill>
                 <a:srgbClr val="000000"/>
               </a:solidFill>
@@ -3827,7 +3841,7 @@
               <a:buChar char=""/>
             </a:pPr>
             <a:r>
-              <a:rPr b="0" lang="en-ZA" sz="1800" spc="-1" strike="noStrike">
+              <a:rPr b="0" lang="en-ZA" sz="2000" spc="-1" strike="noStrike">
                 <a:solidFill>
                   <a:srgbClr val="000000"/>
                 </a:solidFill>
@@ -3840,7 +3854,7 @@
               </a:rPr>
               <a:t>Fourth Outline Level</a:t>
             </a:r>
-            <a:endParaRPr b="0" lang="en-ZA" sz="1800" spc="-1" strike="noStrike">
+            <a:endParaRPr b="0" lang="en-ZA" sz="2000" spc="-1" strike="noStrike">
               <a:solidFill>
                 <a:srgbClr val="000000"/>
               </a:solidFill>
@@ -3862,7 +3876,7 @@
               <a:buChar char=""/>
             </a:pPr>
             <a:r>
-              <a:rPr b="0" lang="en-ZA" sz="1800" spc="-1" strike="noStrike">
+              <a:rPr b="0" lang="en-ZA" sz="2000" spc="-1" strike="noStrike">
                 <a:solidFill>
                   <a:srgbClr val="000000"/>
                 </a:solidFill>
@@ -3875,7 +3889,7 @@
               </a:rPr>
               <a:t>Fifth Outline Level</a:t>
             </a:r>
-            <a:endParaRPr b="0" lang="en-ZA" sz="1800" spc="-1" strike="noStrike">
+            <a:endParaRPr b="0" lang="en-ZA" sz="2000" spc="-1" strike="noStrike">
               <a:solidFill>
                 <a:srgbClr val="000000"/>
               </a:solidFill>
@@ -3897,7 +3911,7 @@
               <a:buChar char=""/>
             </a:pPr>
             <a:r>
-              <a:rPr b="0" lang="en-ZA" sz="1800" spc="-1" strike="noStrike">
+              <a:rPr b="0" lang="en-ZA" sz="2000" spc="-1" strike="noStrike">
                 <a:solidFill>
                   <a:srgbClr val="000000"/>
                 </a:solidFill>
@@ -3910,7 +3924,7 @@
               </a:rPr>
               <a:t>Sixth Outline Level</a:t>
             </a:r>
-            <a:endParaRPr b="0" lang="en-ZA" sz="1800" spc="-1" strike="noStrike">
+            <a:endParaRPr b="0" lang="en-ZA" sz="2000" spc="-1" strike="noStrike">
               <a:solidFill>
                 <a:srgbClr val="000000"/>
               </a:solidFill>
@@ -3932,7 +3946,7 @@
               <a:buChar char=""/>
             </a:pPr>
             <a:r>
-              <a:rPr b="0" lang="en-ZA" sz="1800" spc="-1" strike="noStrike">
+              <a:rPr b="0" lang="en-ZA" sz="2000" spc="-1" strike="noStrike">
                 <a:solidFill>
                   <a:srgbClr val="000000"/>
                 </a:solidFill>
@@ -3945,7 +3959,7 @@
               </a:rPr>
               <a:t>Seventh Outline Level</a:t>
             </a:r>
-            <a:endParaRPr b="0" lang="en-ZA" sz="1800" spc="-1" strike="noStrike">
+            <a:endParaRPr b="0" lang="en-ZA" sz="2000" spc="-1" strike="noStrike">
               <a:solidFill>
                 <a:srgbClr val="000000"/>
               </a:solidFill>
@@ -4015,7 +4029,7 @@
         <p:spPr>
           <a:xfrm>
             <a:off x="457200" y="0"/>
-            <a:ext cx="1121400" cy="5328000"/>
+            <a:ext cx="1121040" cy="5327640"/>
           </a:xfrm>
           <a:custGeom>
             <a:avLst/>
@@ -4066,7 +4080,7 @@
         <p:spPr>
           <a:xfrm>
             <a:off x="150840" y="0"/>
-            <a:ext cx="1116360" cy="5275800"/>
+            <a:ext cx="1116000" cy="5275440"/>
           </a:xfrm>
           <a:custGeom>
             <a:avLst/>
@@ -4120,7 +4134,7 @@
         <p:spPr>
           <a:xfrm>
             <a:off x="150840" y="5238720"/>
-            <a:ext cx="1227600" cy="1618200"/>
+            <a:ext cx="1227240" cy="1617840"/>
           </a:xfrm>
           <a:custGeom>
             <a:avLst/>
@@ -4171,7 +4185,7 @@
         <p:spPr>
           <a:xfrm>
             <a:off x="457200" y="5291280"/>
-            <a:ext cx="1494360" cy="1565640"/>
+            <a:ext cx="1494000" cy="1565280"/>
           </a:xfrm>
           <a:custGeom>
             <a:avLst/>
@@ -4221,7 +4235,7 @@
         <p:spPr>
           <a:xfrm>
             <a:off x="457200" y="5286240"/>
-            <a:ext cx="2129400" cy="1570680"/>
+            <a:ext cx="2129040" cy="1570320"/>
           </a:xfrm>
           <a:custGeom>
             <a:avLst/>
@@ -4277,7 +4291,7 @@
         <p:spPr>
           <a:xfrm>
             <a:off x="150840" y="5238720"/>
-            <a:ext cx="1694520" cy="1618200"/>
+            <a:ext cx="1694160" cy="1617840"/>
           </a:xfrm>
           <a:custGeom>
             <a:avLst/>
@@ -4702,7 +4716,7 @@
         <p:spPr>
           <a:xfrm>
             <a:off x="2928240" y="1380240"/>
-            <a:ext cx="8573400" cy="2615040"/>
+            <a:ext cx="8573040" cy="2614680"/>
           </a:xfrm>
           <a:prstGeom prst="rect">
             <a:avLst/>
@@ -4764,7 +4778,7 @@
         <p:spPr>
           <a:xfrm>
             <a:off x="4515480" y="3996360"/>
-            <a:ext cx="6986520" cy="1387440"/>
+            <a:ext cx="6986160" cy="1387080"/>
           </a:xfrm>
           <a:prstGeom prst="rect">
             <a:avLst/>
@@ -4875,7 +4889,7 @@
         <p:spPr>
           <a:xfrm>
             <a:off x="1926360" y="463320"/>
-            <a:ext cx="9133200" cy="960840"/>
+            <a:ext cx="9132840" cy="960480"/>
           </a:xfrm>
           <a:prstGeom prst="rect">
             <a:avLst/>
@@ -4950,7 +4964,7 @@
         <p:spPr>
           <a:xfrm>
             <a:off x="1512000" y="2088000"/>
-            <a:ext cx="10017720" cy="3123000"/>
+            <a:ext cx="10017360" cy="3122640"/>
           </a:xfrm>
           <a:prstGeom prst="rect">
             <a:avLst/>
@@ -4969,7 +4983,7 @@
         <p:txBody>
           <a:bodyPr lIns="90000" rIns="90000" tIns="45000" bIns="45000" anchor="ctr"/>
           <a:p>
-            <a:pPr marL="285840" indent="-284760">
+            <a:pPr marL="285840" indent="-284400">
               <a:lnSpc>
                 <a:spcPct val="100000"/>
               </a:lnSpc>
@@ -5008,7 +5022,7 @@
             </a:endParaRPr>
           </a:p>
           <a:p>
-            <a:pPr marL="285840" indent="-284760">
+            <a:pPr marL="285840" indent="-284400">
               <a:lnSpc>
                 <a:spcPct val="100000"/>
               </a:lnSpc>
@@ -5047,7 +5061,7 @@
             </a:endParaRPr>
           </a:p>
           <a:p>
-            <a:pPr marL="285840" indent="-284760">
+            <a:pPr marL="285840" indent="-284400">
               <a:lnSpc>
                 <a:spcPct val="100000"/>
               </a:lnSpc>
@@ -5086,7 +5100,7 @@
             </a:endParaRPr>
           </a:p>
           <a:p>
-            <a:pPr marL="285840" indent="-284760">
+            <a:pPr marL="285840" indent="-284400">
               <a:lnSpc>
                 <a:spcPct val="100000"/>
               </a:lnSpc>
@@ -5125,7 +5139,7 @@
             </a:endParaRPr>
           </a:p>
           <a:p>
-            <a:pPr marL="285840" indent="-284760">
+            <a:pPr marL="285840" indent="-284400">
               <a:lnSpc>
                 <a:spcPct val="100000"/>
               </a:lnSpc>
@@ -5164,7 +5178,7 @@
             </a:endParaRPr>
           </a:p>
           <a:p>
-            <a:pPr marL="285840" indent="-284760">
+            <a:pPr marL="285840" indent="-284400">
               <a:lnSpc>
                 <a:spcPct val="100000"/>
               </a:lnSpc>
@@ -5203,7 +5217,7 @@
             </a:endParaRPr>
           </a:p>
           <a:p>
-            <a:pPr marL="285840" indent="-284760">
+            <a:pPr marL="285840" indent="-284400">
               <a:lnSpc>
                 <a:spcPct val="100000"/>
               </a:lnSpc>
@@ -5301,7 +5315,7 @@
         <p:spPr>
           <a:xfrm>
             <a:off x="1484280" y="158400"/>
-            <a:ext cx="10017720" cy="1751400"/>
+            <a:ext cx="10017360" cy="1751040"/>
           </a:xfrm>
           <a:prstGeom prst="rect">
             <a:avLst/>
@@ -5376,7 +5390,7 @@
         <p:spPr>
           <a:xfrm>
             <a:off x="1484280" y="2666880"/>
-            <a:ext cx="10017720" cy="3123000"/>
+            <a:ext cx="10017360" cy="3122640"/>
           </a:xfrm>
           <a:prstGeom prst="rect">
             <a:avLst/>
@@ -5395,7 +5409,7 @@
         <p:txBody>
           <a:bodyPr lIns="90000" rIns="90000" tIns="45000" bIns="45000" anchor="ctr"/>
           <a:p>
-            <a:pPr marL="285840" indent="-284760">
+            <a:pPr marL="285840" indent="-284400">
               <a:lnSpc>
                 <a:spcPct val="100000"/>
               </a:lnSpc>
@@ -5466,7 +5480,7 @@
         <p:spPr>
           <a:xfrm>
             <a:off x="216000" y="360000"/>
-            <a:ext cx="11832840" cy="5846040"/>
+            <a:ext cx="11832480" cy="5845680"/>
           </a:xfrm>
           <a:prstGeom prst="rect">
             <a:avLst/>
@@ -5534,7 +5548,7 @@
         <p:spPr>
           <a:xfrm>
             <a:off x="3911400" y="199800"/>
-            <a:ext cx="4698000" cy="441720"/>
+            <a:ext cx="4697640" cy="441360"/>
           </a:xfrm>
           <a:prstGeom prst="rect">
             <a:avLst/>
@@ -5601,7 +5615,7 @@
         <p:spPr>
           <a:xfrm>
             <a:off x="1259640" y="807480"/>
-            <a:ext cx="10000800" cy="5938920"/>
+            <a:ext cx="10000440" cy="5938560"/>
           </a:xfrm>
           <a:prstGeom prst="rect">
             <a:avLst/>
@@ -5669,7 +5683,7 @@
         <p:spPr>
           <a:xfrm>
             <a:off x="1484280" y="2666880"/>
-            <a:ext cx="10017720" cy="3123000"/>
+            <a:ext cx="10017360" cy="3122640"/>
           </a:xfrm>
           <a:prstGeom prst="rect">
             <a:avLst/>
@@ -5685,48 +5699,6 @@
           <a:effectRef idx="0"/>
           <a:fontRef idx="minor"/>
         </p:style>
-        <p:txBody>
-          <a:bodyPr lIns="90000" rIns="90000" tIns="45000" bIns="45000" anchor="ctr"/>
-          <a:p>
-            <a:pPr marL="285840" indent="-284760">
-              <a:lnSpc>
-                <a:spcPct val="100000"/>
-              </a:lnSpc>
-              <a:buClr>
-                <a:srgbClr val="1287c3"/>
-              </a:buClr>
-              <a:buSzPct val="145000"/>
-              <a:buFont typeface="Arial"/>
-              <a:buChar char="•"/>
-            </a:pPr>
-            <a:r>
-              <a:rPr b="0" lang="en-ZA" sz="2400" spc="-1" strike="noStrike">
-                <a:solidFill>
-                  <a:srgbClr val="000000"/>
-                </a:solidFill>
-                <a:uFill>
-                  <a:solidFill>
-                    <a:srgbClr val="ffffff"/>
-                  </a:solidFill>
-                </a:uFill>
-                <a:latin typeface="Corbel"/>
-                <a:ea typeface="DejaVu Sans"/>
-              </a:rPr>
-              <a:t>*insert burndown of 2*</a:t>
-            </a:r>
-            <a:endParaRPr b="0" lang="en-ZA" sz="1800" spc="-1" strike="noStrike">
-              <a:solidFill>
-                <a:srgbClr val="000000"/>
-              </a:solidFill>
-              <a:uFill>
-                <a:solidFill>
-                  <a:srgbClr val="ffffff"/>
-                </a:solidFill>
-              </a:uFill>
-              <a:latin typeface="Arial"/>
-            </a:endParaRPr>
-          </a:p>
-        </p:txBody>
       </p:sp>
       <p:sp>
         <p:nvSpPr>
@@ -5737,7 +5709,7 @@
         <p:spPr>
           <a:xfrm>
             <a:off x="3530520" y="216360"/>
-            <a:ext cx="5459040" cy="590040"/>
+            <a:ext cx="5458680" cy="589680"/>
           </a:xfrm>
           <a:prstGeom prst="rect">
             <a:avLst/>
@@ -5790,6 +5762,29 @@
           </a:p>
         </p:txBody>
       </p:sp>
+      <p:pic>
+        <p:nvPicPr>
+          <p:cNvPr id="101" name="" descr=""/>
+          <p:cNvPicPr/>
+          <p:nvPr/>
+        </p:nvPicPr>
+        <p:blipFill>
+          <a:blip r:embed="rId1"/>
+          <a:stretch/>
+        </p:blipFill>
+        <p:spPr>
+          <a:xfrm>
+            <a:off x="1080000" y="806400"/>
+            <a:ext cx="9936000" cy="5961600"/>
+          </a:xfrm>
+          <a:prstGeom prst="rect">
+            <a:avLst/>
+          </a:prstGeom>
+          <a:ln>
+            <a:noFill/>
+          </a:ln>
+        </p:spPr>
+      </p:pic>
     </p:spTree>
   </p:cSld>
   <p:timing>
@@ -5841,7 +5836,7 @@
       </p:grpSpPr>
       <p:pic>
         <p:nvPicPr>
-          <p:cNvPr id="101" name="" descr=""/>
+          <p:cNvPr id="102" name="" descr=""/>
           <p:cNvPicPr/>
           <p:nvPr/>
         </p:nvPicPr>
@@ -5852,7 +5847,7 @@
         <p:spPr>
           <a:xfrm>
             <a:off x="288000" y="288000"/>
-            <a:ext cx="11496240" cy="6479280"/>
+            <a:ext cx="11495880" cy="6478920"/>
           </a:xfrm>
           <a:prstGeom prst="rect">
             <a:avLst/>
@@ -5913,14 +5908,14 @@
       </p:grpSpPr>
       <p:sp>
         <p:nvSpPr>
-          <p:cNvPr id="102" name="CustomShape 1"/>
+          <p:cNvPr id="103" name="CustomShape 1"/>
           <p:cNvSpPr/>
           <p:nvPr/>
         </p:nvSpPr>
         <p:spPr>
           <a:xfrm>
             <a:off x="1368000" y="288000"/>
-            <a:ext cx="10017720" cy="1751400"/>
+            <a:ext cx="10017360" cy="1751040"/>
           </a:xfrm>
           <a:prstGeom prst="rect">
             <a:avLst/>
@@ -5988,14 +5983,14 @@
       </p:sp>
       <p:sp>
         <p:nvSpPr>
-          <p:cNvPr id="103" name="CustomShape 2"/>
+          <p:cNvPr id="104" name="CustomShape 2"/>
           <p:cNvSpPr/>
           <p:nvPr/>
         </p:nvSpPr>
         <p:spPr>
           <a:xfrm>
             <a:off x="1224000" y="2016000"/>
-            <a:ext cx="10017720" cy="3351600"/>
+            <a:ext cx="10017360" cy="3351240"/>
           </a:xfrm>
           <a:prstGeom prst="rect">
             <a:avLst/>
@@ -6014,7 +6009,7 @@
         <p:txBody>
           <a:bodyPr lIns="90000" rIns="90000" tIns="45000" bIns="45000" anchor="ctr"/>
           <a:p>
-            <a:pPr marL="285840" indent="-284760">
+            <a:pPr marL="285840" indent="-284400">
               <a:lnSpc>
                 <a:spcPct val="100000"/>
               </a:lnSpc>
@@ -6053,7 +6048,7 @@
             </a:endParaRPr>
           </a:p>
           <a:p>
-            <a:pPr marL="285840" indent="-284760">
+            <a:pPr marL="285840" indent="-284400">
               <a:lnSpc>
                 <a:spcPct val="100000"/>
               </a:lnSpc>
@@ -6092,7 +6087,7 @@
             </a:endParaRPr>
           </a:p>
           <a:p>
-            <a:pPr marL="285840" indent="-284760">
+            <a:pPr marL="285840" indent="-284400">
               <a:lnSpc>
                 <a:spcPct val="100000"/>
               </a:lnSpc>
@@ -6131,7 +6126,7 @@
             </a:endParaRPr>
           </a:p>
           <a:p>
-            <a:pPr marL="285840" indent="-284760">
+            <a:pPr marL="285840" indent="-284400">
               <a:lnSpc>
                 <a:spcPct val="100000"/>
               </a:lnSpc>
@@ -6240,14 +6235,14 @@
       </p:grpSpPr>
       <p:sp>
         <p:nvSpPr>
-          <p:cNvPr id="104" name="CustomShape 1"/>
+          <p:cNvPr id="105" name="CustomShape 1"/>
           <p:cNvSpPr/>
           <p:nvPr/>
         </p:nvSpPr>
         <p:spPr>
           <a:xfrm>
             <a:off x="1368000" y="288000"/>
-            <a:ext cx="10017720" cy="1751400"/>
+            <a:ext cx="10017360" cy="1751040"/>
           </a:xfrm>
           <a:prstGeom prst="rect">
             <a:avLst/>
@@ -6315,14 +6310,14 @@
       </p:sp>
       <p:sp>
         <p:nvSpPr>
-          <p:cNvPr id="105" name="CustomShape 2"/>
+          <p:cNvPr id="106" name="CustomShape 2"/>
           <p:cNvSpPr/>
           <p:nvPr/>
         </p:nvSpPr>
         <p:spPr>
           <a:xfrm>
             <a:off x="1296000" y="1760400"/>
-            <a:ext cx="10017720" cy="3351600"/>
+            <a:ext cx="10017360" cy="3351240"/>
           </a:xfrm>
           <a:prstGeom prst="rect">
             <a:avLst/>
@@ -6341,7 +6336,7 @@
         <p:txBody>
           <a:bodyPr lIns="90000" rIns="90000" tIns="45000" bIns="45000" anchor="ctr"/>
           <a:p>
-            <a:pPr marL="285840" indent="-284760">
+            <a:pPr marL="285840" indent="-284400">
               <a:lnSpc>
                 <a:spcPct val="100000"/>
               </a:lnSpc>
@@ -6380,7 +6375,7 @@
             </a:endParaRPr>
           </a:p>
           <a:p>
-            <a:pPr marL="285840" indent="-284760">
+            <a:pPr marL="285840" indent="-284400">
               <a:lnSpc>
                 <a:spcPct val="100000"/>
               </a:lnSpc>
@@ -6419,7 +6414,7 @@
             </a:endParaRPr>
           </a:p>
           <a:p>
-            <a:pPr marL="285840" indent="-284760">
+            <a:pPr marL="285840" indent="-284400">
               <a:lnSpc>
                 <a:spcPct val="100000"/>
               </a:lnSpc>
@@ -6458,7 +6453,7 @@
             </a:endParaRPr>
           </a:p>
           <a:p>
-            <a:pPr marL="285840" indent="-284760">
+            <a:pPr marL="285840" indent="-284400">
               <a:lnSpc>
                 <a:spcPct val="100000"/>
               </a:lnSpc>
@@ -6497,7 +6492,7 @@
             </a:endParaRPr>
           </a:p>
           <a:p>
-            <a:pPr marL="285840" indent="-284760">
+            <a:pPr marL="285840" indent="-284400">
               <a:lnSpc>
                 <a:spcPct val="100000"/>
               </a:lnSpc>
@@ -6536,7 +6531,7 @@
             </a:endParaRPr>
           </a:p>
           <a:p>
-            <a:pPr marL="285840" indent="-284760">
+            <a:pPr marL="285840" indent="-284400">
               <a:lnSpc>
                 <a:spcPct val="100000"/>
               </a:lnSpc>
@@ -6575,7 +6570,7 @@
             </a:endParaRPr>
           </a:p>
           <a:p>
-            <a:pPr marL="285840" indent="-284760">
+            <a:pPr marL="285840" indent="-284400">
               <a:lnSpc>
                 <a:spcPct val="100000"/>
               </a:lnSpc>

</xml_diff>

<commit_message>
transition changes, formatting changes
</commit_message>
<xml_diff>
--- a/Documentation/Demo/Demo_02.pptx
+++ b/Documentation/Demo/Demo_02.pptx
@@ -14,8 +14,9 @@
     <p:sldId id="261" r:id="rId9"/>
     <p:sldId id="262" r:id="rId10"/>
     <p:sldId id="263" r:id="rId11"/>
+    <p:sldId id="264" r:id="rId12"/>
   </p:sldIdLst>
-  <p:sldSz cx="12192000" cy="6858000"/>
+  <p:sldSz cx="12193587" cy="6858000"/>
   <p:notesSz cx="7559675" cy="10691812"/>
 </p:presentation>
 </file>
@@ -72,7 +73,7 @@
         <p:spPr>
           <a:xfrm>
             <a:off x="609480" y="273600"/>
-            <a:ext cx="10972440" cy="1144800"/>
+            <a:ext cx="10973520" cy="1144800"/>
           </a:xfrm>
           <a:prstGeom prst="rect">
             <a:avLst/>
@@ -109,7 +110,7 @@
         <p:spPr>
           <a:xfrm>
             <a:off x="609480" y="1604520"/>
-            <a:ext cx="10972440" cy="1896840"/>
+            <a:ext cx="10973520" cy="1896840"/>
           </a:xfrm>
           <a:prstGeom prst="rect">
             <a:avLst/>
@@ -145,7 +146,7 @@
         <p:spPr>
           <a:xfrm>
             <a:off x="609480" y="3682080"/>
-            <a:ext cx="10972440" cy="1896840"/>
+            <a:ext cx="10973520" cy="1896840"/>
           </a:xfrm>
           <a:prstGeom prst="rect">
             <a:avLst/>
@@ -203,7 +204,7 @@
         <p:spPr>
           <a:xfrm>
             <a:off x="609480" y="273600"/>
-            <a:ext cx="10972440" cy="1144800"/>
+            <a:ext cx="10973520" cy="1144800"/>
           </a:xfrm>
           <a:prstGeom prst="rect">
             <a:avLst/>
@@ -240,7 +241,7 @@
         <p:spPr>
           <a:xfrm>
             <a:off x="609480" y="1604520"/>
-            <a:ext cx="5354280" cy="1896840"/>
+            <a:ext cx="5355000" cy="1896840"/>
           </a:xfrm>
           <a:prstGeom prst="rect">
             <a:avLst/>
@@ -275,8 +276,8 @@
         </p:nvSpPr>
         <p:spPr>
           <a:xfrm>
-            <a:off x="6231960" y="1604520"/>
-            <a:ext cx="5354280" cy="1896840"/>
+            <a:off x="6232680" y="1604520"/>
+            <a:ext cx="5355000" cy="1896840"/>
           </a:xfrm>
           <a:prstGeom prst="rect">
             <a:avLst/>
@@ -311,8 +312,8 @@
         </p:nvSpPr>
         <p:spPr>
           <a:xfrm>
-            <a:off x="6231960" y="3682080"/>
-            <a:ext cx="5354280" cy="1896840"/>
+            <a:off x="6232680" y="3682080"/>
+            <a:ext cx="5355000" cy="1896840"/>
           </a:xfrm>
           <a:prstGeom prst="rect">
             <a:avLst/>
@@ -348,7 +349,7 @@
         <p:spPr>
           <a:xfrm>
             <a:off x="609480" y="3682080"/>
-            <a:ext cx="5354280" cy="1896840"/>
+            <a:ext cx="5355000" cy="1896840"/>
           </a:xfrm>
           <a:prstGeom prst="rect">
             <a:avLst/>
@@ -406,7 +407,7 @@
         <p:spPr>
           <a:xfrm>
             <a:off x="609480" y="273600"/>
-            <a:ext cx="10972440" cy="1144800"/>
+            <a:ext cx="10973520" cy="1144800"/>
           </a:xfrm>
           <a:prstGeom prst="rect">
             <a:avLst/>
@@ -443,7 +444,7 @@
         <p:spPr>
           <a:xfrm>
             <a:off x="609480" y="1604520"/>
-            <a:ext cx="10972440" cy="3977280"/>
+            <a:ext cx="10973520" cy="3977280"/>
           </a:xfrm>
           <a:prstGeom prst="rect">
             <a:avLst/>
@@ -479,7 +480,7 @@
         <p:spPr>
           <a:xfrm>
             <a:off x="609480" y="1604520"/>
-            <a:ext cx="10972440" cy="3977280"/>
+            <a:ext cx="10973520" cy="3977280"/>
           </a:xfrm>
           <a:prstGeom prst="rect">
             <a:avLst/>
@@ -514,7 +515,7 @@
         </p:blipFill>
         <p:spPr>
           <a:xfrm>
-            <a:off x="3602880" y="1604520"/>
+            <a:off x="3603600" y="1604520"/>
             <a:ext cx="4984920" cy="3977280"/>
           </a:xfrm>
           <a:prstGeom prst="rect">
@@ -537,7 +538,7 @@
         </p:blipFill>
         <p:spPr>
           <a:xfrm>
-            <a:off x="3602880" y="1604520"/>
+            <a:off x="3603600" y="1604520"/>
             <a:ext cx="4984920" cy="3977280"/>
           </a:xfrm>
           <a:prstGeom prst="rect">
@@ -605,7 +606,7 @@
         <p:spPr>
           <a:xfrm>
             <a:off x="609480" y="273600"/>
-            <a:ext cx="10972440" cy="1144800"/>
+            <a:ext cx="10973520" cy="1144800"/>
           </a:xfrm>
           <a:prstGeom prst="rect">
             <a:avLst/>
@@ -642,7 +643,7 @@
         <p:spPr>
           <a:xfrm>
             <a:off x="609480" y="1604520"/>
-            <a:ext cx="10972440" cy="3977280"/>
+            <a:ext cx="10973520" cy="3977280"/>
           </a:xfrm>
           <a:prstGeom prst="rect">
             <a:avLst/>
@@ -701,7 +702,7 @@
         <p:spPr>
           <a:xfrm>
             <a:off x="609480" y="273600"/>
-            <a:ext cx="10972440" cy="1144800"/>
+            <a:ext cx="10973520" cy="1144800"/>
           </a:xfrm>
           <a:prstGeom prst="rect">
             <a:avLst/>
@@ -738,7 +739,7 @@
         <p:spPr>
           <a:xfrm>
             <a:off x="609480" y="1604520"/>
-            <a:ext cx="10972440" cy="3977280"/>
+            <a:ext cx="10973520" cy="3977280"/>
           </a:xfrm>
           <a:prstGeom prst="rect">
             <a:avLst/>
@@ -796,7 +797,7 @@
         <p:spPr>
           <a:xfrm>
             <a:off x="609480" y="273600"/>
-            <a:ext cx="10972440" cy="1144800"/>
+            <a:ext cx="10973520" cy="1144800"/>
           </a:xfrm>
           <a:prstGeom prst="rect">
             <a:avLst/>
@@ -833,7 +834,7 @@
         <p:spPr>
           <a:xfrm>
             <a:off x="609480" y="1604520"/>
-            <a:ext cx="5354280" cy="3977280"/>
+            <a:ext cx="5355000" cy="3977280"/>
           </a:xfrm>
           <a:prstGeom prst="rect">
             <a:avLst/>
@@ -868,8 +869,8 @@
         </p:nvSpPr>
         <p:spPr>
           <a:xfrm>
-            <a:off x="6231960" y="1604520"/>
-            <a:ext cx="5354280" cy="3977280"/>
+            <a:off x="6232680" y="1604520"/>
+            <a:ext cx="5355000" cy="3977280"/>
           </a:xfrm>
           <a:prstGeom prst="rect">
             <a:avLst/>
@@ -927,7 +928,7 @@
         <p:spPr>
           <a:xfrm>
             <a:off x="609480" y="273600"/>
-            <a:ext cx="10972440" cy="1144800"/>
+            <a:ext cx="10973520" cy="1144800"/>
           </a:xfrm>
           <a:prstGeom prst="rect">
             <a:avLst/>
@@ -986,7 +987,7 @@
         <p:spPr>
           <a:xfrm>
             <a:off x="609480" y="273600"/>
-            <a:ext cx="10972440" cy="5307840"/>
+            <a:ext cx="10973520" cy="5307840"/>
           </a:xfrm>
           <a:prstGeom prst="rect">
             <a:avLst/>
@@ -1045,7 +1046,7 @@
         <p:spPr>
           <a:xfrm>
             <a:off x="609480" y="273600"/>
-            <a:ext cx="10972440" cy="1144800"/>
+            <a:ext cx="10973520" cy="1144800"/>
           </a:xfrm>
           <a:prstGeom prst="rect">
             <a:avLst/>
@@ -1082,7 +1083,7 @@
         <p:spPr>
           <a:xfrm>
             <a:off x="609480" y="1604520"/>
-            <a:ext cx="5354280" cy="1896840"/>
+            <a:ext cx="5355000" cy="1896840"/>
           </a:xfrm>
           <a:prstGeom prst="rect">
             <a:avLst/>
@@ -1118,7 +1119,7 @@
         <p:spPr>
           <a:xfrm>
             <a:off x="609480" y="3682080"/>
-            <a:ext cx="5354280" cy="1896840"/>
+            <a:ext cx="5355000" cy="1896840"/>
           </a:xfrm>
           <a:prstGeom prst="rect">
             <a:avLst/>
@@ -1153,8 +1154,8 @@
         </p:nvSpPr>
         <p:spPr>
           <a:xfrm>
-            <a:off x="6231960" y="1604520"/>
-            <a:ext cx="5354280" cy="3977280"/>
+            <a:off x="6232680" y="1604520"/>
+            <a:ext cx="5355000" cy="3977280"/>
           </a:xfrm>
           <a:prstGeom prst="rect">
             <a:avLst/>
@@ -1212,7 +1213,7 @@
         <p:spPr>
           <a:xfrm>
             <a:off x="609480" y="273600"/>
-            <a:ext cx="10972440" cy="1144800"/>
+            <a:ext cx="10973520" cy="1144800"/>
           </a:xfrm>
           <a:prstGeom prst="rect">
             <a:avLst/>
@@ -1249,7 +1250,7 @@
         <p:spPr>
           <a:xfrm>
             <a:off x="609480" y="1604520"/>
-            <a:ext cx="10972440" cy="3977280"/>
+            <a:ext cx="10973520" cy="3977280"/>
           </a:xfrm>
           <a:prstGeom prst="rect">
             <a:avLst/>
@@ -1308,7 +1309,7 @@
         <p:spPr>
           <a:xfrm>
             <a:off x="609480" y="273600"/>
-            <a:ext cx="10972440" cy="1144800"/>
+            <a:ext cx="10973520" cy="1144800"/>
           </a:xfrm>
           <a:prstGeom prst="rect">
             <a:avLst/>
@@ -1345,7 +1346,7 @@
         <p:spPr>
           <a:xfrm>
             <a:off x="609480" y="1604520"/>
-            <a:ext cx="5354280" cy="3977280"/>
+            <a:ext cx="5355000" cy="3977280"/>
           </a:xfrm>
           <a:prstGeom prst="rect">
             <a:avLst/>
@@ -1380,8 +1381,8 @@
         </p:nvSpPr>
         <p:spPr>
           <a:xfrm>
-            <a:off x="6231960" y="1604520"/>
-            <a:ext cx="5354280" cy="1896840"/>
+            <a:off x="6232680" y="1604520"/>
+            <a:ext cx="5355000" cy="1896840"/>
           </a:xfrm>
           <a:prstGeom prst="rect">
             <a:avLst/>
@@ -1416,8 +1417,8 @@
         </p:nvSpPr>
         <p:spPr>
           <a:xfrm>
-            <a:off x="6231960" y="3682080"/>
-            <a:ext cx="5354280" cy="1896840"/>
+            <a:off x="6232680" y="3682080"/>
+            <a:ext cx="5355000" cy="1896840"/>
           </a:xfrm>
           <a:prstGeom prst="rect">
             <a:avLst/>
@@ -1475,7 +1476,7 @@
         <p:spPr>
           <a:xfrm>
             <a:off x="609480" y="273600"/>
-            <a:ext cx="10972440" cy="1144800"/>
+            <a:ext cx="10973520" cy="1144800"/>
           </a:xfrm>
           <a:prstGeom prst="rect">
             <a:avLst/>
@@ -1512,7 +1513,7 @@
         <p:spPr>
           <a:xfrm>
             <a:off x="609480" y="1604520"/>
-            <a:ext cx="5354280" cy="1896840"/>
+            <a:ext cx="5355000" cy="1896840"/>
           </a:xfrm>
           <a:prstGeom prst="rect">
             <a:avLst/>
@@ -1547,8 +1548,8 @@
         </p:nvSpPr>
         <p:spPr>
           <a:xfrm>
-            <a:off x="6231960" y="1604520"/>
-            <a:ext cx="5354280" cy="1896840"/>
+            <a:off x="6232680" y="1604520"/>
+            <a:ext cx="5355000" cy="1896840"/>
           </a:xfrm>
           <a:prstGeom prst="rect">
             <a:avLst/>
@@ -1584,7 +1585,7 @@
         <p:spPr>
           <a:xfrm>
             <a:off x="609480" y="3682080"/>
-            <a:ext cx="10972440" cy="1896840"/>
+            <a:ext cx="10973520" cy="1896840"/>
           </a:xfrm>
           <a:prstGeom prst="rect">
             <a:avLst/>
@@ -1642,7 +1643,7 @@
         <p:spPr>
           <a:xfrm>
             <a:off x="609480" y="273600"/>
-            <a:ext cx="10972440" cy="1144800"/>
+            <a:ext cx="10973520" cy="1144800"/>
           </a:xfrm>
           <a:prstGeom prst="rect">
             <a:avLst/>
@@ -1679,7 +1680,7 @@
         <p:spPr>
           <a:xfrm>
             <a:off x="609480" y="1604520"/>
-            <a:ext cx="10972440" cy="1896840"/>
+            <a:ext cx="10973520" cy="1896840"/>
           </a:xfrm>
           <a:prstGeom prst="rect">
             <a:avLst/>
@@ -1715,7 +1716,7 @@
         <p:spPr>
           <a:xfrm>
             <a:off x="609480" y="3682080"/>
-            <a:ext cx="10972440" cy="1896840"/>
+            <a:ext cx="10973520" cy="1896840"/>
           </a:xfrm>
           <a:prstGeom prst="rect">
             <a:avLst/>
@@ -1773,7 +1774,7 @@
         <p:spPr>
           <a:xfrm>
             <a:off x="609480" y="273600"/>
-            <a:ext cx="10972440" cy="1144800"/>
+            <a:ext cx="10973520" cy="1144800"/>
           </a:xfrm>
           <a:prstGeom prst="rect">
             <a:avLst/>
@@ -1810,7 +1811,7 @@
         <p:spPr>
           <a:xfrm>
             <a:off x="609480" y="1604520"/>
-            <a:ext cx="5354280" cy="1896840"/>
+            <a:ext cx="5355000" cy="1896840"/>
           </a:xfrm>
           <a:prstGeom prst="rect">
             <a:avLst/>
@@ -1845,8 +1846,8 @@
         </p:nvSpPr>
         <p:spPr>
           <a:xfrm>
-            <a:off x="6231960" y="1604520"/>
-            <a:ext cx="5354280" cy="1896840"/>
+            <a:off x="6232680" y="1604520"/>
+            <a:ext cx="5355000" cy="1896840"/>
           </a:xfrm>
           <a:prstGeom prst="rect">
             <a:avLst/>
@@ -1881,8 +1882,8 @@
         </p:nvSpPr>
         <p:spPr>
           <a:xfrm>
-            <a:off x="6231960" y="3682080"/>
-            <a:ext cx="5354280" cy="1896840"/>
+            <a:off x="6232680" y="3682080"/>
+            <a:ext cx="5355000" cy="1896840"/>
           </a:xfrm>
           <a:prstGeom prst="rect">
             <a:avLst/>
@@ -1918,7 +1919,7 @@
         <p:spPr>
           <a:xfrm>
             <a:off x="609480" y="3682080"/>
-            <a:ext cx="5354280" cy="1896840"/>
+            <a:ext cx="5355000" cy="1896840"/>
           </a:xfrm>
           <a:prstGeom prst="rect">
             <a:avLst/>
@@ -1976,7 +1977,7 @@
         <p:spPr>
           <a:xfrm>
             <a:off x="609480" y="273600"/>
-            <a:ext cx="10972440" cy="1144800"/>
+            <a:ext cx="10973520" cy="1144800"/>
           </a:xfrm>
           <a:prstGeom prst="rect">
             <a:avLst/>
@@ -2013,7 +2014,7 @@
         <p:spPr>
           <a:xfrm>
             <a:off x="609480" y="1604520"/>
-            <a:ext cx="10972440" cy="3977280"/>
+            <a:ext cx="10973520" cy="3977280"/>
           </a:xfrm>
           <a:prstGeom prst="rect">
             <a:avLst/>
@@ -2049,7 +2050,7 @@
         <p:spPr>
           <a:xfrm>
             <a:off x="609480" y="1604520"/>
-            <a:ext cx="10972440" cy="3977280"/>
+            <a:ext cx="10973520" cy="3977280"/>
           </a:xfrm>
           <a:prstGeom prst="rect">
             <a:avLst/>
@@ -2084,7 +2085,7 @@
         </p:blipFill>
         <p:spPr>
           <a:xfrm>
-            <a:off x="3602880" y="1604520"/>
+            <a:off x="3603600" y="1604520"/>
             <a:ext cx="4984920" cy="3977280"/>
           </a:xfrm>
           <a:prstGeom prst="rect">
@@ -2107,7 +2108,7 @@
         </p:blipFill>
         <p:spPr>
           <a:xfrm>
-            <a:off x="3602880" y="1604520"/>
+            <a:off x="3603600" y="1604520"/>
             <a:ext cx="4984920" cy="3977280"/>
           </a:xfrm>
           <a:prstGeom prst="rect">
@@ -2153,7 +2154,7 @@
         <p:spPr>
           <a:xfrm>
             <a:off x="609480" y="273600"/>
-            <a:ext cx="10972440" cy="1144800"/>
+            <a:ext cx="10973520" cy="1144800"/>
           </a:xfrm>
           <a:prstGeom prst="rect">
             <a:avLst/>
@@ -2190,7 +2191,7 @@
         <p:spPr>
           <a:xfrm>
             <a:off x="609480" y="1604520"/>
-            <a:ext cx="10972440" cy="3977280"/>
+            <a:ext cx="10973520" cy="3977280"/>
           </a:xfrm>
           <a:prstGeom prst="rect">
             <a:avLst/>
@@ -2248,7 +2249,7 @@
         <p:spPr>
           <a:xfrm>
             <a:off x="609480" y="273600"/>
-            <a:ext cx="10972440" cy="1144800"/>
+            <a:ext cx="10973520" cy="1144800"/>
           </a:xfrm>
           <a:prstGeom prst="rect">
             <a:avLst/>
@@ -2285,7 +2286,7 @@
         <p:spPr>
           <a:xfrm>
             <a:off x="609480" y="1604520"/>
-            <a:ext cx="5354280" cy="3977280"/>
+            <a:ext cx="5355000" cy="3977280"/>
           </a:xfrm>
           <a:prstGeom prst="rect">
             <a:avLst/>
@@ -2320,8 +2321,8 @@
         </p:nvSpPr>
         <p:spPr>
           <a:xfrm>
-            <a:off x="6231960" y="1604520"/>
-            <a:ext cx="5354280" cy="3977280"/>
+            <a:off x="6232680" y="1604520"/>
+            <a:ext cx="5355000" cy="3977280"/>
           </a:xfrm>
           <a:prstGeom prst="rect">
             <a:avLst/>
@@ -2379,7 +2380,7 @@
         <p:spPr>
           <a:xfrm>
             <a:off x="609480" y="273600"/>
-            <a:ext cx="10972440" cy="1144800"/>
+            <a:ext cx="10973520" cy="1144800"/>
           </a:xfrm>
           <a:prstGeom prst="rect">
             <a:avLst/>
@@ -2438,7 +2439,7 @@
         <p:spPr>
           <a:xfrm>
             <a:off x="609480" y="273600"/>
-            <a:ext cx="10972440" cy="5307840"/>
+            <a:ext cx="10973520" cy="5307840"/>
           </a:xfrm>
           <a:prstGeom prst="rect">
             <a:avLst/>
@@ -2497,7 +2498,7 @@
         <p:spPr>
           <a:xfrm>
             <a:off x="609480" y="273600"/>
-            <a:ext cx="10972440" cy="1144800"/>
+            <a:ext cx="10973520" cy="1144800"/>
           </a:xfrm>
           <a:prstGeom prst="rect">
             <a:avLst/>
@@ -2534,7 +2535,7 @@
         <p:spPr>
           <a:xfrm>
             <a:off x="609480" y="1604520"/>
-            <a:ext cx="5354280" cy="1896840"/>
+            <a:ext cx="5355000" cy="1896840"/>
           </a:xfrm>
           <a:prstGeom prst="rect">
             <a:avLst/>
@@ -2570,7 +2571,7 @@
         <p:spPr>
           <a:xfrm>
             <a:off x="609480" y="3682080"/>
-            <a:ext cx="5354280" cy="1896840"/>
+            <a:ext cx="5355000" cy="1896840"/>
           </a:xfrm>
           <a:prstGeom prst="rect">
             <a:avLst/>
@@ -2605,8 +2606,8 @@
         </p:nvSpPr>
         <p:spPr>
           <a:xfrm>
-            <a:off x="6231960" y="1604520"/>
-            <a:ext cx="5354280" cy="3977280"/>
+            <a:off x="6232680" y="1604520"/>
+            <a:ext cx="5355000" cy="3977280"/>
           </a:xfrm>
           <a:prstGeom prst="rect">
             <a:avLst/>
@@ -2664,7 +2665,7 @@
         <p:spPr>
           <a:xfrm>
             <a:off x="609480" y="273600"/>
-            <a:ext cx="10972440" cy="1144800"/>
+            <a:ext cx="10973520" cy="1144800"/>
           </a:xfrm>
           <a:prstGeom prst="rect">
             <a:avLst/>
@@ -2701,7 +2702,7 @@
         <p:spPr>
           <a:xfrm>
             <a:off x="609480" y="1604520"/>
-            <a:ext cx="5354280" cy="3977280"/>
+            <a:ext cx="5355000" cy="3977280"/>
           </a:xfrm>
           <a:prstGeom prst="rect">
             <a:avLst/>
@@ -2736,8 +2737,8 @@
         </p:nvSpPr>
         <p:spPr>
           <a:xfrm>
-            <a:off x="6231960" y="1604520"/>
-            <a:ext cx="5354280" cy="1896840"/>
+            <a:off x="6232680" y="1604520"/>
+            <a:ext cx="5355000" cy="1896840"/>
           </a:xfrm>
           <a:prstGeom prst="rect">
             <a:avLst/>
@@ -2772,8 +2773,8 @@
         </p:nvSpPr>
         <p:spPr>
           <a:xfrm>
-            <a:off x="6231960" y="3682080"/>
-            <a:ext cx="5354280" cy="1896840"/>
+            <a:off x="6232680" y="3682080"/>
+            <a:ext cx="5355000" cy="1896840"/>
           </a:xfrm>
           <a:prstGeom prst="rect">
             <a:avLst/>
@@ -2831,7 +2832,7 @@
         <p:spPr>
           <a:xfrm>
             <a:off x="609480" y="273600"/>
-            <a:ext cx="10972440" cy="1144800"/>
+            <a:ext cx="10973520" cy="1144800"/>
           </a:xfrm>
           <a:prstGeom prst="rect">
             <a:avLst/>
@@ -2868,7 +2869,7 @@
         <p:spPr>
           <a:xfrm>
             <a:off x="609480" y="1604520"/>
-            <a:ext cx="5354280" cy="1896840"/>
+            <a:ext cx="5355000" cy="1896840"/>
           </a:xfrm>
           <a:prstGeom prst="rect">
             <a:avLst/>
@@ -2903,8 +2904,8 @@
         </p:nvSpPr>
         <p:spPr>
           <a:xfrm>
-            <a:off x="6231960" y="1604520"/>
-            <a:ext cx="5354280" cy="1896840"/>
+            <a:off x="6232680" y="1604520"/>
+            <a:ext cx="5355000" cy="1896840"/>
           </a:xfrm>
           <a:prstGeom prst="rect">
             <a:avLst/>
@@ -2940,7 +2941,7 @@
         <p:spPr>
           <a:xfrm>
             <a:off x="609480" y="3682080"/>
-            <a:ext cx="10972440" cy="1896840"/>
+            <a:ext cx="10973520" cy="1896840"/>
           </a:xfrm>
           <a:prstGeom prst="rect">
             <a:avLst/>
@@ -2971,16 +2972,6 @@
 <file path=ppt/slideMasters/slideMaster1.xml><?xml version="1.0" encoding="utf-8"?>
 <p:sldMaster xmlns:a="http://schemas.openxmlformats.org/drawingml/2006/main" xmlns:p="http://schemas.openxmlformats.org/presentationml/2006/main" xmlns:r="http://schemas.openxmlformats.org/officeDocument/2006/relationships" xmlns:p14="http://schemas.microsoft.com/office/powerpoint/2010/main" xmlns:p15="http://schemas.microsoft.com/office/powerpoint/2012/main" xmlns:mc="http://schemas.openxmlformats.org/markup-compatibility/2006">
   <p:cSld>
-    <p:bg>
-      <p:bgPr>
-        <a:blipFill>
-          <a:blip r:embed="rId2"/>
-          <a:stretch>
-            <a:fillRect/>
-          </a:stretch>
-        </a:blipFill>
-      </p:bgPr>
-    </p:bg>
     <p:spTree>
       <p:nvGrpSpPr>
         <p:cNvPr id="1" name=""/>
@@ -3004,7 +2995,7 @@
         <p:spPr>
           <a:xfrm>
             <a:off x="457200" y="0"/>
-            <a:ext cx="1121040" cy="5327640"/>
+            <a:ext cx="1120680" cy="5327280"/>
           </a:xfrm>
           <a:custGeom>
             <a:avLst/>
@@ -3033,7 +3024,7 @@
             </a:pathLst>
           </a:custGeom>
           <a:solidFill>
-            <a:schemeClr val="accent1"/>
+            <a:srgbClr val="4f81bd"/>
           </a:solidFill>
           <a:ln>
             <a:noFill/>
@@ -3055,7 +3046,7 @@
         <p:spPr>
           <a:xfrm>
             <a:off x="150840" y="0"/>
-            <a:ext cx="1116000" cy="5275440"/>
+            <a:ext cx="1115640" cy="5275080"/>
           </a:xfrm>
           <a:custGeom>
             <a:avLst/>
@@ -3084,10 +3075,7 @@
             </a:pathLst>
           </a:custGeom>
           <a:solidFill>
-            <a:schemeClr val="tx1">
-              <a:lumMod val="65000"/>
-              <a:lumOff val="35000"/>
-            </a:schemeClr>
+            <a:srgbClr val="595959"/>
           </a:solidFill>
           <a:ln>
             <a:noFill/>
@@ -3109,7 +3097,7 @@
         <p:spPr>
           <a:xfrm>
             <a:off x="150840" y="5238720"/>
-            <a:ext cx="1227240" cy="1617840"/>
+            <a:ext cx="1226880" cy="1617480"/>
           </a:xfrm>
           <a:custGeom>
             <a:avLst/>
@@ -3135,10 +3123,7 @@
             </a:pathLst>
           </a:custGeom>
           <a:solidFill>
-            <a:schemeClr val="tx1">
-              <a:lumMod val="85000"/>
-              <a:lumOff val="15000"/>
-            </a:schemeClr>
+            <a:srgbClr val="262626"/>
           </a:solidFill>
           <a:ln>
             <a:noFill/>
@@ -3160,7 +3145,7 @@
         <p:spPr>
           <a:xfrm>
             <a:off x="457200" y="5291280"/>
-            <a:ext cx="1494000" cy="1565280"/>
+            <a:ext cx="1493640" cy="1564920"/>
           </a:xfrm>
           <a:custGeom>
             <a:avLst/>
@@ -3186,9 +3171,7 @@
             </a:pathLst>
           </a:custGeom>
           <a:solidFill>
-            <a:schemeClr val="accent1">
-              <a:lumMod val="50000"/>
-            </a:schemeClr>
+            <a:srgbClr val="254061"/>
           </a:solidFill>
           <a:ln>
             <a:noFill/>
@@ -3210,7 +3193,7 @@
         <p:spPr>
           <a:xfrm>
             <a:off x="457200" y="5286240"/>
-            <a:ext cx="2129040" cy="1570320"/>
+            <a:ext cx="2129040" cy="1569960"/>
           </a:xfrm>
           <a:custGeom>
             <a:avLst/>
@@ -3242,9 +3225,7 @@
             </a:pathLst>
           </a:custGeom>
           <a:solidFill>
-            <a:schemeClr val="accent1">
-              <a:lumMod val="75000"/>
-            </a:schemeClr>
+            <a:srgbClr val="376092"/>
           </a:solidFill>
           <a:ln>
             <a:noFill/>
@@ -3266,7 +3247,7 @@
         <p:spPr>
           <a:xfrm>
             <a:off x="150840" y="5238720"/>
-            <a:ext cx="1694160" cy="1617840"/>
+            <a:ext cx="1693800" cy="1617480"/>
           </a:xfrm>
           <a:custGeom>
             <a:avLst/>
@@ -3310,10 +3291,7 @@
             </a:pathLst>
           </a:custGeom>
           <a:solidFill>
-            <a:schemeClr val="tx1">
-              <a:lumMod val="75000"/>
-              <a:lumOff val="25000"/>
-            </a:schemeClr>
+            <a:srgbClr val="404040"/>
           </a:solidFill>
           <a:ln>
             <a:noFill/>
@@ -3335,7 +3313,7 @@
         <p:spPr>
           <a:xfrm>
             <a:off x="984240" y="-4680"/>
-            <a:ext cx="1062360" cy="2781360"/>
+            <a:ext cx="1062000" cy="2781000"/>
           </a:xfrm>
           <a:custGeom>
             <a:avLst/>
@@ -3364,7 +3342,7 @@
             </a:pathLst>
           </a:custGeom>
           <a:solidFill>
-            <a:schemeClr val="accent1"/>
+            <a:srgbClr val="4f81bd"/>
           </a:solidFill>
           <a:ln>
             <a:noFill/>
@@ -3386,7 +3364,7 @@
         <p:spPr>
           <a:xfrm>
             <a:off x="546120" y="-4680"/>
-            <a:ext cx="1033560" cy="2671920"/>
+            <a:ext cx="1033200" cy="2671560"/>
           </a:xfrm>
           <a:custGeom>
             <a:avLst/>
@@ -3418,10 +3396,7 @@
             </a:pathLst>
           </a:custGeom>
           <a:solidFill>
-            <a:schemeClr val="tx1">
-              <a:lumMod val="65000"/>
-              <a:lumOff val="35000"/>
-            </a:schemeClr>
+            <a:srgbClr val="595959"/>
           </a:solidFill>
           <a:ln>
             <a:noFill/>
@@ -3443,7 +3418,7 @@
         <p:spPr>
           <a:xfrm>
             <a:off x="546120" y="2583000"/>
-            <a:ext cx="2692440" cy="4273560"/>
+            <a:ext cx="2692440" cy="4273200"/>
           </a:xfrm>
           <a:custGeom>
             <a:avLst/>
@@ -3469,10 +3444,7 @@
             </a:pathLst>
           </a:custGeom>
           <a:solidFill>
-            <a:schemeClr val="tx1">
-              <a:lumMod val="85000"/>
-              <a:lumOff val="15000"/>
-            </a:schemeClr>
+            <a:srgbClr val="262626"/>
           </a:solidFill>
           <a:ln>
             <a:noFill/>
@@ -3494,7 +3466,7 @@
         <p:spPr>
           <a:xfrm>
             <a:off x="988920" y="2692440"/>
-            <a:ext cx="3330720" cy="4164120"/>
+            <a:ext cx="3330720" cy="4163760"/>
           </a:xfrm>
           <a:custGeom>
             <a:avLst/>
@@ -3520,9 +3492,7 @@
             </a:pathLst>
           </a:custGeom>
           <a:solidFill>
-            <a:schemeClr val="accent1">
-              <a:lumMod val="50000"/>
-            </a:schemeClr>
+            <a:srgbClr val="254061"/>
           </a:solidFill>
           <a:ln>
             <a:noFill/>
@@ -3544,7 +3514,7 @@
         <p:spPr>
           <a:xfrm>
             <a:off x="984240" y="2687760"/>
-            <a:ext cx="4575240" cy="4168800"/>
+            <a:ext cx="4575240" cy="4168440"/>
           </a:xfrm>
           <a:custGeom>
             <a:avLst/>
@@ -3576,9 +3546,7 @@
             </a:pathLst>
           </a:custGeom>
           <a:solidFill>
-            <a:schemeClr val="accent1">
-              <a:lumMod val="75000"/>
-            </a:schemeClr>
+            <a:srgbClr val="376092"/>
           </a:solidFill>
           <a:ln>
             <a:noFill/>
@@ -3600,7 +3568,7 @@
         <p:spPr>
           <a:xfrm>
             <a:off x="546120" y="2577960"/>
-            <a:ext cx="3583080" cy="4278600"/>
+            <a:ext cx="3583080" cy="4278240"/>
           </a:xfrm>
           <a:custGeom>
             <a:avLst/>
@@ -3638,10 +3606,7 @@
             </a:pathLst>
           </a:custGeom>
           <a:solidFill>
-            <a:schemeClr val="tx1">
-              <a:lumMod val="75000"/>
-              <a:lumOff val="25000"/>
-            </a:schemeClr>
+            <a:srgbClr val="404040"/>
           </a:solidFill>
           <a:ln>
             <a:noFill/>
@@ -3667,7 +3632,7 @@
         <p:spPr>
           <a:xfrm>
             <a:off x="609480" y="273600"/>
-            <a:ext cx="10972440" cy="1144800"/>
+            <a:ext cx="10973520" cy="1144800"/>
           </a:xfrm>
           <a:prstGeom prst="rect">
             <a:avLst/>
@@ -3718,7 +3683,7 @@
         <p:spPr>
           <a:xfrm>
             <a:off x="609480" y="1604520"/>
-            <a:ext cx="10972440" cy="3977280"/>
+            <a:ext cx="10973520" cy="3977280"/>
           </a:xfrm>
           <a:prstGeom prst="rect">
             <a:avLst/>
@@ -3977,18 +3942,18 @@
   </p:cSld>
   <p:clrMap bg1="lt1" bg2="lt2" tx1="dk1" tx2="dk2" accent1="accent1" accent2="accent2" accent3="accent3" accent4="accent4" accent5="accent5" accent6="accent6" hlink="hlink" folHlink="folHlink"/>
   <p:sldLayoutIdLst>
-    <p:sldLayoutId id="2147483649" r:id="rId3"/>
-    <p:sldLayoutId id="2147483650" r:id="rId4"/>
-    <p:sldLayoutId id="2147483651" r:id="rId5"/>
-    <p:sldLayoutId id="2147483652" r:id="rId6"/>
-    <p:sldLayoutId id="2147483653" r:id="rId7"/>
-    <p:sldLayoutId id="2147483654" r:id="rId8"/>
-    <p:sldLayoutId id="2147483655" r:id="rId9"/>
-    <p:sldLayoutId id="2147483656" r:id="rId10"/>
-    <p:sldLayoutId id="2147483657" r:id="rId11"/>
-    <p:sldLayoutId id="2147483658" r:id="rId12"/>
-    <p:sldLayoutId id="2147483659" r:id="rId13"/>
-    <p:sldLayoutId id="2147483660" r:id="rId14"/>
+    <p:sldLayoutId id="2147483649" r:id="rId2"/>
+    <p:sldLayoutId id="2147483650" r:id="rId3"/>
+    <p:sldLayoutId id="2147483651" r:id="rId4"/>
+    <p:sldLayoutId id="2147483652" r:id="rId5"/>
+    <p:sldLayoutId id="2147483653" r:id="rId6"/>
+    <p:sldLayoutId id="2147483654" r:id="rId7"/>
+    <p:sldLayoutId id="2147483655" r:id="rId8"/>
+    <p:sldLayoutId id="2147483656" r:id="rId9"/>
+    <p:sldLayoutId id="2147483657" r:id="rId10"/>
+    <p:sldLayoutId id="2147483658" r:id="rId11"/>
+    <p:sldLayoutId id="2147483659" r:id="rId12"/>
+    <p:sldLayoutId id="2147483660" r:id="rId13"/>
   </p:sldLayoutIdLst>
 </p:sldMaster>
 </file>
@@ -3996,16 +3961,6 @@
 <file path=ppt/slideMasters/slideMaster2.xml><?xml version="1.0" encoding="utf-8"?>
 <p:sldMaster xmlns:a="http://schemas.openxmlformats.org/drawingml/2006/main" xmlns:p="http://schemas.openxmlformats.org/presentationml/2006/main" xmlns:r="http://schemas.openxmlformats.org/officeDocument/2006/relationships" xmlns:p14="http://schemas.microsoft.com/office/powerpoint/2010/main" xmlns:p15="http://schemas.microsoft.com/office/powerpoint/2012/main" xmlns:mc="http://schemas.openxmlformats.org/markup-compatibility/2006">
   <p:cSld>
-    <p:bg>
-      <p:bgPr>
-        <a:blipFill>
-          <a:blip r:embed="rId2"/>
-          <a:stretch>
-            <a:fillRect/>
-          </a:stretch>
-        </a:blipFill>
-      </p:bgPr>
-    </p:bg>
     <p:spTree>
       <p:nvGrpSpPr>
         <p:cNvPr id="1" name=""/>
@@ -4029,7 +3984,7 @@
         <p:spPr>
           <a:xfrm>
             <a:off x="457200" y="0"/>
-            <a:ext cx="1121040" cy="5327640"/>
+            <a:ext cx="1120680" cy="5327280"/>
           </a:xfrm>
           <a:custGeom>
             <a:avLst/>
@@ -4058,7 +4013,7 @@
             </a:pathLst>
           </a:custGeom>
           <a:solidFill>
-            <a:schemeClr val="accent1"/>
+            <a:srgbClr val="4f81bd"/>
           </a:solidFill>
           <a:ln>
             <a:noFill/>
@@ -4080,7 +4035,7 @@
         <p:spPr>
           <a:xfrm>
             <a:off x="150840" y="0"/>
-            <a:ext cx="1116000" cy="5275440"/>
+            <a:ext cx="1115640" cy="5275080"/>
           </a:xfrm>
           <a:custGeom>
             <a:avLst/>
@@ -4109,10 +4064,7 @@
             </a:pathLst>
           </a:custGeom>
           <a:solidFill>
-            <a:schemeClr val="tx1">
-              <a:lumMod val="65000"/>
-              <a:lumOff val="35000"/>
-            </a:schemeClr>
+            <a:srgbClr val="595959"/>
           </a:solidFill>
           <a:ln>
             <a:noFill/>
@@ -4134,7 +4086,7 @@
         <p:spPr>
           <a:xfrm>
             <a:off x="150840" y="5238720"/>
-            <a:ext cx="1227240" cy="1617840"/>
+            <a:ext cx="1226880" cy="1617480"/>
           </a:xfrm>
           <a:custGeom>
             <a:avLst/>
@@ -4160,10 +4112,7 @@
             </a:pathLst>
           </a:custGeom>
           <a:solidFill>
-            <a:schemeClr val="tx1">
-              <a:lumMod val="85000"/>
-              <a:lumOff val="15000"/>
-            </a:schemeClr>
+            <a:srgbClr val="262626"/>
           </a:solidFill>
           <a:ln>
             <a:noFill/>
@@ -4185,7 +4134,7 @@
         <p:spPr>
           <a:xfrm>
             <a:off x="457200" y="5291280"/>
-            <a:ext cx="1494000" cy="1565280"/>
+            <a:ext cx="1493640" cy="1564920"/>
           </a:xfrm>
           <a:custGeom>
             <a:avLst/>
@@ -4211,9 +4160,7 @@
             </a:pathLst>
           </a:custGeom>
           <a:solidFill>
-            <a:schemeClr val="accent1">
-              <a:lumMod val="50000"/>
-            </a:schemeClr>
+            <a:srgbClr val="254061"/>
           </a:solidFill>
           <a:ln>
             <a:noFill/>
@@ -4235,7 +4182,7 @@
         <p:spPr>
           <a:xfrm>
             <a:off x="457200" y="5286240"/>
-            <a:ext cx="2129040" cy="1570320"/>
+            <a:ext cx="2129040" cy="1569960"/>
           </a:xfrm>
           <a:custGeom>
             <a:avLst/>
@@ -4267,9 +4214,7 @@
             </a:pathLst>
           </a:custGeom>
           <a:solidFill>
-            <a:schemeClr val="accent1">
-              <a:lumMod val="75000"/>
-            </a:schemeClr>
+            <a:srgbClr val="376092"/>
           </a:solidFill>
           <a:ln>
             <a:noFill/>
@@ -4291,7 +4236,7 @@
         <p:spPr>
           <a:xfrm>
             <a:off x="150840" y="5238720"/>
-            <a:ext cx="1694160" cy="1617840"/>
+            <a:ext cx="1693800" cy="1617480"/>
           </a:xfrm>
           <a:custGeom>
             <a:avLst/>
@@ -4335,10 +4280,7 @@
             </a:pathLst>
           </a:custGeom>
           <a:solidFill>
-            <a:schemeClr val="tx1">
-              <a:lumMod val="75000"/>
-              <a:lumOff val="25000"/>
-            </a:schemeClr>
+            <a:srgbClr val="404040"/>
           </a:solidFill>
           <a:ln>
             <a:noFill/>
@@ -4364,7 +4306,7 @@
         <p:spPr>
           <a:xfrm>
             <a:off x="609480" y="273600"/>
-            <a:ext cx="10972440" cy="1144800"/>
+            <a:ext cx="10973520" cy="1144800"/>
           </a:xfrm>
           <a:prstGeom prst="rect">
             <a:avLst/>
@@ -4415,7 +4357,7 @@
         <p:spPr>
           <a:xfrm>
             <a:off x="609480" y="1604520"/>
-            <a:ext cx="10972440" cy="3977280"/>
+            <a:ext cx="10973520" cy="3977280"/>
           </a:xfrm>
           <a:prstGeom prst="rect">
             <a:avLst/>
@@ -4674,18 +4616,18 @@
   </p:cSld>
   <p:clrMap bg1="lt1" bg2="lt2" tx1="dk1" tx2="dk2" accent1="accent1" accent2="accent2" accent3="accent3" accent4="accent4" accent5="accent5" accent6="accent6" hlink="hlink" folHlink="folHlink"/>
   <p:sldLayoutIdLst>
-    <p:sldLayoutId id="2147483662" r:id="rId3"/>
-    <p:sldLayoutId id="2147483663" r:id="rId4"/>
-    <p:sldLayoutId id="2147483664" r:id="rId5"/>
-    <p:sldLayoutId id="2147483665" r:id="rId6"/>
-    <p:sldLayoutId id="2147483666" r:id="rId7"/>
-    <p:sldLayoutId id="2147483667" r:id="rId8"/>
-    <p:sldLayoutId id="2147483668" r:id="rId9"/>
-    <p:sldLayoutId id="2147483669" r:id="rId10"/>
-    <p:sldLayoutId id="2147483670" r:id="rId11"/>
-    <p:sldLayoutId id="2147483671" r:id="rId12"/>
-    <p:sldLayoutId id="2147483672" r:id="rId13"/>
-    <p:sldLayoutId id="2147483673" r:id="rId14"/>
+    <p:sldLayoutId id="2147483662" r:id="rId2"/>
+    <p:sldLayoutId id="2147483663" r:id="rId3"/>
+    <p:sldLayoutId id="2147483664" r:id="rId4"/>
+    <p:sldLayoutId id="2147483665" r:id="rId5"/>
+    <p:sldLayoutId id="2147483666" r:id="rId6"/>
+    <p:sldLayoutId id="2147483667" r:id="rId7"/>
+    <p:sldLayoutId id="2147483668" r:id="rId8"/>
+    <p:sldLayoutId id="2147483669" r:id="rId9"/>
+    <p:sldLayoutId id="2147483670" r:id="rId10"/>
+    <p:sldLayoutId id="2147483671" r:id="rId11"/>
+    <p:sldLayoutId id="2147483672" r:id="rId12"/>
+    <p:sldLayoutId id="2147483673" r:id="rId13"/>
   </p:sldLayoutIdLst>
 </p:sldMaster>
 </file>
@@ -4716,7 +4658,7 @@
         <p:spPr>
           <a:xfrm>
             <a:off x="2928240" y="1380240"/>
-            <a:ext cx="8573040" cy="2614680"/>
+            <a:ext cx="8573400" cy="2614320"/>
           </a:xfrm>
           <a:prstGeom prst="rect">
             <a:avLst/>
@@ -4777,8 +4719,8 @@
         </p:nvSpPr>
         <p:spPr>
           <a:xfrm>
-            <a:off x="4515480" y="3996360"/>
-            <a:ext cx="6986160" cy="1387080"/>
+            <a:off x="4515840" y="3996360"/>
+            <a:ext cx="6986520" cy="1386720"/>
           </a:xfrm>
           <a:prstGeom prst="rect">
             <a:avLst/>
@@ -4889,7 +4831,7 @@
         <p:spPr>
           <a:xfrm>
             <a:off x="1926360" y="463320"/>
-            <a:ext cx="9132840" cy="960480"/>
+            <a:ext cx="9133200" cy="960120"/>
           </a:xfrm>
           <a:prstGeom prst="rect">
             <a:avLst/>
@@ -4964,7 +4906,7 @@
         <p:spPr>
           <a:xfrm>
             <a:off x="1512000" y="2088000"/>
-            <a:ext cx="10017360" cy="3122640"/>
+            <a:ext cx="10017720" cy="3122280"/>
           </a:xfrm>
           <a:prstGeom prst="rect">
             <a:avLst/>
@@ -4983,7 +4925,7 @@
         <p:txBody>
           <a:bodyPr lIns="90000" rIns="90000" tIns="45000" bIns="45000" anchor="ctr"/>
           <a:p>
-            <a:pPr marL="285840" indent="-284400">
+            <a:pPr marL="285840" indent="-284040">
               <a:lnSpc>
                 <a:spcPct val="100000"/>
               </a:lnSpc>
@@ -5007,7 +4949,7 @@
                 <a:latin typeface="Corbel"/>
                 <a:ea typeface="DejaVu Sans"/>
               </a:rPr>
-              <a:t>Compilation of Social media parameters research documentation as per client’s request</a:t>
+              <a:t>Compilation of Social media parameters research documentation, as per client’s request</a:t>
             </a:r>
             <a:endParaRPr b="0" lang="en-ZA" sz="1800" spc="-1" strike="noStrike">
               <a:solidFill>
@@ -5022,7 +4964,7 @@
             </a:endParaRPr>
           </a:p>
           <a:p>
-            <a:pPr marL="285840" indent="-284400">
+            <a:pPr marL="285840" indent="-284040">
               <a:lnSpc>
                 <a:spcPct val="100000"/>
               </a:lnSpc>
@@ -5046,7 +4988,7 @@
                 <a:latin typeface="Corbel"/>
                 <a:ea typeface="DejaVu Sans"/>
               </a:rPr>
-              <a:t>Meeting with Telesure (our client’s client) – Telesure made major changes to the scope of our project which led to a slightly different approach</a:t>
+              <a:t> </a:t>
             </a:r>
             <a:endParaRPr b="0" lang="en-ZA" sz="1800" spc="-1" strike="noStrike">
               <a:solidFill>
@@ -5061,7 +5003,7 @@
             </a:endParaRPr>
           </a:p>
           <a:p>
-            <a:pPr marL="285840" indent="-284400">
+            <a:pPr marL="285840" indent="-284040">
               <a:lnSpc>
                 <a:spcPct val="100000"/>
               </a:lnSpc>
@@ -5085,7 +5027,7 @@
                 <a:latin typeface="Corbel"/>
                 <a:ea typeface="DejaVu Sans"/>
               </a:rPr>
-              <a:t>Sprint planning meeting to discuss project changes</a:t>
+              <a:t>Meeting with Telesure (our client’s client)</a:t>
             </a:r>
             <a:endParaRPr b="0" lang="en-ZA" sz="1800" spc="-1" strike="noStrike">
               <a:solidFill>
@@ -5100,7 +5042,7 @@
             </a:endParaRPr>
           </a:p>
           <a:p>
-            <a:pPr marL="285840" indent="-284400">
+            <a:pPr marL="285840" indent="-284040">
               <a:lnSpc>
                 <a:spcPct val="100000"/>
               </a:lnSpc>
@@ -5124,7 +5066,7 @@
                 <a:latin typeface="Corbel"/>
                 <a:ea typeface="DejaVu Sans"/>
               </a:rPr>
-              <a:t>Collaborative pair programming for 5 days as a team in one location</a:t>
+              <a:t> </a:t>
             </a:r>
             <a:endParaRPr b="0" lang="en-ZA" sz="1800" spc="-1" strike="noStrike">
               <a:solidFill>
@@ -5139,7 +5081,7 @@
             </a:endParaRPr>
           </a:p>
           <a:p>
-            <a:pPr marL="285840" indent="-284400">
+            <a:pPr marL="285840" indent="-284040">
               <a:lnSpc>
                 <a:spcPct val="100000"/>
               </a:lnSpc>
@@ -5163,7 +5105,7 @@
                 <a:latin typeface="Corbel"/>
                 <a:ea typeface="DejaVu Sans"/>
               </a:rPr>
-              <a:t>Weight estimation of sprint backlog </a:t>
+              <a:t>Telesure made major changes to the scope of our project which led to a slightly different approach</a:t>
             </a:r>
             <a:endParaRPr b="0" lang="en-ZA" sz="1800" spc="-1" strike="noStrike">
               <a:solidFill>
@@ -5178,7 +5120,7 @@
             </a:endParaRPr>
           </a:p>
           <a:p>
-            <a:pPr marL="285840" indent="-284400">
+            <a:pPr marL="285840" indent="-284040">
               <a:lnSpc>
                 <a:spcPct val="100000"/>
               </a:lnSpc>
@@ -5202,7 +5144,7 @@
                 <a:latin typeface="Corbel"/>
                 <a:ea typeface="DejaVu Sans"/>
               </a:rPr>
-              <a:t>Follow up meeting after completion of previous sprint and to receive next sprint backlog</a:t>
+              <a:t> </a:t>
             </a:r>
             <a:endParaRPr b="0" lang="en-ZA" sz="1800" spc="-1" strike="noStrike">
               <a:solidFill>
@@ -5217,7 +5159,7 @@
             </a:endParaRPr>
           </a:p>
           <a:p>
-            <a:pPr marL="285840" indent="-284400">
+            <a:pPr marL="285840" indent="-284040">
               <a:lnSpc>
                 <a:spcPct val="100000"/>
               </a:lnSpc>
@@ -5241,7 +5183,46 @@
                 <a:latin typeface="Corbel"/>
                 <a:ea typeface="DejaVu Sans"/>
               </a:rPr>
-              <a:t>Multiple stand up meetings per day </a:t>
+              <a:t>Sprint planning meeting to discuss project changes</a:t>
+            </a:r>
+            <a:endParaRPr b="0" lang="en-ZA" sz="1800" spc="-1" strike="noStrike">
+              <a:solidFill>
+                <a:srgbClr val="000000"/>
+              </a:solidFill>
+              <a:uFill>
+                <a:solidFill>
+                  <a:srgbClr val="ffffff"/>
+                </a:solidFill>
+              </a:uFill>
+              <a:latin typeface="Arial"/>
+            </a:endParaRPr>
+          </a:p>
+          <a:p>
+            <a:pPr marL="285840" indent="-284040">
+              <a:lnSpc>
+                <a:spcPct val="100000"/>
+              </a:lnSpc>
+              <a:buClr>
+                <a:srgbClr val="1287c3"/>
+              </a:buClr>
+              <a:buSzPct val="145000"/>
+              <a:buFont typeface="Arial"/>
+              <a:buChar char="•"/>
+            </a:pPr>
+            <a:r>
+              <a:rPr b="0" lang="en-ZA" sz="2400" spc="-1" strike="noStrike">
+                <a:solidFill>
+                  <a:srgbClr val="000000"/>
+                </a:solidFill>
+                <a:uFill>
+                  <a:solidFill>
+                    <a:srgbClr val="ffffff"/>
+                  </a:solidFill>
+                </a:uFill>
+                <a:latin typeface="Corbel"/>
+                <a:ea typeface="DejaVu Sans"/>
+              </a:rPr>
+              <a:t> </a:t>
             </a:r>
             <a:endParaRPr b="0" lang="en-ZA" sz="1800" spc="-1" strike="noStrike">
               <a:solidFill>
@@ -5265,7 +5246,251 @@
         <p:cTn id="3" dur="indefinite" restart="never" nodeType="tmRoot">
           <p:childTnLst>
             <p:seq>
-              <p:cTn id="4" nodeType="mainSeq"/>
+              <p:cTn id="4" nodeType="mainSeq">
+                <p:childTnLst>
+                  <p:par>
+                    <p:cTn id="5" fill="freeze">
+                      <p:stCondLst>
+                        <p:cond delay="0"/>
+                      </p:stCondLst>
+                      <p:childTnLst>
+                        <p:par>
+                          <p:cTn id="6" fill="freeze">
+                            <p:stCondLst>
+                              <p:cond delay="0"/>
+                            </p:stCondLst>
+                            <p:childTnLst>
+                              <p:par>
+                                <p:cTn id="7" nodeType="withEffect" fill="hold" presetClass="entr" presetID="1">
+                                  <p:stCondLst>
+                                    <p:cond delay="0"/>
+                                  </p:stCondLst>
+                                  <p:childTnLst>
+                                    <p:set>
+                                      <p:cBhvr>
+                                        <p:cTn id="8" dur="1" fill="hold">
+                                          <p:stCondLst>
+                                            <p:cond delay="0"/>
+                                          </p:stCondLst>
+                                        </p:cTn>
+                                        <p:tgtEl>
+                                          <p:spTgt spid="93"/>
+                                        </p:tgtEl>
+                                        <p:attrNameLst>
+                                          <p:attrName>style.visibility</p:attrName>
+                                        </p:attrNameLst>
+                                      </p:cBhvr>
+                                      <p:to>
+                                        <p:strVal val="visible"/>
+                                      </p:to>
+                                    </p:set>
+                                  </p:childTnLst>
+                                </p:cTn>
+                              </p:par>
+                            </p:childTnLst>
+                          </p:cTn>
+                        </p:par>
+                      </p:childTnLst>
+                    </p:cTn>
+                  </p:par>
+                  <p:par>
+                    <p:cTn id="9" fill="freeze">
+                      <p:stCondLst>
+                        <p:cond delay="indefinite"/>
+                      </p:stCondLst>
+                      <p:childTnLst>
+                        <p:par>
+                          <p:cTn id="10" fill="freeze">
+                            <p:stCondLst>
+                              <p:cond delay="0"/>
+                            </p:stCondLst>
+                            <p:childTnLst>
+                              <p:par>
+                                <p:cTn id="11" nodeType="clickEffect" fill="hold" presetClass="entr" presetID="1">
+                                  <p:stCondLst>
+                                    <p:cond delay="0"/>
+                                  </p:stCondLst>
+                                  <p:childTnLst>
+                                    <p:set>
+                                      <p:cBhvr>
+                                        <p:cTn id="12" dur="1" fill="hold">
+                                          <p:stCondLst>
+                                            <p:cond delay="0"/>
+                                          </p:stCondLst>
+                                        </p:cTn>
+                                        <p:tgtEl>
+                                          <p:spTgt spid="93">
+                                            <p:txEl>
+                                              <p:pRg st="0" end="87"/>
+                                            </p:txEl>
+                                          </p:spTgt>
+                                        </p:tgtEl>
+                                        <p:attrNameLst>
+                                          <p:attrName>style.visibility</p:attrName>
+                                        </p:attrNameLst>
+                                      </p:cBhvr>
+                                      <p:to>
+                                        <p:strVal val="visible"/>
+                                      </p:to>
+                                    </p:set>
+                                  </p:childTnLst>
+                                </p:cTn>
+                              </p:par>
+                            </p:childTnLst>
+                          </p:cTn>
+                        </p:par>
+                      </p:childTnLst>
+                    </p:cTn>
+                  </p:par>
+                  <p:par>
+                    <p:cTn id="13" fill="freeze">
+                      <p:stCondLst>
+                        <p:cond delay="indefinite"/>
+                      </p:stCondLst>
+                      <p:childTnLst>
+                        <p:par>
+                          <p:cTn id="14" fill="freeze">
+                            <p:stCondLst>
+                              <p:cond delay="0"/>
+                            </p:stCondLst>
+                            <p:childTnLst>
+                              <p:par>
+                                <p:cTn id="15" nodeType="clickEffect" fill="hold" presetClass="entr" presetID="1">
+                                  <p:stCondLst>
+                                    <p:cond delay="0"/>
+                                  </p:stCondLst>
+                                  <p:childTnLst>
+                                    <p:set>
+                                      <p:cBhvr>
+                                        <p:cTn id="16" dur="1" fill="hold">
+                                          <p:stCondLst>
+                                            <p:cond delay="0"/>
+                                          </p:stCondLst>
+                                        </p:cTn>
+                                        <p:tgtEl>
+                                          <p:spTgt spid="93">
+                                            <p:txEl>
+                                              <p:pRg st="88" end="132"/>
+                                            </p:txEl>
+                                          </p:spTgt>
+                                        </p:tgtEl>
+                                        <p:attrNameLst>
+                                          <p:attrName>style.visibility</p:attrName>
+                                        </p:attrNameLst>
+                                      </p:cBhvr>
+                                      <p:to>
+                                        <p:strVal val="visible"/>
+                                      </p:to>
+                                    </p:set>
+                                  </p:childTnLst>
+                                </p:cTn>
+                              </p:par>
+                            </p:childTnLst>
+                          </p:cTn>
+                        </p:par>
+                      </p:childTnLst>
+                    </p:cTn>
+                  </p:par>
+                  <p:par>
+                    <p:cTn id="17" fill="freeze">
+                      <p:stCondLst>
+                        <p:cond delay="indefinite"/>
+                      </p:stCondLst>
+                      <p:childTnLst>
+                        <p:par>
+                          <p:cTn id="18" fill="freeze">
+                            <p:stCondLst>
+                              <p:cond delay="0"/>
+                            </p:stCondLst>
+                            <p:childTnLst>
+                              <p:par>
+                                <p:cTn id="19" nodeType="clickEffect" fill="hold" presetClass="entr" presetID="1">
+                                  <p:stCondLst>
+                                    <p:cond delay="0"/>
+                                  </p:stCondLst>
+                                  <p:childTnLst>
+                                    <p:set>
+                                      <p:cBhvr>
+                                        <p:cTn id="20" dur="1" fill="hold">
+                                          <p:stCondLst>
+                                            <p:cond delay="0"/>
+                                          </p:stCondLst>
+                                        </p:cTn>
+                                        <p:tgtEl>
+                                          <p:spTgt spid="93">
+                                            <p:txEl>
+                                              <p:pRg st="133" end="232"/>
+                                            </p:txEl>
+                                          </p:spTgt>
+                                        </p:tgtEl>
+                                        <p:attrNameLst>
+                                          <p:attrName>style.visibility</p:attrName>
+                                        </p:attrNameLst>
+                                      </p:cBhvr>
+                                      <p:to>
+                                        <p:strVal val="visible"/>
+                                      </p:to>
+                                    </p:set>
+                                  </p:childTnLst>
+                                </p:cTn>
+                              </p:par>
+                            </p:childTnLst>
+                          </p:cTn>
+                        </p:par>
+                      </p:childTnLst>
+                    </p:cTn>
+                  </p:par>
+                  <p:par>
+                    <p:cTn id="21" fill="freeze">
+                      <p:stCondLst>
+                        <p:cond delay="indefinite"/>
+                      </p:stCondLst>
+                      <p:childTnLst>
+                        <p:par>
+                          <p:cTn id="22" fill="freeze">
+                            <p:stCondLst>
+                              <p:cond delay="0"/>
+                            </p:stCondLst>
+                            <p:childTnLst>
+                              <p:par>
+                                <p:cTn id="23" nodeType="clickEffect" fill="hold" presetClass="entr" presetID="1">
+                                  <p:stCondLst>
+                                    <p:cond delay="0"/>
+                                  </p:stCondLst>
+                                  <p:childTnLst>
+                                    <p:set>
+                                      <p:cBhvr>
+                                        <p:cTn id="24" dur="1" fill="hold">
+                                          <p:stCondLst>
+                                            <p:cond delay="0"/>
+                                          </p:stCondLst>
+                                        </p:cTn>
+                                        <p:tgtEl>
+                                          <p:spTgt spid="93">
+                                            <p:txEl>
+                                              <p:pRg st="233" end="284"/>
+                                            </p:txEl>
+                                          </p:spTgt>
+                                        </p:tgtEl>
+                                        <p:attrNameLst>
+                                          <p:attrName>style.visibility</p:attrName>
+                                        </p:attrNameLst>
+                                      </p:cBhvr>
+                                      <p:to>
+                                        <p:strVal val="visible"/>
+                                      </p:to>
+                                    </p:set>
+                                  </p:childTnLst>
+                                </p:cTn>
+                              </p:par>
+                            </p:childTnLst>
+                          </p:cTn>
+                        </p:par>
+                      </p:childTnLst>
+                    </p:cTn>
+                  </p:par>
+                </p:childTnLst>
+              </p:cTn>
               <p:prevCondLst>
                 <p:cond delay="0" evt="onPrev">
                   <p:tgtEl>
@@ -5314,8 +5539,8 @@
         </p:nvSpPr>
         <p:spPr>
           <a:xfrm>
-            <a:off x="1484280" y="158400"/>
-            <a:ext cx="10017360" cy="1751040"/>
+            <a:off x="1512000" y="1440000"/>
+            <a:ext cx="10017720" cy="3122280"/>
           </a:xfrm>
           <a:prstGeom prst="rect">
             <a:avLst/>
@@ -5334,82 +5559,7 @@
         <p:txBody>
           <a:bodyPr lIns="90000" rIns="90000" tIns="45000" bIns="45000" anchor="ctr"/>
           <a:p>
-            <a:r>
-              <a:rPr b="0" lang="en-ZA" sz="4000" spc="-1" strike="noStrike">
-                <a:solidFill>
-                  <a:srgbClr val="000000"/>
-                </a:solidFill>
-                <a:uFill>
-                  <a:solidFill>
-                    <a:srgbClr val="ffffff"/>
-                  </a:solidFill>
-                </a:uFill>
-                <a:latin typeface="Corbel"/>
-                <a:ea typeface="DejaVu Sans"/>
-              </a:rPr>
-              <a:t>Agile board:</a:t>
-            </a:r>
-            <a:endParaRPr b="0" lang="en-ZA" sz="1800" spc="-1" strike="noStrike">
-              <a:solidFill>
-                <a:srgbClr val="000000"/>
-              </a:solidFill>
-              <a:uFill>
-                <a:solidFill>
-                  <a:srgbClr val="ffffff"/>
-                </a:solidFill>
-              </a:uFill>
-              <a:latin typeface="Arial"/>
-            </a:endParaRPr>
-          </a:p>
-          <a:p>
-            <a:pPr algn="ctr">
-              <a:lnSpc>
-                <a:spcPct val="100000"/>
-              </a:lnSpc>
-            </a:pPr>
-            <a:endParaRPr b="0" lang="en-ZA" sz="1800" spc="-1" strike="noStrike">
-              <a:solidFill>
-                <a:srgbClr val="000000"/>
-              </a:solidFill>
-              <a:uFill>
-                <a:solidFill>
-                  <a:srgbClr val="ffffff"/>
-                </a:solidFill>
-              </a:uFill>
-              <a:latin typeface="Arial"/>
-            </a:endParaRPr>
-          </a:p>
-        </p:txBody>
-      </p:sp>
-      <p:sp>
-        <p:nvSpPr>
-          <p:cNvPr id="95" name="CustomShape 2"/>
-          <p:cNvSpPr/>
-          <p:nvPr/>
-        </p:nvSpPr>
-        <p:spPr>
-          <a:xfrm>
-            <a:off x="1484280" y="2666880"/>
-            <a:ext cx="10017360" cy="3122640"/>
-          </a:xfrm>
-          <a:prstGeom prst="rect">
-            <a:avLst/>
-          </a:prstGeom>
-          <a:noFill/>
-          <a:ln>
-            <a:noFill/>
-          </a:ln>
-        </p:spPr>
-        <p:style>
-          <a:lnRef idx="0"/>
-          <a:fillRef idx="0"/>
-          <a:effectRef idx="0"/>
-          <a:fontRef idx="minor"/>
-        </p:style>
-        <p:txBody>
-          <a:bodyPr lIns="90000" rIns="90000" tIns="45000" bIns="45000" anchor="ctr"/>
-          <a:p>
-            <a:pPr marL="285840" indent="-284400">
+            <a:pPr marL="285840" indent="-284040">
               <a:lnSpc>
                 <a:spcPct val="100000"/>
               </a:lnSpc>
@@ -5433,7 +5583,7 @@
                 <a:latin typeface="Corbel"/>
                 <a:ea typeface="DejaVu Sans"/>
               </a:rPr>
-              <a:t>*insert waffle board*</a:t>
+              <a:t>Collaborative pair programming for 5 days as a team in one location</a:t>
             </a:r>
             <a:endParaRPr b="0" lang="en-ZA" sz="1800" spc="-1" strike="noStrike">
               <a:solidFill>
@@ -5448,11 +5598,32 @@
             </a:endParaRPr>
           </a:p>
           <a:p>
-            <a:pPr>
+            <a:pPr marL="285840" indent="-284040">
               <a:lnSpc>
                 <a:spcPct val="100000"/>
               </a:lnSpc>
+              <a:buClr>
+                <a:srgbClr val="1287c3"/>
+              </a:buClr>
+              <a:buSzPct val="145000"/>
+              <a:buFont typeface="Arial"/>
+              <a:buChar char="•"/>
             </a:pPr>
+            <a:r>
+              <a:rPr b="0" lang="en-ZA" sz="2400" spc="-1" strike="noStrike">
+                <a:solidFill>
+                  <a:srgbClr val="000000"/>
+                </a:solidFill>
+                <a:uFill>
+                  <a:solidFill>
+                    <a:srgbClr val="ffffff"/>
+                  </a:solidFill>
+                </a:uFill>
+                <a:latin typeface="Corbel"/>
+                <a:ea typeface="DejaVu Sans"/>
+              </a:rPr>
+              <a:t> </a:t>
+            </a:r>
             <a:endParaRPr b="0" lang="en-ZA" sz="1800" spc="-1" strike="noStrike">
               <a:solidFill>
                 <a:srgbClr val="000000"/>
@@ -5465,40 +5636,456 @@
               <a:latin typeface="Arial"/>
             </a:endParaRPr>
           </a:p>
+          <a:p>
+            <a:pPr marL="285840" indent="-284040">
+              <a:lnSpc>
+                <a:spcPct val="100000"/>
+              </a:lnSpc>
+              <a:buClr>
+                <a:srgbClr val="1287c3"/>
+              </a:buClr>
+              <a:buSzPct val="145000"/>
+              <a:buFont typeface="Arial"/>
+              <a:buChar char="•"/>
+            </a:pPr>
+            <a:r>
+              <a:rPr b="0" lang="en-ZA" sz="2400" spc="-1" strike="noStrike">
+                <a:solidFill>
+                  <a:srgbClr val="000000"/>
+                </a:solidFill>
+                <a:uFill>
+                  <a:solidFill>
+                    <a:srgbClr val="ffffff"/>
+                  </a:solidFill>
+                </a:uFill>
+                <a:latin typeface="Corbel"/>
+                <a:ea typeface="DejaVu Sans"/>
+              </a:rPr>
+              <a:t>Weight estimation of sprint backlog</a:t>
+            </a:r>
+            <a:endParaRPr b="0" lang="en-ZA" sz="1800" spc="-1" strike="noStrike">
+              <a:solidFill>
+                <a:srgbClr val="000000"/>
+              </a:solidFill>
+              <a:uFill>
+                <a:solidFill>
+                  <a:srgbClr val="ffffff"/>
+                </a:solidFill>
+              </a:uFill>
+              <a:latin typeface="Arial"/>
+            </a:endParaRPr>
+          </a:p>
+          <a:p>
+            <a:pPr marL="285840" indent="-284040">
+              <a:lnSpc>
+                <a:spcPct val="100000"/>
+              </a:lnSpc>
+              <a:buClr>
+                <a:srgbClr val="1287c3"/>
+              </a:buClr>
+              <a:buSzPct val="145000"/>
+              <a:buFont typeface="Arial"/>
+              <a:buChar char="•"/>
+            </a:pPr>
+            <a:r>
+              <a:rPr b="0" lang="en-ZA" sz="2400" spc="-1" strike="noStrike">
+                <a:solidFill>
+                  <a:srgbClr val="000000"/>
+                </a:solidFill>
+                <a:uFill>
+                  <a:solidFill>
+                    <a:srgbClr val="ffffff"/>
+                  </a:solidFill>
+                </a:uFill>
+                <a:latin typeface="Corbel"/>
+                <a:ea typeface="DejaVu Sans"/>
+              </a:rPr>
+              <a:t> </a:t>
+            </a:r>
+            <a:endParaRPr b="0" lang="en-ZA" sz="1800" spc="-1" strike="noStrike">
+              <a:solidFill>
+                <a:srgbClr val="000000"/>
+              </a:solidFill>
+              <a:uFill>
+                <a:solidFill>
+                  <a:srgbClr val="ffffff"/>
+                </a:solidFill>
+              </a:uFill>
+              <a:latin typeface="Arial"/>
+            </a:endParaRPr>
+          </a:p>
+          <a:p>
+            <a:pPr marL="285840" indent="-284040">
+              <a:lnSpc>
+                <a:spcPct val="100000"/>
+              </a:lnSpc>
+              <a:buClr>
+                <a:srgbClr val="1287c3"/>
+              </a:buClr>
+              <a:buSzPct val="145000"/>
+              <a:buFont typeface="Arial"/>
+              <a:buChar char="•"/>
+            </a:pPr>
+            <a:r>
+              <a:rPr b="0" lang="en-ZA" sz="2400" spc="-1" strike="noStrike">
+                <a:solidFill>
+                  <a:srgbClr val="000000"/>
+                </a:solidFill>
+                <a:uFill>
+                  <a:solidFill>
+                    <a:srgbClr val="ffffff"/>
+                  </a:solidFill>
+                </a:uFill>
+                <a:latin typeface="Corbel"/>
+                <a:ea typeface="DejaVu Sans"/>
+              </a:rPr>
+              <a:t>Follow up meeting after completion of previous sprint and to receive next sprint backlog</a:t>
+            </a:r>
+            <a:endParaRPr b="0" lang="en-ZA" sz="1800" spc="-1" strike="noStrike">
+              <a:solidFill>
+                <a:srgbClr val="000000"/>
+              </a:solidFill>
+              <a:uFill>
+                <a:solidFill>
+                  <a:srgbClr val="ffffff"/>
+                </a:solidFill>
+              </a:uFill>
+              <a:latin typeface="Arial"/>
+            </a:endParaRPr>
+          </a:p>
+          <a:p>
+            <a:pPr marL="285840" indent="-284040">
+              <a:lnSpc>
+                <a:spcPct val="100000"/>
+              </a:lnSpc>
+              <a:buClr>
+                <a:srgbClr val="1287c3"/>
+              </a:buClr>
+              <a:buSzPct val="145000"/>
+              <a:buFont typeface="Arial"/>
+              <a:buChar char="•"/>
+            </a:pPr>
+            <a:r>
+              <a:rPr b="0" lang="en-ZA" sz="2400" spc="-1" strike="noStrike">
+                <a:solidFill>
+                  <a:srgbClr val="000000"/>
+                </a:solidFill>
+                <a:uFill>
+                  <a:solidFill>
+                    <a:srgbClr val="ffffff"/>
+                  </a:solidFill>
+                </a:uFill>
+                <a:latin typeface="Corbel"/>
+                <a:ea typeface="DejaVu Sans"/>
+              </a:rPr>
+              <a:t> </a:t>
+            </a:r>
+            <a:endParaRPr b="0" lang="en-ZA" sz="1800" spc="-1" strike="noStrike">
+              <a:solidFill>
+                <a:srgbClr val="000000"/>
+              </a:solidFill>
+              <a:uFill>
+                <a:solidFill>
+                  <a:srgbClr val="ffffff"/>
+                </a:solidFill>
+              </a:uFill>
+              <a:latin typeface="Arial"/>
+            </a:endParaRPr>
+          </a:p>
+          <a:p>
+            <a:pPr marL="285840" indent="-284040">
+              <a:lnSpc>
+                <a:spcPct val="100000"/>
+              </a:lnSpc>
+              <a:buClr>
+                <a:srgbClr val="1287c3"/>
+              </a:buClr>
+              <a:buSzPct val="145000"/>
+              <a:buFont typeface="Arial"/>
+              <a:buChar char="•"/>
+            </a:pPr>
+            <a:r>
+              <a:rPr b="0" lang="en-ZA" sz="2400" spc="-1" strike="noStrike">
+                <a:solidFill>
+                  <a:srgbClr val="000000"/>
+                </a:solidFill>
+                <a:uFill>
+                  <a:solidFill>
+                    <a:srgbClr val="ffffff"/>
+                  </a:solidFill>
+                </a:uFill>
+                <a:latin typeface="Corbel"/>
+                <a:ea typeface="DejaVu Sans"/>
+              </a:rPr>
+              <a:t>Multiple stand up meetings per day </a:t>
+            </a:r>
+            <a:endParaRPr b="0" lang="en-ZA" sz="1800" spc="-1" strike="noStrike">
+              <a:solidFill>
+                <a:srgbClr val="000000"/>
+              </a:solidFill>
+              <a:uFill>
+                <a:solidFill>
+                  <a:srgbClr val="ffffff"/>
+                </a:solidFill>
+              </a:uFill>
+              <a:latin typeface="Arial"/>
+            </a:endParaRPr>
+          </a:p>
         </p:txBody>
       </p:sp>
-      <p:pic>
-        <p:nvPicPr>
-          <p:cNvPr id="96" name="" descr=""/>
-          <p:cNvPicPr/>
-          <p:nvPr/>
-        </p:nvPicPr>
-        <p:blipFill>
-          <a:blip r:embed="rId1"/>
-          <a:stretch/>
-        </p:blipFill>
-        <p:spPr>
-          <a:xfrm>
-            <a:off x="216000" y="360000"/>
-            <a:ext cx="11832480" cy="5845680"/>
-          </a:xfrm>
-          <a:prstGeom prst="rect">
-            <a:avLst/>
-          </a:prstGeom>
-          <a:ln>
-            <a:noFill/>
-          </a:ln>
-        </p:spPr>
-      </p:pic>
     </p:spTree>
   </p:cSld>
   <p:timing>
     <p:tnLst>
       <p:par>
-        <p:cTn id="5" dur="indefinite" restart="never" nodeType="tmRoot">
+        <p:cTn id="25" dur="indefinite" restart="never" nodeType="tmRoot">
           <p:childTnLst>
             <p:seq>
-              <p:cTn id="6" nodeType="mainSeq"/>
+              <p:cTn id="26" nodeType="mainSeq">
+                <p:childTnLst>
+                  <p:par>
+                    <p:cTn id="27" fill="freeze">
+                      <p:stCondLst>
+                        <p:cond delay="0"/>
+                      </p:stCondLst>
+                      <p:childTnLst>
+                        <p:par>
+                          <p:cTn id="28" fill="freeze">
+                            <p:stCondLst>
+                              <p:cond delay="0"/>
+                            </p:stCondLst>
+                            <p:childTnLst>
+                              <p:par>
+                                <p:cTn id="29" nodeType="withEffect" fill="hold" presetClass="entr" presetID="1">
+                                  <p:stCondLst>
+                                    <p:cond delay="0"/>
+                                  </p:stCondLst>
+                                  <p:childTnLst>
+                                    <p:set>
+                                      <p:cBhvr>
+                                        <p:cTn id="30" dur="1" fill="hold">
+                                          <p:stCondLst>
+                                            <p:cond delay="0"/>
+                                          </p:stCondLst>
+                                        </p:cTn>
+                                        <p:tgtEl>
+                                          <p:spTgt spid="94"/>
+                                        </p:tgtEl>
+                                        <p:attrNameLst>
+                                          <p:attrName>style.visibility</p:attrName>
+                                        </p:attrNameLst>
+                                      </p:cBhvr>
+                                      <p:to>
+                                        <p:strVal val="visible"/>
+                                      </p:to>
+                                    </p:set>
+                                  </p:childTnLst>
+                                </p:cTn>
+                              </p:par>
+                            </p:childTnLst>
+                          </p:cTn>
+                        </p:par>
+                      </p:childTnLst>
+                    </p:cTn>
+                  </p:par>
+                  <p:par>
+                    <p:cTn id="31" fill="freeze">
+                      <p:stCondLst>
+                        <p:cond delay="indefinite"/>
+                      </p:stCondLst>
+                      <p:childTnLst>
+                        <p:par>
+                          <p:cTn id="32" fill="freeze">
+                            <p:stCondLst>
+                              <p:cond delay="0"/>
+                            </p:stCondLst>
+                            <p:childTnLst>
+                              <p:par>
+                                <p:cTn id="33" nodeType="clickEffect" fill="hold" presetClass="entr" presetID="1">
+                                  <p:stCondLst>
+                                    <p:cond delay="0"/>
+                                  </p:stCondLst>
+                                  <p:childTnLst>
+                                    <p:set>
+                                      <p:cBhvr>
+                                        <p:cTn id="34" dur="1" fill="hold">
+                                          <p:stCondLst>
+                                            <p:cond delay="0"/>
+                                          </p:stCondLst>
+                                        </p:cTn>
+                                        <p:tgtEl>
+                                          <p:spTgt spid="94">
+                                            <p:txEl>
+                                              <p:pRg st="0" end="68"/>
+                                            </p:txEl>
+                                          </p:spTgt>
+                                        </p:tgtEl>
+                                        <p:attrNameLst>
+                                          <p:attrName>style.visibility</p:attrName>
+                                        </p:attrNameLst>
+                                      </p:cBhvr>
+                                      <p:to>
+                                        <p:strVal val="visible"/>
+                                      </p:to>
+                                    </p:set>
+                                  </p:childTnLst>
+                                </p:cTn>
+                              </p:par>
+                            </p:childTnLst>
+                          </p:cTn>
+                        </p:par>
+                      </p:childTnLst>
+                    </p:cTn>
+                  </p:par>
+                  <p:par>
+                    <p:cTn id="35" fill="freeze">
+                      <p:stCondLst>
+                        <p:cond delay="indefinite"/>
+                      </p:stCondLst>
+                      <p:childTnLst>
+                        <p:par>
+                          <p:cTn id="36" fill="freeze">
+                            <p:stCondLst>
+                              <p:cond delay="0"/>
+                            </p:stCondLst>
+                            <p:childTnLst>
+                              <p:par>
+                                <p:cTn id="37" nodeType="clickEffect" fill="hold" presetClass="entr" presetID="1">
+                                  <p:stCondLst>
+                                    <p:cond delay="0"/>
+                                  </p:stCondLst>
+                                  <p:childTnLst>
+                                    <p:set>
+                                      <p:cBhvr>
+                                        <p:cTn id="38" dur="1" fill="hold">
+                                          <p:stCondLst>
+                                            <p:cond delay="0"/>
+                                          </p:stCondLst>
+                                        </p:cTn>
+                                        <p:tgtEl>
+                                          <p:spTgt spid="94">
+                                            <p:txEl>
+                                              <p:pRg st="69" end="105"/>
+                                            </p:txEl>
+                                          </p:spTgt>
+                                        </p:tgtEl>
+                                        <p:attrNameLst>
+                                          <p:attrName>style.visibility</p:attrName>
+                                        </p:attrNameLst>
+                                      </p:cBhvr>
+                                      <p:to>
+                                        <p:strVal val="visible"/>
+                                      </p:to>
+                                    </p:set>
+                                  </p:childTnLst>
+                                </p:cTn>
+                              </p:par>
+                            </p:childTnLst>
+                          </p:cTn>
+                        </p:par>
+                      </p:childTnLst>
+                    </p:cTn>
+                  </p:par>
+                  <p:par>
+                    <p:cTn id="39" fill="freeze">
+                      <p:stCondLst>
+                        <p:cond delay="indefinite"/>
+                      </p:stCondLst>
+                      <p:childTnLst>
+                        <p:par>
+                          <p:cTn id="40" fill="freeze">
+                            <p:stCondLst>
+                              <p:cond delay="0"/>
+                            </p:stCondLst>
+                            <p:childTnLst>
+                              <p:par>
+                                <p:cTn id="41" nodeType="clickEffect" fill="hold" presetClass="entr" presetID="1">
+                                  <p:stCondLst>
+                                    <p:cond delay="0"/>
+                                  </p:stCondLst>
+                                  <p:childTnLst>
+                                    <p:set>
+                                      <p:cBhvr>
+                                        <p:cTn id="42" dur="1" fill="hold">
+                                          <p:stCondLst>
+                                            <p:cond delay="0"/>
+                                          </p:stCondLst>
+                                        </p:cTn>
+                                        <p:tgtEl>
+                                          <p:spTgt spid="94">
+                                            <p:txEl>
+                                              <p:pRg st="107" end="196"/>
+                                            </p:txEl>
+                                          </p:spTgt>
+                                        </p:tgtEl>
+                                        <p:attrNameLst>
+                                          <p:attrName>style.visibility</p:attrName>
+                                        </p:attrNameLst>
+                                      </p:cBhvr>
+                                      <p:to>
+                                        <p:strVal val="visible"/>
+                                      </p:to>
+                                    </p:set>
+                                  </p:childTnLst>
+                                </p:cTn>
+                              </p:par>
+                            </p:childTnLst>
+                          </p:cTn>
+                        </p:par>
+                      </p:childTnLst>
+                    </p:cTn>
+                  </p:par>
+                  <p:par>
+                    <p:cTn id="43" fill="freeze">
+                      <p:stCondLst>
+                        <p:cond delay="indefinite"/>
+                      </p:stCondLst>
+                      <p:childTnLst>
+                        <p:par>
+                          <p:cTn id="44" fill="freeze">
+                            <p:stCondLst>
+                              <p:cond delay="0"/>
+                            </p:stCondLst>
+                            <p:childTnLst>
+                              <p:par>
+                                <p:cTn id="45" nodeType="clickEffect" fill="hold" presetClass="entr" presetID="1">
+                                  <p:stCondLst>
+                                    <p:cond delay="0"/>
+                                  </p:stCondLst>
+                                  <p:childTnLst>
+                                    <p:set>
+                                      <p:cBhvr>
+                                        <p:cTn id="46" dur="1" fill="hold">
+                                          <p:stCondLst>
+                                            <p:cond delay="0"/>
+                                          </p:stCondLst>
+                                        </p:cTn>
+                                        <p:tgtEl>
+                                          <p:spTgt spid="94">
+                                            <p:txEl>
+                                              <p:pRg st="197" end="233"/>
+                                            </p:txEl>
+                                          </p:spTgt>
+                                        </p:tgtEl>
+                                        <p:attrNameLst>
+                                          <p:attrName>style.visibility</p:attrName>
+                                        </p:attrNameLst>
+                                      </p:cBhvr>
+                                      <p:to>
+                                        <p:strVal val="visible"/>
+                                      </p:to>
+                                    </p:set>
+                                  </p:childTnLst>
+                                </p:cTn>
+                              </p:par>
+                            </p:childTnLst>
+                          </p:cTn>
+                        </p:par>
+                      </p:childTnLst>
+                    </p:cTn>
+                  </p:par>
+                </p:childTnLst>
+              </p:cTn>
               <p:prevCondLst>
                 <p:cond delay="0" evt="onPrev">
                   <p:tgtEl>
@@ -5541,14 +6128,14 @@
       </p:grpSpPr>
       <p:sp>
         <p:nvSpPr>
-          <p:cNvPr id="97" name="CustomShape 1"/>
+          <p:cNvPr id="95" name="CustomShape 1"/>
           <p:cNvSpPr/>
           <p:nvPr/>
         </p:nvSpPr>
         <p:spPr>
           <a:xfrm>
-            <a:off x="3911400" y="199800"/>
-            <a:ext cx="4697640" cy="441360"/>
+            <a:off x="1484280" y="158400"/>
+            <a:ext cx="10017720" cy="1750680"/>
           </a:xfrm>
           <a:prstGeom prst="rect">
             <a:avLst/>
@@ -5567,11 +6154,6 @@
         <p:txBody>
           <a:bodyPr lIns="90000" rIns="90000" tIns="45000" bIns="45000" anchor="ctr"/>
           <a:p>
-            <a:pPr algn="ctr">
-              <a:lnSpc>
-                <a:spcPct val="100000"/>
-              </a:lnSpc>
-            </a:pPr>
             <a:r>
               <a:rPr b="0" lang="en-ZA" sz="4000" spc="-1" strike="noStrike">
                 <a:solidFill>
@@ -5585,7 +6167,7 @@
                 <a:latin typeface="Corbel"/>
                 <a:ea typeface="DejaVu Sans"/>
               </a:rPr>
-              <a:t>Sprint #1</a:t>
+              <a:t>Agile board:</a:t>
             </a:r>
             <a:endParaRPr b="0" lang="en-ZA" sz="1800" spc="-1" strike="noStrike">
               <a:solidFill>
@@ -5599,23 +6181,126 @@
               <a:latin typeface="Arial"/>
             </a:endParaRPr>
           </a:p>
+          <a:p>
+            <a:pPr algn="ctr">
+              <a:lnSpc>
+                <a:spcPct val="100000"/>
+              </a:lnSpc>
+            </a:pPr>
+            <a:endParaRPr b="0" lang="en-ZA" sz="1800" spc="-1" strike="noStrike">
+              <a:solidFill>
+                <a:srgbClr val="000000"/>
+              </a:solidFill>
+              <a:uFill>
+                <a:solidFill>
+                  <a:srgbClr val="ffffff"/>
+                </a:solidFill>
+              </a:uFill>
+              <a:latin typeface="Arial"/>
+            </a:endParaRPr>
+          </a:p>
+        </p:txBody>
+      </p:sp>
+      <p:sp>
+        <p:nvSpPr>
+          <p:cNvPr id="96" name="CustomShape 2"/>
+          <p:cNvSpPr/>
+          <p:nvPr/>
+        </p:nvSpPr>
+        <p:spPr>
+          <a:xfrm>
+            <a:off x="1484280" y="2666880"/>
+            <a:ext cx="10017720" cy="3122280"/>
+          </a:xfrm>
+          <a:prstGeom prst="rect">
+            <a:avLst/>
+          </a:prstGeom>
+          <a:noFill/>
+          <a:ln>
+            <a:noFill/>
+          </a:ln>
+        </p:spPr>
+        <p:style>
+          <a:lnRef idx="0"/>
+          <a:fillRef idx="0"/>
+          <a:effectRef idx="0"/>
+          <a:fontRef idx="minor"/>
+        </p:style>
+        <p:txBody>
+          <a:bodyPr lIns="90000" rIns="90000" tIns="45000" bIns="45000" anchor="ctr"/>
+          <a:p>
+            <a:pPr marL="285840" indent="-284040">
+              <a:lnSpc>
+                <a:spcPct val="100000"/>
+              </a:lnSpc>
+              <a:buClr>
+                <a:srgbClr val="1287c3"/>
+              </a:buClr>
+              <a:buSzPct val="145000"/>
+              <a:buFont typeface="Arial"/>
+              <a:buChar char="•"/>
+            </a:pPr>
+            <a:r>
+              <a:rPr b="0" lang="en-ZA" sz="2400" spc="-1" strike="noStrike">
+                <a:solidFill>
+                  <a:srgbClr val="000000"/>
+                </a:solidFill>
+                <a:uFill>
+                  <a:solidFill>
+                    <a:srgbClr val="ffffff"/>
+                  </a:solidFill>
+                </a:uFill>
+                <a:latin typeface="Corbel"/>
+                <a:ea typeface="DejaVu Sans"/>
+              </a:rPr>
+              <a:t>*insert waffle board*</a:t>
+            </a:r>
+            <a:endParaRPr b="0" lang="en-ZA" sz="1800" spc="-1" strike="noStrike">
+              <a:solidFill>
+                <a:srgbClr val="000000"/>
+              </a:solidFill>
+              <a:uFill>
+                <a:solidFill>
+                  <a:srgbClr val="ffffff"/>
+                </a:solidFill>
+              </a:uFill>
+              <a:latin typeface="Arial"/>
+            </a:endParaRPr>
+          </a:p>
+          <a:p>
+            <a:pPr>
+              <a:lnSpc>
+                <a:spcPct val="100000"/>
+              </a:lnSpc>
+            </a:pPr>
+            <a:endParaRPr b="0" lang="en-ZA" sz="1800" spc="-1" strike="noStrike">
+              <a:solidFill>
+                <a:srgbClr val="000000"/>
+              </a:solidFill>
+              <a:uFill>
+                <a:solidFill>
+                  <a:srgbClr val="ffffff"/>
+                </a:solidFill>
+              </a:uFill>
+              <a:latin typeface="Arial"/>
+            </a:endParaRPr>
+          </a:p>
         </p:txBody>
       </p:sp>
       <p:pic>
         <p:nvPicPr>
-          <p:cNvPr id="98" name="Content Placeholder 3" descr=""/>
+          <p:cNvPr id="97" name="" descr=""/>
           <p:cNvPicPr/>
           <p:nvPr/>
         </p:nvPicPr>
         <p:blipFill>
           <a:blip r:embed="rId1"/>
-          <a:srcRect l="2772" t="2565" r="6728" b="6978"/>
           <a:stretch/>
         </p:blipFill>
         <p:spPr>
           <a:xfrm>
-            <a:off x="1259640" y="807480"/>
-            <a:ext cx="10000440" cy="5938560"/>
+            <a:off x="0" y="432000"/>
+            <a:ext cx="12193200" cy="6023160"/>
           </a:xfrm>
           <a:prstGeom prst="rect">
             <a:avLst/>
@@ -5630,10 +6315,10 @@
   <p:timing>
     <p:tnLst>
       <p:par>
-        <p:cTn id="7" dur="indefinite" restart="never" nodeType="tmRoot">
+        <p:cTn id="47" dur="indefinite" restart="never" nodeType="tmRoot">
           <p:childTnLst>
             <p:seq>
-              <p:cTn id="8" nodeType="mainSeq"/>
+              <p:cTn id="48" nodeType="mainSeq"/>
               <p:prevCondLst>
                 <p:cond delay="0" evt="onPrev">
                   <p:tgtEl>
@@ -5676,40 +6361,14 @@
       </p:grpSpPr>
       <p:sp>
         <p:nvSpPr>
-          <p:cNvPr id="99" name="CustomShape 1"/>
+          <p:cNvPr id="98" name="CustomShape 1"/>
           <p:cNvSpPr/>
           <p:nvPr/>
         </p:nvSpPr>
         <p:spPr>
           <a:xfrm>
-            <a:off x="1484280" y="2666880"/>
-            <a:ext cx="10017360" cy="3122640"/>
-          </a:xfrm>
-          <a:prstGeom prst="rect">
-            <a:avLst/>
-          </a:prstGeom>
-          <a:noFill/>
-          <a:ln>
-            <a:noFill/>
-          </a:ln>
-        </p:spPr>
-        <p:style>
-          <a:lnRef idx="0"/>
-          <a:fillRef idx="0"/>
-          <a:effectRef idx="0"/>
-          <a:fontRef idx="minor"/>
-        </p:style>
-      </p:sp>
-      <p:sp>
-        <p:nvSpPr>
-          <p:cNvPr id="100" name="CustomShape 2"/>
-          <p:cNvSpPr/>
-          <p:nvPr/>
-        </p:nvSpPr>
-        <p:spPr>
-          <a:xfrm>
-            <a:off x="3530520" y="216360"/>
-            <a:ext cx="5458680" cy="589680"/>
+            <a:off x="3911400" y="199800"/>
+            <a:ext cx="4697640" cy="441000"/>
           </a:xfrm>
           <a:prstGeom prst="rect">
             <a:avLst/>
@@ -5746,7 +6405,7 @@
                 <a:latin typeface="Corbel"/>
                 <a:ea typeface="DejaVu Sans"/>
               </a:rPr>
-              <a:t>Sprint #2</a:t>
+              <a:t>Sprint #1</a:t>
             </a:r>
             <a:endParaRPr b="0" lang="en-ZA" sz="1800" spc="-1" strike="noStrike">
               <a:solidFill>
@@ -5764,18 +6423,19 @@
       </p:sp>
       <p:pic>
         <p:nvPicPr>
-          <p:cNvPr id="101" name="" descr=""/>
+          <p:cNvPr id="99" name="Content Placeholder 3" descr=""/>
           <p:cNvPicPr/>
           <p:nvPr/>
         </p:nvPicPr>
         <p:blipFill>
           <a:blip r:embed="rId1"/>
+          <a:srcRect l="2772" t="2565" r="6728" b="6978"/>
           <a:stretch/>
         </p:blipFill>
         <p:spPr>
           <a:xfrm>
-            <a:off x="1080000" y="806400"/>
-            <a:ext cx="9936000" cy="5961600"/>
+            <a:off x="2304000" y="1368000"/>
+            <a:ext cx="7985160" cy="4741200"/>
           </a:xfrm>
           <a:prstGeom prst="rect">
             <a:avLst/>
@@ -5790,10 +6450,10 @@
   <p:timing>
     <p:tnLst>
       <p:par>
-        <p:cTn id="9" dur="indefinite" restart="never" nodeType="tmRoot">
+        <p:cTn id="49" dur="indefinite" restart="never" nodeType="tmRoot">
           <p:childTnLst>
             <p:seq>
-              <p:cTn id="10" nodeType="mainSeq"/>
+              <p:cTn id="50" nodeType="mainSeq"/>
               <p:prevCondLst>
                 <p:cond delay="0" evt="onPrev">
                   <p:tgtEl>
@@ -5834,6 +6494,94 @@
           <a:chExt cx="0" cy="0"/>
         </a:xfrm>
       </p:grpSpPr>
+      <p:sp>
+        <p:nvSpPr>
+          <p:cNvPr id="100" name="CustomShape 1"/>
+          <p:cNvSpPr/>
+          <p:nvPr/>
+        </p:nvSpPr>
+        <p:spPr>
+          <a:xfrm>
+            <a:off x="1484280" y="2666880"/>
+            <a:ext cx="10017720" cy="3122280"/>
+          </a:xfrm>
+          <a:prstGeom prst="rect">
+            <a:avLst/>
+          </a:prstGeom>
+          <a:noFill/>
+          <a:ln>
+            <a:noFill/>
+          </a:ln>
+        </p:spPr>
+        <p:style>
+          <a:lnRef idx="0"/>
+          <a:fillRef idx="0"/>
+          <a:effectRef idx="0"/>
+          <a:fontRef idx="minor"/>
+        </p:style>
+      </p:sp>
+      <p:sp>
+        <p:nvSpPr>
+          <p:cNvPr id="101" name="CustomShape 2"/>
+          <p:cNvSpPr/>
+          <p:nvPr/>
+        </p:nvSpPr>
+        <p:spPr>
+          <a:xfrm>
+            <a:off x="3530520" y="216360"/>
+            <a:ext cx="5458680" cy="589320"/>
+          </a:xfrm>
+          <a:prstGeom prst="rect">
+            <a:avLst/>
+          </a:prstGeom>
+          <a:noFill/>
+          <a:ln>
+            <a:noFill/>
+          </a:ln>
+        </p:spPr>
+        <p:style>
+          <a:lnRef idx="0"/>
+          <a:fillRef idx="0"/>
+          <a:effectRef idx="0"/>
+          <a:fontRef idx="minor"/>
+        </p:style>
+        <p:txBody>
+          <a:bodyPr lIns="90000" rIns="90000" tIns="45000" bIns="45000" anchor="ctr"/>
+          <a:p>
+            <a:pPr algn="ctr">
+              <a:lnSpc>
+                <a:spcPct val="100000"/>
+              </a:lnSpc>
+            </a:pPr>
+            <a:r>
+              <a:rPr b="0" lang="en-ZA" sz="4000" spc="-1" strike="noStrike">
+                <a:solidFill>
+                  <a:srgbClr val="000000"/>
+                </a:solidFill>
+                <a:uFill>
+                  <a:solidFill>
+                    <a:srgbClr val="ffffff"/>
+                  </a:solidFill>
+                </a:uFill>
+                <a:latin typeface="Corbel"/>
+                <a:ea typeface="DejaVu Sans"/>
+              </a:rPr>
+              <a:t>Sprint #2</a:t>
+            </a:r>
+            <a:endParaRPr b="0" lang="en-ZA" sz="1800" spc="-1" strike="noStrike">
+              <a:solidFill>
+                <a:srgbClr val="000000"/>
+              </a:solidFill>
+              <a:uFill>
+                <a:solidFill>
+                  <a:srgbClr val="ffffff"/>
+                </a:solidFill>
+              </a:uFill>
+              <a:latin typeface="Arial"/>
+            </a:endParaRPr>
+          </a:p>
+        </p:txBody>
+      </p:sp>
       <p:pic>
         <p:nvPicPr>
           <p:cNvPr id="102" name="" descr=""/>
@@ -5846,8 +6594,8 @@
         </p:blipFill>
         <p:spPr>
           <a:xfrm>
-            <a:off x="288000" y="288000"/>
-            <a:ext cx="11495880" cy="6478920"/>
+            <a:off x="2376000" y="1195560"/>
+            <a:ext cx="8208000" cy="4924440"/>
           </a:xfrm>
           <a:prstGeom prst="rect">
             <a:avLst/>
@@ -5862,10 +6610,10 @@
   <p:timing>
     <p:tnLst>
       <p:par>
-        <p:cTn id="11" dur="indefinite" restart="never" nodeType="tmRoot">
+        <p:cTn id="51" dur="indefinite" restart="never" nodeType="tmRoot">
           <p:childTnLst>
             <p:seq>
-              <p:cTn id="12" nodeType="mainSeq"/>
+              <p:cTn id="52" nodeType="mainSeq"/>
               <p:prevCondLst>
                 <p:cond delay="0" evt="onPrev">
                   <p:tgtEl>
@@ -5906,293 +6654,38 @@
           <a:chExt cx="0" cy="0"/>
         </a:xfrm>
       </p:grpSpPr>
-      <p:sp>
-        <p:nvSpPr>
-          <p:cNvPr id="103" name="CustomShape 1"/>
-          <p:cNvSpPr/>
+      <p:pic>
+        <p:nvPicPr>
+          <p:cNvPr id="103" name="" descr=""/>
+          <p:cNvPicPr/>
           <p:nvPr/>
-        </p:nvSpPr>
-        <p:spPr>
-          <a:xfrm>
-            <a:off x="1368000" y="288000"/>
-            <a:ext cx="10017360" cy="1751040"/>
-          </a:xfrm>
-          <a:prstGeom prst="rect">
-            <a:avLst/>
-          </a:prstGeom>
-          <a:noFill/>
+        </p:nvPicPr>
+        <p:blipFill>
+          <a:blip r:embed="rId1"/>
+          <a:stretch/>
+        </p:blipFill>
+        <p:spPr>
+          <a:xfrm>
+            <a:off x="0" y="0"/>
+            <a:ext cx="12295440" cy="6928560"/>
+          </a:xfrm>
+          <a:prstGeom prst="rect">
+            <a:avLst/>
+          </a:prstGeom>
           <a:ln>
             <a:noFill/>
           </a:ln>
         </p:spPr>
-        <p:style>
-          <a:lnRef idx="0"/>
-          <a:fillRef idx="0"/>
-          <a:effectRef idx="0"/>
-          <a:fontRef idx="minor"/>
-        </p:style>
-        <p:txBody>
-          <a:bodyPr lIns="90000" rIns="90000" tIns="45000" bIns="45000" anchor="ctr"/>
-          <a:p>
-            <a:r>
-              <a:rPr b="0" lang="en-ZA" sz="4000" spc="-1" strike="noStrike">
-                <a:solidFill>
-                  <a:srgbClr val="000000"/>
-                </a:solidFill>
-                <a:uFill>
-                  <a:solidFill>
-                    <a:srgbClr val="ffffff"/>
-                  </a:solidFill>
-                </a:uFill>
-                <a:latin typeface="Corbel"/>
-                <a:ea typeface="DejaVu Sans"/>
-              </a:rPr>
-              <a:t>List of features added in past sprints</a:t>
-            </a:r>
-            <a:endParaRPr b="0" lang="en-ZA" sz="1800" spc="-1" strike="noStrike">
-              <a:solidFill>
-                <a:srgbClr val="000000"/>
-              </a:solidFill>
-              <a:uFill>
-                <a:solidFill>
-                  <a:srgbClr val="ffffff"/>
-                </a:solidFill>
-              </a:uFill>
-              <a:latin typeface="Arial"/>
-            </a:endParaRPr>
-          </a:p>
-          <a:p>
-            <a:pPr algn="ctr">
-              <a:lnSpc>
-                <a:spcPct val="100000"/>
-              </a:lnSpc>
-            </a:pPr>
-            <a:endParaRPr b="0" lang="en-ZA" sz="1800" spc="-1" strike="noStrike">
-              <a:solidFill>
-                <a:srgbClr val="000000"/>
-              </a:solidFill>
-              <a:uFill>
-                <a:solidFill>
-                  <a:srgbClr val="ffffff"/>
-                </a:solidFill>
-              </a:uFill>
-              <a:latin typeface="Arial"/>
-            </a:endParaRPr>
-          </a:p>
-        </p:txBody>
-      </p:sp>
-      <p:sp>
-        <p:nvSpPr>
-          <p:cNvPr id="104" name="CustomShape 2"/>
-          <p:cNvSpPr/>
-          <p:nvPr/>
-        </p:nvSpPr>
-        <p:spPr>
-          <a:xfrm>
-            <a:off x="1224000" y="2016000"/>
-            <a:ext cx="10017360" cy="3351240"/>
-          </a:xfrm>
-          <a:prstGeom prst="rect">
-            <a:avLst/>
-          </a:prstGeom>
-          <a:noFill/>
-          <a:ln>
-            <a:noFill/>
-          </a:ln>
-        </p:spPr>
-        <p:style>
-          <a:lnRef idx="0"/>
-          <a:fillRef idx="0"/>
-          <a:effectRef idx="0"/>
-          <a:fontRef idx="minor"/>
-        </p:style>
-        <p:txBody>
-          <a:bodyPr lIns="90000" rIns="90000" tIns="45000" bIns="45000" anchor="ctr"/>
-          <a:p>
-            <a:pPr marL="285840" indent="-284400">
-              <a:lnSpc>
-                <a:spcPct val="100000"/>
-              </a:lnSpc>
-              <a:buClr>
-                <a:srgbClr val="1287c3"/>
-              </a:buClr>
-              <a:buSzPct val="145000"/>
-              <a:buFont typeface="Arial"/>
-              <a:buChar char="•"/>
-            </a:pPr>
-            <a:r>
-              <a:rPr b="0" lang="en-ZA" sz="2400" spc="-1" strike="noStrike">
-                <a:solidFill>
-                  <a:srgbClr val="000000"/>
-                </a:solidFill>
-                <a:uFill>
-                  <a:solidFill>
-                    <a:srgbClr val="ffffff"/>
-                  </a:solidFill>
-                </a:uFill>
-                <a:latin typeface="Corbel"/>
-                <a:ea typeface="DejaVu Sans"/>
-              </a:rPr>
-              <a:t>Database integration via Sequelize using Postgresql including deployment and development configurations</a:t>
-            </a:r>
-            <a:endParaRPr b="0" lang="en-ZA" sz="1800" spc="-1" strike="noStrike">
-              <a:solidFill>
-                <a:srgbClr val="000000"/>
-              </a:solidFill>
-              <a:uFill>
-                <a:solidFill>
-                  <a:srgbClr val="ffffff"/>
-                </a:solidFill>
-              </a:uFill>
-              <a:latin typeface="Arial"/>
-            </a:endParaRPr>
-          </a:p>
-          <a:p>
-            <a:pPr marL="285840" indent="-284400">
-              <a:lnSpc>
-                <a:spcPct val="100000"/>
-              </a:lnSpc>
-              <a:buClr>
-                <a:srgbClr val="1287c3"/>
-              </a:buClr>
-              <a:buSzPct val="145000"/>
-              <a:buFont typeface="Arial"/>
-              <a:buChar char="•"/>
-            </a:pPr>
-            <a:r>
-              <a:rPr b="0" lang="en-ZA" sz="2400" spc="-1" strike="noStrike">
-                <a:solidFill>
-                  <a:srgbClr val="000000"/>
-                </a:solidFill>
-                <a:uFill>
-                  <a:solidFill>
-                    <a:srgbClr val="ffffff"/>
-                  </a:solidFill>
-                </a:uFill>
-                <a:latin typeface="Corbel"/>
-                <a:ea typeface="DejaVu Sans"/>
-              </a:rPr>
-              <a:t>Sign in with Facebook to get permissions to manage the analyst’s Facebook pages linked with the specific advertisment</a:t>
-            </a:r>
-            <a:endParaRPr b="0" lang="en-ZA" sz="1800" spc="-1" strike="noStrike">
-              <a:solidFill>
-                <a:srgbClr val="000000"/>
-              </a:solidFill>
-              <a:uFill>
-                <a:solidFill>
-                  <a:srgbClr val="ffffff"/>
-                </a:solidFill>
-              </a:uFill>
-              <a:latin typeface="Arial"/>
-            </a:endParaRPr>
-          </a:p>
-          <a:p>
-            <a:pPr marL="285840" indent="-284400">
-              <a:lnSpc>
-                <a:spcPct val="100000"/>
-              </a:lnSpc>
-              <a:buClr>
-                <a:srgbClr val="1287c3"/>
-              </a:buClr>
-              <a:buSzPct val="145000"/>
-              <a:buFont typeface="Arial"/>
-              <a:buChar char="•"/>
-            </a:pPr>
-            <a:r>
-              <a:rPr b="0" lang="en-ZA" sz="2400" spc="-1" strike="noStrike">
-                <a:solidFill>
-                  <a:srgbClr val="000000"/>
-                </a:solidFill>
-                <a:uFill>
-                  <a:solidFill>
-                    <a:srgbClr val="ffffff"/>
-                  </a:solidFill>
-                </a:uFill>
-                <a:latin typeface="Corbel"/>
-                <a:ea typeface="DejaVu Sans"/>
-              </a:rPr>
-              <a:t>This data is saved in our Pages model, thereafter Facebook sends through the Lead ad id to initialize the Advertisement. </a:t>
-            </a:r>
-            <a:endParaRPr b="0" lang="en-ZA" sz="1800" spc="-1" strike="noStrike">
-              <a:solidFill>
-                <a:srgbClr val="000000"/>
-              </a:solidFill>
-              <a:uFill>
-                <a:solidFill>
-                  <a:srgbClr val="ffffff"/>
-                </a:solidFill>
-              </a:uFill>
-              <a:latin typeface="Arial"/>
-            </a:endParaRPr>
-          </a:p>
-          <a:p>
-            <a:pPr marL="285840" indent="-284400">
-              <a:lnSpc>
-                <a:spcPct val="100000"/>
-              </a:lnSpc>
-              <a:buClr>
-                <a:srgbClr val="1287c3"/>
-              </a:buClr>
-              <a:buSzPct val="145000"/>
-              <a:buFont typeface="Arial"/>
-              <a:buChar char="•"/>
-            </a:pPr>
-            <a:r>
-              <a:rPr b="0" lang="en-ZA" sz="2400" spc="-1" strike="noStrike">
-                <a:solidFill>
-                  <a:srgbClr val="000000"/>
-                </a:solidFill>
-                <a:uFill>
-                  <a:solidFill>
-                    <a:srgbClr val="ffffff"/>
-                  </a:solidFill>
-                </a:uFill>
-                <a:latin typeface="Corbel"/>
-                <a:ea typeface="DejaVu Sans"/>
-              </a:rPr>
-              <a:t>A user will fill in the Lead ad and a lead id will be sent through to our api. A call to Facebook’s graph api will be called to get the filled in form data and saved in our User model</a:t>
-            </a:r>
-            <a:endParaRPr b="0" lang="en-ZA" sz="1800" spc="-1" strike="noStrike">
-              <a:solidFill>
-                <a:srgbClr val="000000"/>
-              </a:solidFill>
-              <a:uFill>
-                <a:solidFill>
-                  <a:srgbClr val="ffffff"/>
-                </a:solidFill>
-              </a:uFill>
-              <a:latin typeface="Arial"/>
-            </a:endParaRPr>
-          </a:p>
-          <a:p>
-            <a:pPr>
-              <a:lnSpc>
-                <a:spcPct val="100000"/>
-              </a:lnSpc>
-            </a:pPr>
-            <a:endParaRPr b="0" lang="en-ZA" sz="1800" spc="-1" strike="noStrike">
-              <a:solidFill>
-                <a:srgbClr val="000000"/>
-              </a:solidFill>
-              <a:uFill>
-                <a:solidFill>
-                  <a:srgbClr val="ffffff"/>
-                </a:solidFill>
-              </a:uFill>
-              <a:latin typeface="Arial"/>
-            </a:endParaRPr>
-          </a:p>
-        </p:txBody>
-      </p:sp>
+      </p:pic>
     </p:spTree>
   </p:cSld>
   <p:timing>
     <p:tnLst>
       <p:par>
-        <p:cTn id="13" dur="indefinite" restart="never" nodeType="tmRoot">
+        <p:cTn id="53" dur="indefinite" restart="never" nodeType="tmRoot">
           <p:childTnLst>
             <p:seq>
-              <p:cTn id="14" nodeType="mainSeq"/>
+              <p:cTn id="54" nodeType="mainSeq"/>
               <p:prevCondLst>
                 <p:cond delay="0" evt="onPrev">
                   <p:tgtEl>
@@ -6235,14 +6728,14 @@
       </p:grpSpPr>
       <p:sp>
         <p:nvSpPr>
-          <p:cNvPr id="105" name="CustomShape 1"/>
+          <p:cNvPr id="104" name="CustomShape 1"/>
           <p:cNvSpPr/>
           <p:nvPr/>
         </p:nvSpPr>
         <p:spPr>
           <a:xfrm>
-            <a:off x="1368000" y="288000"/>
-            <a:ext cx="10017360" cy="1751040"/>
+            <a:off x="1224000" y="-238680"/>
+            <a:ext cx="10017720" cy="1750680"/>
           </a:xfrm>
           <a:prstGeom prst="rect">
             <a:avLst/>
@@ -6261,6 +6754,7 @@
         <p:txBody>
           <a:bodyPr lIns="90000" rIns="90000" tIns="45000" bIns="45000" anchor="ctr"/>
           <a:p>
+            <a:pPr algn="ctr"/>
             <a:r>
               <a:rPr b="0" lang="en-ZA" sz="4000" spc="-1" strike="noStrike">
                 <a:solidFill>
@@ -6274,7 +6768,7 @@
                 <a:latin typeface="Corbel"/>
                 <a:ea typeface="DejaVu Sans"/>
               </a:rPr>
-              <a:t>List of features added in past sprints</a:t>
+              <a:t>List of features added</a:t>
             </a:r>
             <a:endParaRPr b="0" lang="en-ZA" sz="1800" spc="-1" strike="noStrike">
               <a:solidFill>
@@ -6310,14 +6804,14 @@
       </p:sp>
       <p:sp>
         <p:nvSpPr>
-          <p:cNvPr id="106" name="CustomShape 2"/>
+          <p:cNvPr id="105" name="CustomShape 2"/>
           <p:cNvSpPr/>
           <p:nvPr/>
         </p:nvSpPr>
         <p:spPr>
           <a:xfrm>
-            <a:off x="1296000" y="1760400"/>
-            <a:ext cx="10017360" cy="3351240"/>
+            <a:off x="1431000" y="2232000"/>
+            <a:ext cx="10017720" cy="3350880"/>
           </a:xfrm>
           <a:prstGeom prst="rect">
             <a:avLst/>
@@ -6336,7 +6830,7 @@
         <p:txBody>
           <a:bodyPr lIns="90000" rIns="90000" tIns="45000" bIns="45000" anchor="ctr"/>
           <a:p>
-            <a:pPr marL="285840" indent="-284400">
+            <a:pPr marL="285840" indent="-284040">
               <a:lnSpc>
                 <a:spcPct val="100000"/>
               </a:lnSpc>
@@ -6360,7 +6854,7 @@
                 <a:latin typeface="Corbel"/>
                 <a:ea typeface="DejaVu Sans"/>
               </a:rPr>
-              <a:t> </a:t>
+              <a:t>Database integration via Sequelize using Postgresql including deployment and development configurations</a:t>
             </a:r>
             <a:endParaRPr b="0" lang="en-ZA" sz="1800" spc="-1" strike="noStrike">
               <a:solidFill>
@@ -6375,7 +6869,7 @@
             </a:endParaRPr>
           </a:p>
           <a:p>
-            <a:pPr marL="285840" indent="-284400">
+            <a:pPr marL="285840" indent="-284040">
               <a:lnSpc>
                 <a:spcPct val="100000"/>
               </a:lnSpc>
@@ -6399,7 +6893,7 @@
                 <a:latin typeface="Corbel"/>
                 <a:ea typeface="DejaVu Sans"/>
               </a:rPr>
-              <a:t>Implementation of RESTful API for front-end Angular and backend API calls</a:t>
+              <a:t> </a:t>
             </a:r>
             <a:endParaRPr b="0" lang="en-ZA" sz="1800" spc="-1" strike="noStrike">
               <a:solidFill>
@@ -6414,7 +6908,7 @@
             </a:endParaRPr>
           </a:p>
           <a:p>
-            <a:pPr marL="285840" indent="-284400">
+            <a:pPr marL="285840" indent="-284040">
               <a:lnSpc>
                 <a:spcPct val="100000"/>
               </a:lnSpc>
@@ -6438,7 +6932,7 @@
                 <a:latin typeface="Corbel"/>
                 <a:ea typeface="DejaVu Sans"/>
               </a:rPr>
-              <a:t>Integration of the testing framework Mocha with some route functionality tests</a:t>
+              <a:t>Sign in with Facebook to get permissions to manage the analyst’s Facebook pages linked with the specific advertisment</a:t>
             </a:r>
             <a:endParaRPr b="0" lang="en-ZA" sz="1800" spc="-1" strike="noStrike">
               <a:solidFill>
@@ -6453,7 +6947,7 @@
             </a:endParaRPr>
           </a:p>
           <a:p>
-            <a:pPr marL="285840" indent="-284400">
+            <a:pPr marL="285840" indent="-284040">
               <a:lnSpc>
                 <a:spcPct val="100000"/>
               </a:lnSpc>
@@ -6477,7 +6971,7 @@
                 <a:latin typeface="Corbel"/>
                 <a:ea typeface="DejaVu Sans"/>
               </a:rPr>
-              <a:t>Implementation of email functionality</a:t>
+              <a:t> </a:t>
             </a:r>
             <a:endParaRPr b="0" lang="en-ZA" sz="1800" spc="-1" strike="noStrike">
               <a:solidFill>
@@ -6492,7 +6986,7 @@
             </a:endParaRPr>
           </a:p>
           <a:p>
-            <a:pPr marL="285840" indent="-284400">
+            <a:pPr marL="285840" indent="-284040">
               <a:lnSpc>
                 <a:spcPct val="100000"/>
               </a:lnSpc>
@@ -6516,7 +7010,7 @@
                 <a:latin typeface="Corbel"/>
                 <a:ea typeface="DejaVu Sans"/>
               </a:rPr>
-              <a:t>Deployment to live server hosted on the Heroku platform</a:t>
+              <a:t>This data is saved in our Pages model, thereafter Facebook sends through the Lead ad id to initialize the Advertisement. </a:t>
             </a:r>
             <a:endParaRPr b="0" lang="en-ZA" sz="1800" spc="-1" strike="noStrike">
               <a:solidFill>
@@ -6531,7 +7025,7 @@
             </a:endParaRPr>
           </a:p>
           <a:p>
-            <a:pPr marL="285840" indent="-284400">
+            <a:pPr marL="285840" indent="-284040">
               <a:lnSpc>
                 <a:spcPct val="100000"/>
               </a:lnSpc>
@@ -6555,7 +7049,7 @@
                 <a:latin typeface="Corbel"/>
                 <a:ea typeface="DejaVu Sans"/>
               </a:rPr>
-              <a:t>Version control branching </a:t>
+              <a:t> </a:t>
             </a:r>
             <a:endParaRPr b="0" lang="en-ZA" sz="1800" spc="-1" strike="noStrike">
               <a:solidFill>
@@ -6570,7 +7064,7 @@
             </a:endParaRPr>
           </a:p>
           <a:p>
-            <a:pPr marL="285840" indent="-284400">
+            <a:pPr marL="285840" indent="-284040">
               <a:lnSpc>
                 <a:spcPct val="100000"/>
               </a:lnSpc>
@@ -6594,7 +7088,7 @@
                 <a:latin typeface="Corbel"/>
                 <a:ea typeface="DejaVu Sans"/>
               </a:rPr>
-              <a:t>Update of Functional requirements document with uses case, domain model and version changes of document</a:t>
+              <a:t>A user will fill in the Lead ad and a lead id will be sent through to our api. A call to Facebook’s graph api will be called to get the filled in form data and saved in our User model</a:t>
             </a:r>
             <a:endParaRPr b="0" lang="en-ZA" sz="1800" spc="-1" strike="noStrike">
               <a:solidFill>
@@ -6633,10 +7127,1160 @@
   <p:timing>
     <p:tnLst>
       <p:par>
-        <p:cTn id="15" dur="indefinite" restart="never" nodeType="tmRoot">
+        <p:cTn id="55" dur="indefinite" restart="never" nodeType="tmRoot">
           <p:childTnLst>
             <p:seq>
-              <p:cTn id="16" nodeType="mainSeq"/>
+              <p:cTn id="56" nodeType="mainSeq">
+                <p:childTnLst>
+                  <p:par>
+                    <p:cTn id="57" fill="freeze">
+                      <p:stCondLst>
+                        <p:cond delay="0"/>
+                      </p:stCondLst>
+                      <p:childTnLst>
+                        <p:par>
+                          <p:cTn id="58" fill="freeze">
+                            <p:stCondLst>
+                              <p:cond delay="0"/>
+                            </p:stCondLst>
+                            <p:childTnLst>
+                              <p:par>
+                                <p:cTn id="59" nodeType="withEffect" fill="hold" presetClass="entr" presetID="1">
+                                  <p:stCondLst>
+                                    <p:cond delay="0"/>
+                                  </p:stCondLst>
+                                  <p:childTnLst>
+                                    <p:set>
+                                      <p:cBhvr>
+                                        <p:cTn id="60" dur="1" fill="hold">
+                                          <p:stCondLst>
+                                            <p:cond delay="0"/>
+                                          </p:stCondLst>
+                                        </p:cTn>
+                                        <p:tgtEl>
+                                          <p:spTgt spid="105"/>
+                                        </p:tgtEl>
+                                        <p:attrNameLst>
+                                          <p:attrName>style.visibility</p:attrName>
+                                        </p:attrNameLst>
+                                      </p:cBhvr>
+                                      <p:to>
+                                        <p:strVal val="visible"/>
+                                      </p:to>
+                                    </p:set>
+                                  </p:childTnLst>
+                                </p:cTn>
+                              </p:par>
+                            </p:childTnLst>
+                          </p:cTn>
+                        </p:par>
+                      </p:childTnLst>
+                    </p:cTn>
+                  </p:par>
+                  <p:par>
+                    <p:cTn id="61" fill="freeze">
+                      <p:stCondLst>
+                        <p:cond delay="indefinite"/>
+                      </p:stCondLst>
+                      <p:childTnLst>
+                        <p:par>
+                          <p:cTn id="62" fill="freeze">
+                            <p:stCondLst>
+                              <p:cond delay="0"/>
+                            </p:stCondLst>
+                            <p:childTnLst>
+                              <p:par>
+                                <p:cTn id="63" nodeType="clickEffect" fill="hold" presetClass="entr" presetID="1">
+                                  <p:stCondLst>
+                                    <p:cond delay="0"/>
+                                  </p:stCondLst>
+                                  <p:childTnLst>
+                                    <p:set>
+                                      <p:cBhvr>
+                                        <p:cTn id="64" dur="1" fill="hold">
+                                          <p:stCondLst>
+                                            <p:cond delay="0"/>
+                                          </p:stCondLst>
+                                        </p:cTn>
+                                        <p:tgtEl>
+                                          <p:spTgt spid="105">
+                                            <p:txEl>
+                                              <p:pRg st="0" end="104"/>
+                                            </p:txEl>
+                                          </p:spTgt>
+                                        </p:tgtEl>
+                                        <p:attrNameLst>
+                                          <p:attrName>style.visibility</p:attrName>
+                                        </p:attrNameLst>
+                                      </p:cBhvr>
+                                      <p:to>
+                                        <p:strVal val="visible"/>
+                                      </p:to>
+                                    </p:set>
+                                  </p:childTnLst>
+                                </p:cTn>
+                              </p:par>
+                            </p:childTnLst>
+                          </p:cTn>
+                        </p:par>
+                      </p:childTnLst>
+                    </p:cTn>
+                  </p:par>
+                  <p:par>
+                    <p:cTn id="65" fill="freeze">
+                      <p:stCondLst>
+                        <p:cond delay="indefinite"/>
+                      </p:stCondLst>
+                      <p:childTnLst>
+                        <p:par>
+                          <p:cTn id="66" fill="freeze">
+                            <p:stCondLst>
+                              <p:cond delay="0"/>
+                            </p:stCondLst>
+                            <p:childTnLst>
+                              <p:par>
+                                <p:cTn id="67" nodeType="clickEffect" fill="hold" presetClass="entr" presetID="1">
+                                  <p:stCondLst>
+                                    <p:cond delay="0"/>
+                                  </p:stCondLst>
+                                  <p:childTnLst>
+                                    <p:set>
+                                      <p:cBhvr>
+                                        <p:cTn id="68" dur="1" fill="hold">
+                                          <p:stCondLst>
+                                            <p:cond delay="0"/>
+                                          </p:stCondLst>
+                                        </p:cTn>
+                                        <p:tgtEl>
+                                          <p:spTgt spid="105">
+                                            <p:txEl>
+                                              <p:pRg st="105" end="223"/>
+                                            </p:txEl>
+                                          </p:spTgt>
+                                        </p:tgtEl>
+                                        <p:attrNameLst>
+                                          <p:attrName>style.visibility</p:attrName>
+                                        </p:attrNameLst>
+                                      </p:cBhvr>
+                                      <p:to>
+                                        <p:strVal val="visible"/>
+                                      </p:to>
+                                    </p:set>
+                                  </p:childTnLst>
+                                </p:cTn>
+                              </p:par>
+                            </p:childTnLst>
+                          </p:cTn>
+                        </p:par>
+                      </p:childTnLst>
+                    </p:cTn>
+                  </p:par>
+                  <p:par>
+                    <p:cTn id="69" fill="freeze">
+                      <p:stCondLst>
+                        <p:cond delay="indefinite"/>
+                      </p:stCondLst>
+                      <p:childTnLst>
+                        <p:par>
+                          <p:cTn id="70" fill="freeze">
+                            <p:stCondLst>
+                              <p:cond delay="0"/>
+                            </p:stCondLst>
+                            <p:childTnLst>
+                              <p:par>
+                                <p:cTn id="71" nodeType="clickEffect" fill="hold" presetClass="entr" presetID="1">
+                                  <p:stCondLst>
+                                    <p:cond delay="0"/>
+                                  </p:stCondLst>
+                                  <p:childTnLst>
+                                    <p:set>
+                                      <p:cBhvr>
+                                        <p:cTn id="72" dur="1" fill="hold">
+                                          <p:stCondLst>
+                                            <p:cond delay="0"/>
+                                          </p:stCondLst>
+                                        </p:cTn>
+                                        <p:tgtEl>
+                                          <p:spTgt spid="105">
+                                            <p:txEl>
+                                              <p:pRg st="224" end="346"/>
+                                            </p:txEl>
+                                          </p:spTgt>
+                                        </p:tgtEl>
+                                        <p:attrNameLst>
+                                          <p:attrName>style.visibility</p:attrName>
+                                        </p:attrNameLst>
+                                      </p:cBhvr>
+                                      <p:to>
+                                        <p:strVal val="visible"/>
+                                      </p:to>
+                                    </p:set>
+                                  </p:childTnLst>
+                                </p:cTn>
+                              </p:par>
+                            </p:childTnLst>
+                          </p:cTn>
+                        </p:par>
+                      </p:childTnLst>
+                    </p:cTn>
+                  </p:par>
+                  <p:par>
+                    <p:cTn id="73" fill="freeze">
+                      <p:stCondLst>
+                        <p:cond delay="indefinite"/>
+                      </p:stCondLst>
+                      <p:childTnLst>
+                        <p:par>
+                          <p:cTn id="74" fill="freeze">
+                            <p:stCondLst>
+                              <p:cond delay="0"/>
+                            </p:stCondLst>
+                            <p:childTnLst>
+                              <p:par>
+                                <p:cTn id="75" nodeType="clickEffect" fill="hold" presetClass="entr" presetID="1">
+                                  <p:stCondLst>
+                                    <p:cond delay="0"/>
+                                  </p:stCondLst>
+                                  <p:childTnLst>
+                                    <p:set>
+                                      <p:cBhvr>
+                                        <p:cTn id="76" dur="1" fill="hold">
+                                          <p:stCondLst>
+                                            <p:cond delay="0"/>
+                                          </p:stCondLst>
+                                        </p:cTn>
+                                        <p:tgtEl>
+                                          <p:spTgt spid="105">
+                                            <p:txEl>
+                                              <p:pRg st="347" end="531"/>
+                                            </p:txEl>
+                                          </p:spTgt>
+                                        </p:tgtEl>
+                                        <p:attrNameLst>
+                                          <p:attrName>style.visibility</p:attrName>
+                                        </p:attrNameLst>
+                                      </p:cBhvr>
+                                      <p:to>
+                                        <p:strVal val="visible"/>
+                                      </p:to>
+                                    </p:set>
+                                  </p:childTnLst>
+                                </p:cTn>
+                              </p:par>
+                            </p:childTnLst>
+                          </p:cTn>
+                        </p:par>
+                      </p:childTnLst>
+                    </p:cTn>
+                  </p:par>
+                </p:childTnLst>
+              </p:cTn>
+              <p:prevCondLst>
+                <p:cond delay="0" evt="onPrev">
+                  <p:tgtEl>
+                    <p:sldTgt/>
+                  </p:tgtEl>
+                </p:cond>
+              </p:prevCondLst>
+              <p:nextCondLst>
+                <p:cond delay="0" evt="onNext">
+                  <p:tgtEl>
+                    <p:sldTgt/>
+                  </p:tgtEl>
+                </p:cond>
+              </p:nextCondLst>
+            </p:seq>
+          </p:childTnLst>
+        </p:cTn>
+      </p:par>
+    </p:tnLst>
+  </p:timing>
+</p:sld>
+</file>
+
+<file path=ppt/slides/slide9.xml><?xml version="1.0" encoding="utf-8"?>
+<p:sld xmlns:a="http://schemas.openxmlformats.org/drawingml/2006/main" xmlns:p="http://schemas.openxmlformats.org/presentationml/2006/main" xmlns:r="http://schemas.openxmlformats.org/officeDocument/2006/relationships" xmlns:p14="http://schemas.microsoft.com/office/powerpoint/2010/main" xmlns:p15="http://schemas.microsoft.com/office/powerpoint/2012/main" xmlns:mc="http://schemas.openxmlformats.org/markup-compatibility/2006">
+  <p:cSld>
+    <p:spTree>
+      <p:nvGrpSpPr>
+        <p:cNvPr id="1" name=""/>
+        <p:cNvGrpSpPr/>
+        <p:nvPr/>
+      </p:nvGrpSpPr>
+      <p:grpSpPr>
+        <a:xfrm>
+          <a:off x="0" y="0"/>
+          <a:ext cx="0" cy="0"/>
+          <a:chOff x="0" y="0"/>
+          <a:chExt cx="0" cy="0"/>
+        </a:xfrm>
+      </p:grpSpPr>
+      <p:sp>
+        <p:nvSpPr>
+          <p:cNvPr id="106" name="CustomShape 1"/>
+          <p:cNvSpPr/>
+          <p:nvPr/>
+        </p:nvSpPr>
+        <p:spPr>
+          <a:xfrm>
+            <a:off x="1647000" y="1473120"/>
+            <a:ext cx="10017720" cy="3350880"/>
+          </a:xfrm>
+          <a:prstGeom prst="rect">
+            <a:avLst/>
+          </a:prstGeom>
+          <a:noFill/>
+          <a:ln>
+            <a:noFill/>
+          </a:ln>
+        </p:spPr>
+        <p:style>
+          <a:lnRef idx="0"/>
+          <a:fillRef idx="0"/>
+          <a:effectRef idx="0"/>
+          <a:fontRef idx="minor"/>
+        </p:style>
+        <p:txBody>
+          <a:bodyPr lIns="90000" rIns="90000" tIns="45000" bIns="45000" anchor="ctr"/>
+          <a:p>
+            <a:pPr marL="285840" indent="-284040">
+              <a:lnSpc>
+                <a:spcPct val="100000"/>
+              </a:lnSpc>
+              <a:buClr>
+                <a:srgbClr val="1287c3"/>
+              </a:buClr>
+              <a:buSzPct val="145000"/>
+              <a:buFont typeface="Arial"/>
+              <a:buChar char="•"/>
+            </a:pPr>
+            <a:r>
+              <a:rPr b="0" lang="en-ZA" sz="2400" spc="-1" strike="noStrike">
+                <a:solidFill>
+                  <a:srgbClr val="000000"/>
+                </a:solidFill>
+                <a:uFill>
+                  <a:solidFill>
+                    <a:srgbClr val="ffffff"/>
+                  </a:solidFill>
+                </a:uFill>
+                <a:latin typeface="Corbel"/>
+                <a:ea typeface="DejaVu Sans"/>
+              </a:rPr>
+              <a:t> </a:t>
+            </a:r>
+            <a:endParaRPr b="0" lang="en-ZA" sz="1800" spc="-1" strike="noStrike">
+              <a:solidFill>
+                <a:srgbClr val="000000"/>
+              </a:solidFill>
+              <a:uFill>
+                <a:solidFill>
+                  <a:srgbClr val="ffffff"/>
+                </a:solidFill>
+              </a:uFill>
+              <a:latin typeface="Arial"/>
+            </a:endParaRPr>
+          </a:p>
+          <a:p>
+            <a:pPr marL="285840" indent="-284040">
+              <a:lnSpc>
+                <a:spcPct val="100000"/>
+              </a:lnSpc>
+              <a:buClr>
+                <a:srgbClr val="1287c3"/>
+              </a:buClr>
+              <a:buSzPct val="145000"/>
+              <a:buFont typeface="Arial"/>
+              <a:buChar char="•"/>
+            </a:pPr>
+            <a:r>
+              <a:rPr b="0" lang="en-ZA" sz="2400" spc="-1" strike="noStrike">
+                <a:solidFill>
+                  <a:srgbClr val="000000"/>
+                </a:solidFill>
+                <a:uFill>
+                  <a:solidFill>
+                    <a:srgbClr val="ffffff"/>
+                  </a:solidFill>
+                </a:uFill>
+                <a:latin typeface="Corbel"/>
+                <a:ea typeface="DejaVu Sans"/>
+              </a:rPr>
+              <a:t>Implementation of RESTful API for front-end Angular and backend API calls</a:t>
+            </a:r>
+            <a:endParaRPr b="0" lang="en-ZA" sz="1800" spc="-1" strike="noStrike">
+              <a:solidFill>
+                <a:srgbClr val="000000"/>
+              </a:solidFill>
+              <a:uFill>
+                <a:solidFill>
+                  <a:srgbClr val="ffffff"/>
+                </a:solidFill>
+              </a:uFill>
+              <a:latin typeface="Arial"/>
+            </a:endParaRPr>
+          </a:p>
+          <a:p>
+            <a:pPr marL="285840" indent="-284040">
+              <a:lnSpc>
+                <a:spcPct val="100000"/>
+              </a:lnSpc>
+              <a:buClr>
+                <a:srgbClr val="1287c3"/>
+              </a:buClr>
+              <a:buSzPct val="145000"/>
+              <a:buFont typeface="Arial"/>
+              <a:buChar char="•"/>
+            </a:pPr>
+            <a:r>
+              <a:rPr b="0" lang="en-ZA" sz="2400" spc="-1" strike="noStrike">
+                <a:solidFill>
+                  <a:srgbClr val="000000"/>
+                </a:solidFill>
+                <a:uFill>
+                  <a:solidFill>
+                    <a:srgbClr val="ffffff"/>
+                  </a:solidFill>
+                </a:uFill>
+                <a:latin typeface="Corbel"/>
+                <a:ea typeface="DejaVu Sans"/>
+              </a:rPr>
+              <a:t> </a:t>
+            </a:r>
+            <a:endParaRPr b="0" lang="en-ZA" sz="1800" spc="-1" strike="noStrike">
+              <a:solidFill>
+                <a:srgbClr val="000000"/>
+              </a:solidFill>
+              <a:uFill>
+                <a:solidFill>
+                  <a:srgbClr val="ffffff"/>
+                </a:solidFill>
+              </a:uFill>
+              <a:latin typeface="Arial"/>
+            </a:endParaRPr>
+          </a:p>
+          <a:p>
+            <a:pPr marL="285840" indent="-284040">
+              <a:lnSpc>
+                <a:spcPct val="100000"/>
+              </a:lnSpc>
+              <a:buClr>
+                <a:srgbClr val="1287c3"/>
+              </a:buClr>
+              <a:buSzPct val="145000"/>
+              <a:buFont typeface="Arial"/>
+              <a:buChar char="•"/>
+            </a:pPr>
+            <a:r>
+              <a:rPr b="0" lang="en-ZA" sz="2400" spc="-1" strike="noStrike">
+                <a:solidFill>
+                  <a:srgbClr val="000000"/>
+                </a:solidFill>
+                <a:uFill>
+                  <a:solidFill>
+                    <a:srgbClr val="ffffff"/>
+                  </a:solidFill>
+                </a:uFill>
+                <a:latin typeface="Corbel"/>
+                <a:ea typeface="DejaVu Sans"/>
+              </a:rPr>
+              <a:t>Integration of the testing framework Mocha with some route functionality tests</a:t>
+            </a:r>
+            <a:endParaRPr b="0" lang="en-ZA" sz="1800" spc="-1" strike="noStrike">
+              <a:solidFill>
+                <a:srgbClr val="000000"/>
+              </a:solidFill>
+              <a:uFill>
+                <a:solidFill>
+                  <a:srgbClr val="ffffff"/>
+                </a:solidFill>
+              </a:uFill>
+              <a:latin typeface="Arial"/>
+            </a:endParaRPr>
+          </a:p>
+          <a:p>
+            <a:pPr marL="285840" indent="-284040">
+              <a:lnSpc>
+                <a:spcPct val="100000"/>
+              </a:lnSpc>
+              <a:buClr>
+                <a:srgbClr val="1287c3"/>
+              </a:buClr>
+              <a:buSzPct val="145000"/>
+              <a:buFont typeface="Arial"/>
+              <a:buChar char="•"/>
+            </a:pPr>
+            <a:r>
+              <a:rPr b="0" lang="en-ZA" sz="2400" spc="-1" strike="noStrike">
+                <a:solidFill>
+                  <a:srgbClr val="000000"/>
+                </a:solidFill>
+                <a:uFill>
+                  <a:solidFill>
+                    <a:srgbClr val="ffffff"/>
+                  </a:solidFill>
+                </a:uFill>
+                <a:latin typeface="Corbel"/>
+                <a:ea typeface="DejaVu Sans"/>
+              </a:rPr>
+              <a:t> </a:t>
+            </a:r>
+            <a:endParaRPr b="0" lang="en-ZA" sz="1800" spc="-1" strike="noStrike">
+              <a:solidFill>
+                <a:srgbClr val="000000"/>
+              </a:solidFill>
+              <a:uFill>
+                <a:solidFill>
+                  <a:srgbClr val="ffffff"/>
+                </a:solidFill>
+              </a:uFill>
+              <a:latin typeface="Arial"/>
+            </a:endParaRPr>
+          </a:p>
+          <a:p>
+            <a:pPr marL="285840" indent="-284040">
+              <a:lnSpc>
+                <a:spcPct val="100000"/>
+              </a:lnSpc>
+              <a:buClr>
+                <a:srgbClr val="1287c3"/>
+              </a:buClr>
+              <a:buSzPct val="145000"/>
+              <a:buFont typeface="Arial"/>
+              <a:buChar char="•"/>
+            </a:pPr>
+            <a:r>
+              <a:rPr b="0" lang="en-ZA" sz="2400" spc="-1" strike="noStrike">
+                <a:solidFill>
+                  <a:srgbClr val="000000"/>
+                </a:solidFill>
+                <a:uFill>
+                  <a:solidFill>
+                    <a:srgbClr val="ffffff"/>
+                  </a:solidFill>
+                </a:uFill>
+                <a:latin typeface="Corbel"/>
+                <a:ea typeface="DejaVu Sans"/>
+              </a:rPr>
+              <a:t>Implementation of email functionality</a:t>
+            </a:r>
+            <a:endParaRPr b="0" lang="en-ZA" sz="1800" spc="-1" strike="noStrike">
+              <a:solidFill>
+                <a:srgbClr val="000000"/>
+              </a:solidFill>
+              <a:uFill>
+                <a:solidFill>
+                  <a:srgbClr val="ffffff"/>
+                </a:solidFill>
+              </a:uFill>
+              <a:latin typeface="Arial"/>
+            </a:endParaRPr>
+          </a:p>
+          <a:p>
+            <a:pPr marL="285840" indent="-284040">
+              <a:lnSpc>
+                <a:spcPct val="100000"/>
+              </a:lnSpc>
+              <a:buClr>
+                <a:srgbClr val="1287c3"/>
+              </a:buClr>
+              <a:buSzPct val="145000"/>
+              <a:buFont typeface="Arial"/>
+              <a:buChar char="•"/>
+            </a:pPr>
+            <a:r>
+              <a:rPr b="0" lang="en-ZA" sz="2400" spc="-1" strike="noStrike">
+                <a:solidFill>
+                  <a:srgbClr val="000000"/>
+                </a:solidFill>
+                <a:uFill>
+                  <a:solidFill>
+                    <a:srgbClr val="ffffff"/>
+                  </a:solidFill>
+                </a:uFill>
+                <a:latin typeface="Corbel"/>
+                <a:ea typeface="DejaVu Sans"/>
+              </a:rPr>
+              <a:t> </a:t>
+            </a:r>
+            <a:endParaRPr b="0" lang="en-ZA" sz="1800" spc="-1" strike="noStrike">
+              <a:solidFill>
+                <a:srgbClr val="000000"/>
+              </a:solidFill>
+              <a:uFill>
+                <a:solidFill>
+                  <a:srgbClr val="ffffff"/>
+                </a:solidFill>
+              </a:uFill>
+              <a:latin typeface="Arial"/>
+            </a:endParaRPr>
+          </a:p>
+          <a:p>
+            <a:pPr marL="285840" indent="-284040">
+              <a:lnSpc>
+                <a:spcPct val="100000"/>
+              </a:lnSpc>
+              <a:buClr>
+                <a:srgbClr val="1287c3"/>
+              </a:buClr>
+              <a:buSzPct val="145000"/>
+              <a:buFont typeface="Arial"/>
+              <a:buChar char="•"/>
+            </a:pPr>
+            <a:r>
+              <a:rPr b="0" lang="en-ZA" sz="2400" spc="-1" strike="noStrike">
+                <a:solidFill>
+                  <a:srgbClr val="000000"/>
+                </a:solidFill>
+                <a:uFill>
+                  <a:solidFill>
+                    <a:srgbClr val="ffffff"/>
+                  </a:solidFill>
+                </a:uFill>
+                <a:latin typeface="Corbel"/>
+                <a:ea typeface="DejaVu Sans"/>
+              </a:rPr>
+              <a:t>Deployment to live server hosted on the Heroku platform</a:t>
+            </a:r>
+            <a:endParaRPr b="0" lang="en-ZA" sz="1800" spc="-1" strike="noStrike">
+              <a:solidFill>
+                <a:srgbClr val="000000"/>
+              </a:solidFill>
+              <a:uFill>
+                <a:solidFill>
+                  <a:srgbClr val="ffffff"/>
+                </a:solidFill>
+              </a:uFill>
+              <a:latin typeface="Arial"/>
+            </a:endParaRPr>
+          </a:p>
+          <a:p>
+            <a:pPr marL="285840" indent="-284040">
+              <a:lnSpc>
+                <a:spcPct val="100000"/>
+              </a:lnSpc>
+              <a:buClr>
+                <a:srgbClr val="1287c3"/>
+              </a:buClr>
+              <a:buSzPct val="145000"/>
+              <a:buFont typeface="Arial"/>
+              <a:buChar char="•"/>
+            </a:pPr>
+            <a:r>
+              <a:rPr b="0" lang="en-ZA" sz="2400" spc="-1" strike="noStrike">
+                <a:solidFill>
+                  <a:srgbClr val="000000"/>
+                </a:solidFill>
+                <a:uFill>
+                  <a:solidFill>
+                    <a:srgbClr val="ffffff"/>
+                  </a:solidFill>
+                </a:uFill>
+                <a:latin typeface="Corbel"/>
+                <a:ea typeface="DejaVu Sans"/>
+              </a:rPr>
+              <a:t> </a:t>
+            </a:r>
+            <a:endParaRPr b="0" lang="en-ZA" sz="1800" spc="-1" strike="noStrike">
+              <a:solidFill>
+                <a:srgbClr val="000000"/>
+              </a:solidFill>
+              <a:uFill>
+                <a:solidFill>
+                  <a:srgbClr val="ffffff"/>
+                </a:solidFill>
+              </a:uFill>
+              <a:latin typeface="Arial"/>
+            </a:endParaRPr>
+          </a:p>
+          <a:p>
+            <a:pPr marL="285840" indent="-284040">
+              <a:lnSpc>
+                <a:spcPct val="100000"/>
+              </a:lnSpc>
+              <a:buClr>
+                <a:srgbClr val="1287c3"/>
+              </a:buClr>
+              <a:buSzPct val="145000"/>
+              <a:buFont typeface="Arial"/>
+              <a:buChar char="•"/>
+            </a:pPr>
+            <a:r>
+              <a:rPr b="0" lang="en-ZA" sz="2400" spc="-1" strike="noStrike">
+                <a:solidFill>
+                  <a:srgbClr val="000000"/>
+                </a:solidFill>
+                <a:uFill>
+                  <a:solidFill>
+                    <a:srgbClr val="ffffff"/>
+                  </a:solidFill>
+                </a:uFill>
+                <a:latin typeface="Corbel"/>
+                <a:ea typeface="DejaVu Sans"/>
+              </a:rPr>
+              <a:t>Version control branching </a:t>
+            </a:r>
+            <a:endParaRPr b="0" lang="en-ZA" sz="1800" spc="-1" strike="noStrike">
+              <a:solidFill>
+                <a:srgbClr val="000000"/>
+              </a:solidFill>
+              <a:uFill>
+                <a:solidFill>
+                  <a:srgbClr val="ffffff"/>
+                </a:solidFill>
+              </a:uFill>
+              <a:latin typeface="Arial"/>
+            </a:endParaRPr>
+          </a:p>
+          <a:p>
+            <a:pPr marL="285840" indent="-284040">
+              <a:lnSpc>
+                <a:spcPct val="100000"/>
+              </a:lnSpc>
+              <a:buClr>
+                <a:srgbClr val="1287c3"/>
+              </a:buClr>
+              <a:buSzPct val="145000"/>
+              <a:buFont typeface="Arial"/>
+              <a:buChar char="•"/>
+            </a:pPr>
+            <a:r>
+              <a:rPr b="0" lang="en-ZA" sz="2400" spc="-1" strike="noStrike">
+                <a:solidFill>
+                  <a:srgbClr val="000000"/>
+                </a:solidFill>
+                <a:uFill>
+                  <a:solidFill>
+                    <a:srgbClr val="ffffff"/>
+                  </a:solidFill>
+                </a:uFill>
+                <a:latin typeface="Corbel"/>
+                <a:ea typeface="DejaVu Sans"/>
+              </a:rPr>
+              <a:t> </a:t>
+            </a:r>
+            <a:endParaRPr b="0" lang="en-ZA" sz="1800" spc="-1" strike="noStrike">
+              <a:solidFill>
+                <a:srgbClr val="000000"/>
+              </a:solidFill>
+              <a:uFill>
+                <a:solidFill>
+                  <a:srgbClr val="ffffff"/>
+                </a:solidFill>
+              </a:uFill>
+              <a:latin typeface="Arial"/>
+            </a:endParaRPr>
+          </a:p>
+          <a:p>
+            <a:pPr marL="285840" indent="-284040">
+              <a:lnSpc>
+                <a:spcPct val="100000"/>
+              </a:lnSpc>
+              <a:buClr>
+                <a:srgbClr val="1287c3"/>
+              </a:buClr>
+              <a:buSzPct val="145000"/>
+              <a:buFont typeface="Arial"/>
+              <a:buChar char="•"/>
+            </a:pPr>
+            <a:r>
+              <a:rPr b="0" lang="en-ZA" sz="2400" spc="-1" strike="noStrike">
+                <a:solidFill>
+                  <a:srgbClr val="000000"/>
+                </a:solidFill>
+                <a:uFill>
+                  <a:solidFill>
+                    <a:srgbClr val="ffffff"/>
+                  </a:solidFill>
+                </a:uFill>
+                <a:latin typeface="Corbel"/>
+                <a:ea typeface="DejaVu Sans"/>
+              </a:rPr>
+              <a:t>Update of Functional requirements document with uses case, domain model and version changes of document</a:t>
+            </a:r>
+            <a:endParaRPr b="0" lang="en-ZA" sz="1800" spc="-1" strike="noStrike">
+              <a:solidFill>
+                <a:srgbClr val="000000"/>
+              </a:solidFill>
+              <a:uFill>
+                <a:solidFill>
+                  <a:srgbClr val="ffffff"/>
+                </a:solidFill>
+              </a:uFill>
+              <a:latin typeface="Arial"/>
+            </a:endParaRPr>
+          </a:p>
+          <a:p>
+            <a:pPr>
+              <a:lnSpc>
+                <a:spcPct val="100000"/>
+              </a:lnSpc>
+            </a:pPr>
+            <a:endParaRPr b="0" lang="en-ZA" sz="1800" spc="-1" strike="noStrike">
+              <a:solidFill>
+                <a:srgbClr val="000000"/>
+              </a:solidFill>
+              <a:uFill>
+                <a:solidFill>
+                  <a:srgbClr val="ffffff"/>
+                </a:solidFill>
+              </a:uFill>
+              <a:latin typeface="Arial"/>
+            </a:endParaRPr>
+          </a:p>
+        </p:txBody>
+      </p:sp>
+    </p:spTree>
+  </p:cSld>
+  <p:timing>
+    <p:tnLst>
+      <p:par>
+        <p:cTn id="77" dur="indefinite" restart="never" nodeType="tmRoot">
+          <p:childTnLst>
+            <p:seq>
+              <p:cTn id="78" nodeType="mainSeq">
+                <p:childTnLst>
+                  <p:par>
+                    <p:cTn id="79" fill="freeze">
+                      <p:stCondLst>
+                        <p:cond delay="0"/>
+                      </p:stCondLst>
+                      <p:childTnLst>
+                        <p:par>
+                          <p:cTn id="80" fill="freeze">
+                            <p:stCondLst>
+                              <p:cond delay="0"/>
+                            </p:stCondLst>
+                            <p:childTnLst>
+                              <p:par>
+                                <p:cTn id="81" nodeType="withEffect" fill="hold" presetClass="entr" presetID="1">
+                                  <p:stCondLst>
+                                    <p:cond delay="0"/>
+                                  </p:stCondLst>
+                                  <p:childTnLst>
+                                    <p:set>
+                                      <p:cBhvr>
+                                        <p:cTn id="82" dur="1" fill="hold">
+                                          <p:stCondLst>
+                                            <p:cond delay="0"/>
+                                          </p:stCondLst>
+                                        </p:cTn>
+                                        <p:tgtEl>
+                                          <p:spTgt spid="106"/>
+                                        </p:tgtEl>
+                                        <p:attrNameLst>
+                                          <p:attrName>style.visibility</p:attrName>
+                                        </p:attrNameLst>
+                                      </p:cBhvr>
+                                      <p:to>
+                                        <p:strVal val="visible"/>
+                                      </p:to>
+                                    </p:set>
+                                  </p:childTnLst>
+                                </p:cTn>
+                              </p:par>
+                            </p:childTnLst>
+                          </p:cTn>
+                        </p:par>
+                      </p:childTnLst>
+                    </p:cTn>
+                  </p:par>
+                  <p:par>
+                    <p:cTn id="83" fill="freeze">
+                      <p:stCondLst>
+                        <p:cond delay="indefinite"/>
+                      </p:stCondLst>
+                      <p:childTnLst>
+                        <p:par>
+                          <p:cTn id="84" fill="freeze">
+                            <p:stCondLst>
+                              <p:cond delay="0"/>
+                            </p:stCondLst>
+                            <p:childTnLst>
+                              <p:par>
+                                <p:cTn id="85" nodeType="clickEffect" fill="hold" presetClass="entr" presetID="1">
+                                  <p:stCondLst>
+                                    <p:cond delay="0"/>
+                                  </p:stCondLst>
+                                  <p:childTnLst>
+                                    <p:set>
+                                      <p:cBhvr>
+                                        <p:cTn id="86" dur="1" fill="hold">
+                                          <p:stCondLst>
+                                            <p:cond delay="0"/>
+                                          </p:stCondLst>
+                                        </p:cTn>
+                                        <p:tgtEl>
+                                          <p:spTgt spid="106">
+                                            <p:txEl>
+                                              <p:pRg st="1" end="75"/>
+                                            </p:txEl>
+                                          </p:spTgt>
+                                        </p:tgtEl>
+                                        <p:attrNameLst>
+                                          <p:attrName>style.visibility</p:attrName>
+                                        </p:attrNameLst>
+                                      </p:cBhvr>
+                                      <p:to>
+                                        <p:strVal val="visible"/>
+                                      </p:to>
+                                    </p:set>
+                                  </p:childTnLst>
+                                </p:cTn>
+                              </p:par>
+                            </p:childTnLst>
+                          </p:cTn>
+                        </p:par>
+                      </p:childTnLst>
+                    </p:cTn>
+                  </p:par>
+                  <p:par>
+                    <p:cTn id="87" fill="freeze">
+                      <p:stCondLst>
+                        <p:cond delay="indefinite"/>
+                      </p:stCondLst>
+                      <p:childTnLst>
+                        <p:par>
+                          <p:cTn id="88" fill="freeze">
+                            <p:stCondLst>
+                              <p:cond delay="0"/>
+                            </p:stCondLst>
+                            <p:childTnLst>
+                              <p:par>
+                                <p:cTn id="89" nodeType="clickEffect" fill="hold" presetClass="entr" presetID="1">
+                                  <p:stCondLst>
+                                    <p:cond delay="0"/>
+                                  </p:stCondLst>
+                                  <p:childTnLst>
+                                    <p:set>
+                                      <p:cBhvr>
+                                        <p:cTn id="90" dur="1" fill="hold">
+                                          <p:stCondLst>
+                                            <p:cond delay="0"/>
+                                          </p:stCondLst>
+                                        </p:cTn>
+                                        <p:tgtEl>
+                                          <p:spTgt spid="106">
+                                            <p:txEl>
+                                              <p:pRg st="76" end="155"/>
+                                            </p:txEl>
+                                          </p:spTgt>
+                                        </p:tgtEl>
+                                        <p:attrNameLst>
+                                          <p:attrName>style.visibility</p:attrName>
+                                        </p:attrNameLst>
+                                      </p:cBhvr>
+                                      <p:to>
+                                        <p:strVal val="visible"/>
+                                      </p:to>
+                                    </p:set>
+                                  </p:childTnLst>
+                                </p:cTn>
+                              </p:par>
+                            </p:childTnLst>
+                          </p:cTn>
+                        </p:par>
+                      </p:childTnLst>
+                    </p:cTn>
+                  </p:par>
+                  <p:par>
+                    <p:cTn id="91" fill="freeze">
+                      <p:stCondLst>
+                        <p:cond delay="indefinite"/>
+                      </p:stCondLst>
+                      <p:childTnLst>
+                        <p:par>
+                          <p:cTn id="92" fill="freeze">
+                            <p:stCondLst>
+                              <p:cond delay="0"/>
+                            </p:stCondLst>
+                            <p:childTnLst>
+                              <p:par>
+                                <p:cTn id="93" nodeType="clickEffect" fill="hold" presetClass="entr" presetID="1">
+                                  <p:stCondLst>
+                                    <p:cond delay="0"/>
+                                  </p:stCondLst>
+                                  <p:childTnLst>
+                                    <p:set>
+                                      <p:cBhvr>
+                                        <p:cTn id="94" dur="1" fill="hold">
+                                          <p:stCondLst>
+                                            <p:cond delay="0"/>
+                                          </p:stCondLst>
+                                        </p:cTn>
+                                        <p:tgtEl>
+                                          <p:spTgt spid="106">
+                                            <p:txEl>
+                                              <p:pRg st="156" end="194"/>
+                                            </p:txEl>
+                                          </p:spTgt>
+                                        </p:tgtEl>
+                                        <p:attrNameLst>
+                                          <p:attrName>style.visibility</p:attrName>
+                                        </p:attrNameLst>
+                                      </p:cBhvr>
+                                      <p:to>
+                                        <p:strVal val="visible"/>
+                                      </p:to>
+                                    </p:set>
+                                  </p:childTnLst>
+                                </p:cTn>
+                              </p:par>
+                            </p:childTnLst>
+                          </p:cTn>
+                        </p:par>
+                      </p:childTnLst>
+                    </p:cTn>
+                  </p:par>
+                  <p:par>
+                    <p:cTn id="95" fill="freeze">
+                      <p:stCondLst>
+                        <p:cond delay="indefinite"/>
+                      </p:stCondLst>
+                      <p:childTnLst>
+                        <p:par>
+                          <p:cTn id="96" fill="freeze">
+                            <p:stCondLst>
+                              <p:cond delay="0"/>
+                            </p:stCondLst>
+                            <p:childTnLst>
+                              <p:par>
+                                <p:cTn id="97" nodeType="clickEffect" fill="hold" presetClass="entr" presetID="1">
+                                  <p:stCondLst>
+                                    <p:cond delay="0"/>
+                                  </p:stCondLst>
+                                  <p:childTnLst>
+                                    <p:set>
+                                      <p:cBhvr>
+                                        <p:cTn id="98" dur="1" fill="hold">
+                                          <p:stCondLst>
+                                            <p:cond delay="0"/>
+                                          </p:stCondLst>
+                                        </p:cTn>
+                                        <p:tgtEl>
+                                          <p:spTgt spid="106">
+                                            <p:txEl>
+                                              <p:pRg st="195" end="251"/>
+                                            </p:txEl>
+                                          </p:spTgt>
+                                        </p:tgtEl>
+                                        <p:attrNameLst>
+                                          <p:attrName>style.visibility</p:attrName>
+                                        </p:attrNameLst>
+                                      </p:cBhvr>
+                                      <p:to>
+                                        <p:strVal val="visible"/>
+                                      </p:to>
+                                    </p:set>
+                                  </p:childTnLst>
+                                </p:cTn>
+                              </p:par>
+                            </p:childTnLst>
+                          </p:cTn>
+                        </p:par>
+                      </p:childTnLst>
+                    </p:cTn>
+                  </p:par>
+                  <p:par>
+                    <p:cTn id="99" fill="freeze">
+                      <p:stCondLst>
+                        <p:cond delay="indefinite"/>
+                      </p:stCondLst>
+                      <p:childTnLst>
+                        <p:par>
+                          <p:cTn id="100" fill="freeze">
+                            <p:stCondLst>
+                              <p:cond delay="0"/>
+                            </p:stCondLst>
+                            <p:childTnLst>
+                              <p:par>
+                                <p:cTn id="101" nodeType="clickEffect" fill="hold" presetClass="entr" presetID="1">
+                                  <p:stCondLst>
+                                    <p:cond delay="0"/>
+                                  </p:stCondLst>
+                                  <p:childTnLst>
+                                    <p:set>
+                                      <p:cBhvr>
+                                        <p:cTn id="102" dur="1" fill="hold">
+                                          <p:stCondLst>
+                                            <p:cond delay="0"/>
+                                          </p:stCondLst>
+                                        </p:cTn>
+                                        <p:tgtEl>
+                                          <p:spTgt spid="106">
+                                            <p:txEl>
+                                              <p:pRg st="252" end="279"/>
+                                            </p:txEl>
+                                          </p:spTgt>
+                                        </p:tgtEl>
+                                        <p:attrNameLst>
+                                          <p:attrName>style.visibility</p:attrName>
+                                        </p:attrNameLst>
+                                      </p:cBhvr>
+                                      <p:to>
+                                        <p:strVal val="visible"/>
+                                      </p:to>
+                                    </p:set>
+                                  </p:childTnLst>
+                                </p:cTn>
+                              </p:par>
+                            </p:childTnLst>
+                          </p:cTn>
+                        </p:par>
+                      </p:childTnLst>
+                    </p:cTn>
+                  </p:par>
+                  <p:par>
+                    <p:cTn id="103" fill="freeze">
+                      <p:stCondLst>
+                        <p:cond delay="indefinite"/>
+                      </p:stCondLst>
+                      <p:childTnLst>
+                        <p:par>
+                          <p:cTn id="104" fill="freeze">
+                            <p:stCondLst>
+                              <p:cond delay="0"/>
+                            </p:stCondLst>
+                            <p:childTnLst>
+                              <p:par>
+                                <p:cTn id="105" nodeType="clickEffect" fill="hold" presetClass="entr" presetID="1">
+                                  <p:stCondLst>
+                                    <p:cond delay="0"/>
+                                  </p:stCondLst>
+                                  <p:childTnLst>
+                                    <p:set>
+                                      <p:cBhvr>
+                                        <p:cTn id="106" dur="1" fill="hold">
+                                          <p:stCondLst>
+                                            <p:cond delay="0"/>
+                                          </p:stCondLst>
+                                        </p:cTn>
+                                        <p:tgtEl>
+                                          <p:spTgt spid="106">
+                                            <p:txEl>
+                                              <p:pRg st="280" end="384"/>
+                                            </p:txEl>
+                                          </p:spTgt>
+                                        </p:tgtEl>
+                                        <p:attrNameLst>
+                                          <p:attrName>style.visibility</p:attrName>
+                                        </p:attrNameLst>
+                                      </p:cBhvr>
+                                      <p:to>
+                                        <p:strVal val="visible"/>
+                                      </p:to>
+                                    </p:set>
+                                  </p:childTnLst>
+                                </p:cTn>
+                              </p:par>
+                            </p:childTnLst>
+                          </p:cTn>
+                        </p:par>
+                      </p:childTnLst>
+                    </p:cTn>
+                  </p:par>
+                </p:childTnLst>
+              </p:cTn>
               <p:prevCondLst>
                 <p:cond delay="0" evt="onPrev">
                   <p:tgtEl>

</xml_diff>